<commit_message>
Upload optimizations in Power BI file and in ppt file
</commit_message>
<xml_diff>
--- a/presentation/Project_2.pptx
+++ b/presentation/Project_2.pptx
@@ -5,7 +5,7 @@
     <p:sldMasterId id="2147483648" r:id="rId1"/>
   </p:sldMasterIdLst>
   <p:notesMasterIdLst>
-    <p:notesMasterId r:id="rId13"/>
+    <p:notesMasterId r:id="rId12"/>
   </p:notesMasterIdLst>
   <p:sldIdLst>
     <p:sldId id="256" r:id="rId2"/>
@@ -16,9 +16,8 @@
     <p:sldId id="260" r:id="rId7"/>
     <p:sldId id="264" r:id="rId8"/>
     <p:sldId id="265" r:id="rId9"/>
-    <p:sldId id="262" r:id="rId10"/>
-    <p:sldId id="263" r:id="rId11"/>
-    <p:sldId id="266" r:id="rId12"/>
+    <p:sldId id="263" r:id="rId10"/>
+    <p:sldId id="266" r:id="rId11"/>
   </p:sldIdLst>
   <p:sldSz cx="12192000" cy="6858000"/>
   <p:notesSz cx="6858000" cy="9144000"/>
@@ -117,13 +116,18 @@
       </a:defRPr>
     </a:lvl9pPr>
   </p:defaultTextStyle>
+  <p:extLst>
+    <p:ext uri="{EFAFB233-063F-42B5-8137-9DF3F51BA10A}">
+      <p15:sldGuideLst xmlns:p15="http://schemas.microsoft.com/office/powerpoint/2012/main"/>
+    </p:ext>
+  </p:extLst>
 </p:presentation>
 </file>
 
 <file path=ppt/revisionInfo.xml><?xml version="1.0" encoding="utf-8"?>
 <p1510:revInfo xmlns:a="http://schemas.openxmlformats.org/drawingml/2006/main" xmlns:r="http://schemas.openxmlformats.org/officeDocument/2006/relationships" xmlns:p1510="http://schemas.microsoft.com/office/powerpoint/2015/10/main">
   <p1510:revLst>
-    <p1510:client id="{0F0844A4-C27F-4CD2-833D-E131F7093C18}" v="62" dt="2026-01-11T19:27:28.102"/>
+    <p1510:client id="{0F0844A4-C27F-4CD2-833D-E131F7093C18}" v="77" dt="2026-01-19T00:01:22.295"/>
   </p1510:revLst>
 </p1510:revInfo>
 </file>
@@ -133,42 +137,26 @@
   <pc:docChgLst>
     <pc:chgData name="Katerina Lama" userId="4e8f923e51bc8f8b" providerId="LiveId" clId="{032BFE3C-8ACE-4959-82C8-F4C52BA9C5BE}"/>
     <pc:docChg chg="undo custSel addSld delSld modSld sldOrd">
-      <pc:chgData name="Katerina Lama" userId="4e8f923e51bc8f8b" providerId="LiveId" clId="{032BFE3C-8ACE-4959-82C8-F4C52BA9C5BE}" dt="2026-01-11T19:27:32.702" v="1064" actId="1076"/>
+      <pc:chgData name="Katerina Lama" userId="4e8f923e51bc8f8b" providerId="LiveId" clId="{032BFE3C-8ACE-4959-82C8-F4C52BA9C5BE}" dt="2026-01-19T00:01:22.295" v="1435"/>
       <pc:docMkLst>
         <pc:docMk/>
       </pc:docMkLst>
       <pc:sldChg chg="addSp delSp modSp mod setBg">
-        <pc:chgData name="Katerina Lama" userId="4e8f923e51bc8f8b" providerId="LiveId" clId="{032BFE3C-8ACE-4959-82C8-F4C52BA9C5BE}" dt="2026-01-11T19:16:34.607" v="938" actId="1076"/>
+        <pc:chgData name="Katerina Lama" userId="4e8f923e51bc8f8b" providerId="LiveId" clId="{032BFE3C-8ACE-4959-82C8-F4C52BA9C5BE}" dt="2026-01-18T23:48:31.216" v="1249" actId="207"/>
         <pc:sldMkLst>
           <pc:docMk/>
           <pc:sldMk cId="997230782" sldId="256"/>
         </pc:sldMkLst>
-        <pc:spChg chg="del">
-          <ac:chgData name="Katerina Lama" userId="4e8f923e51bc8f8b" providerId="LiveId" clId="{032BFE3C-8ACE-4959-82C8-F4C52BA9C5BE}" dt="2026-01-11T19:15:45.058" v="931" actId="21"/>
-          <ac:spMkLst>
-            <pc:docMk/>
-            <pc:sldMk cId="997230782" sldId="256"/>
-            <ac:spMk id="2" creationId="{FBB51085-EEAA-23E6-4AC9-9C20633EEADA}"/>
-          </ac:spMkLst>
-        </pc:spChg>
         <pc:spChg chg="add mod">
-          <ac:chgData name="Katerina Lama" userId="4e8f923e51bc8f8b" providerId="LiveId" clId="{032BFE3C-8ACE-4959-82C8-F4C52BA9C5BE}" dt="2026-01-11T19:16:02.708" v="935" actId="14100"/>
+          <ac:chgData name="Katerina Lama" userId="4e8f923e51bc8f8b" providerId="LiveId" clId="{032BFE3C-8ACE-4959-82C8-F4C52BA9C5BE}" dt="2026-01-18T23:48:31.216" v="1249" actId="207"/>
           <ac:spMkLst>
             <pc:docMk/>
             <pc:sldMk cId="997230782" sldId="256"/>
             <ac:spMk id="6" creationId="{3C5EE45D-EE52-9051-D6F8-3893A06C409F}"/>
           </ac:spMkLst>
         </pc:spChg>
-        <pc:spChg chg="add del mod">
-          <ac:chgData name="Katerina Lama" userId="4e8f923e51bc8f8b" providerId="LiveId" clId="{032BFE3C-8ACE-4959-82C8-F4C52BA9C5BE}" dt="2026-01-11T19:15:47.392" v="932"/>
-          <ac:spMkLst>
-            <pc:docMk/>
-            <pc:sldMk cId="997230782" sldId="256"/>
-            <ac:spMk id="8" creationId="{A75C709E-BCC8-AAEA-B1FD-5458BB8E0A85}"/>
-          </ac:spMkLst>
-        </pc:spChg>
         <pc:spChg chg="add mod">
-          <ac:chgData name="Katerina Lama" userId="4e8f923e51bc8f8b" providerId="LiveId" clId="{032BFE3C-8ACE-4959-82C8-F4C52BA9C5BE}" dt="2026-01-11T19:16:34.607" v="938" actId="1076"/>
+          <ac:chgData name="Katerina Lama" userId="4e8f923e51bc8f8b" providerId="LiveId" clId="{032BFE3C-8ACE-4959-82C8-F4C52BA9C5BE}" dt="2026-01-18T23:48:25.631" v="1248" actId="207"/>
           <ac:spMkLst>
             <pc:docMk/>
             <pc:sldMk cId="997230782" sldId="256"/>
@@ -185,19 +173,11 @@
         </pc:picChg>
       </pc:sldChg>
       <pc:sldChg chg="addSp delSp modSp new mod setBg">
-        <pc:chgData name="Katerina Lama" userId="4e8f923e51bc8f8b" providerId="LiveId" clId="{032BFE3C-8ACE-4959-82C8-F4C52BA9C5BE}" dt="2026-01-11T19:18:03.109" v="959" actId="1076"/>
+        <pc:chgData name="Katerina Lama" userId="4e8f923e51bc8f8b" providerId="LiveId" clId="{032BFE3C-8ACE-4959-82C8-F4C52BA9C5BE}" dt="2026-01-18T23:48:03.489" v="1246"/>
         <pc:sldMkLst>
           <pc:docMk/>
           <pc:sldMk cId="1575404963" sldId="257"/>
         </pc:sldMkLst>
-        <pc:spChg chg="del mod">
-          <ac:chgData name="Katerina Lama" userId="4e8f923e51bc8f8b" providerId="LiveId" clId="{032BFE3C-8ACE-4959-82C8-F4C52BA9C5BE}" dt="2026-01-11T19:17:40.321" v="953" actId="478"/>
-          <ac:spMkLst>
-            <pc:docMk/>
-            <pc:sldMk cId="1575404963" sldId="257"/>
-            <ac:spMk id="2" creationId="{D322FBB9-7150-7D50-5DC6-C06E30F7ABEF}"/>
-          </ac:spMkLst>
-        </pc:spChg>
         <pc:spChg chg="add del mod">
           <ac:chgData name="Katerina Lama" userId="4e8f923e51bc8f8b" providerId="LiveId" clId="{032BFE3C-8ACE-4959-82C8-F4C52BA9C5BE}" dt="2026-01-11T19:17:11.862" v="944" actId="1076"/>
           <ac:spMkLst>
@@ -207,19 +187,11 @@
           </ac:spMkLst>
         </pc:spChg>
         <pc:spChg chg="add mod">
-          <ac:chgData name="Katerina Lama" userId="4e8f923e51bc8f8b" providerId="LiveId" clId="{032BFE3C-8ACE-4959-82C8-F4C52BA9C5BE}" dt="2026-01-11T19:18:03.109" v="959" actId="1076"/>
+          <ac:chgData name="Katerina Lama" userId="4e8f923e51bc8f8b" providerId="LiveId" clId="{032BFE3C-8ACE-4959-82C8-F4C52BA9C5BE}" dt="2026-01-18T23:47:47.352" v="1244" actId="207"/>
           <ac:spMkLst>
             <pc:docMk/>
             <pc:sldMk cId="1575404963" sldId="257"/>
             <ac:spMk id="4" creationId="{9A2DBC11-4B78-E285-27C4-9DB0B181E51B}"/>
-          </ac:spMkLst>
-        </pc:spChg>
-        <pc:spChg chg="add del mod">
-          <ac:chgData name="Katerina Lama" userId="4e8f923e51bc8f8b" providerId="LiveId" clId="{032BFE3C-8ACE-4959-82C8-F4C52BA9C5BE}" dt="2026-01-11T19:17:25.152" v="948" actId="21"/>
-          <ac:spMkLst>
-            <pc:docMk/>
-            <pc:sldMk cId="1575404963" sldId="257"/>
-            <ac:spMk id="6" creationId="{E9867D7A-9264-2E4A-6E91-B43217AB4835}"/>
           </ac:spMkLst>
         </pc:spChg>
         <pc:spChg chg="add mod">
@@ -230,158 +202,15 @@
             <ac:spMk id="7" creationId="{E9867D7A-9264-2E4A-6E91-B43217AB4835}"/>
           </ac:spMkLst>
         </pc:spChg>
-        <pc:spChg chg="add del">
-          <ac:chgData name="Katerina Lama" userId="4e8f923e51bc8f8b" providerId="LiveId" clId="{032BFE3C-8ACE-4959-82C8-F4C52BA9C5BE}" dt="2026-01-11T19:10:11.902" v="913" actId="26606"/>
-          <ac:spMkLst>
-            <pc:docMk/>
-            <pc:sldMk cId="1575404963" sldId="257"/>
-            <ac:spMk id="9" creationId="{BACC6370-2D7E-4714-9D71-7542949D7D5D}"/>
-          </ac:spMkLst>
-        </pc:spChg>
-        <pc:spChg chg="add del mod">
-          <ac:chgData name="Katerina Lama" userId="4e8f923e51bc8f8b" providerId="LiveId" clId="{032BFE3C-8ACE-4959-82C8-F4C52BA9C5BE}" dt="2026-01-11T19:17:49.158" v="954" actId="21"/>
-          <ac:spMkLst>
-            <pc:docMk/>
-            <pc:sldMk cId="1575404963" sldId="257"/>
-            <ac:spMk id="10" creationId="{83615517-9CA4-4FAE-903C-9507DFAE2D13}"/>
-          </ac:spMkLst>
-        </pc:spChg>
-        <pc:spChg chg="add del">
-          <ac:chgData name="Katerina Lama" userId="4e8f923e51bc8f8b" providerId="LiveId" clId="{032BFE3C-8ACE-4959-82C8-F4C52BA9C5BE}" dt="2026-01-11T19:10:11.902" v="913" actId="26606"/>
-          <ac:spMkLst>
-            <pc:docMk/>
-            <pc:sldMk cId="1575404963" sldId="257"/>
-            <ac:spMk id="11" creationId="{F68B3F68-107C-434F-AA38-110D5EA91B85}"/>
-          </ac:spMkLst>
-        </pc:spChg>
-        <pc:spChg chg="add del">
-          <ac:chgData name="Katerina Lama" userId="4e8f923e51bc8f8b" providerId="LiveId" clId="{032BFE3C-8ACE-4959-82C8-F4C52BA9C5BE}" dt="2026-01-11T19:10:11.902" v="913" actId="26606"/>
-          <ac:spMkLst>
-            <pc:docMk/>
-            <pc:sldMk cId="1575404963" sldId="257"/>
-            <ac:spMk id="13" creationId="{AAD0DBB9-1A4B-4391-81D4-CB19F9AB918A}"/>
-          </ac:spMkLst>
-        </pc:spChg>
-        <pc:spChg chg="add del">
-          <ac:chgData name="Katerina Lama" userId="4e8f923e51bc8f8b" providerId="LiveId" clId="{032BFE3C-8ACE-4959-82C8-F4C52BA9C5BE}" dt="2026-01-11T19:10:11.902" v="913" actId="26606"/>
-          <ac:spMkLst>
-            <pc:docMk/>
-            <pc:sldMk cId="1575404963" sldId="257"/>
-            <ac:spMk id="15" creationId="{063BBA22-50EA-4C4D-BE05-F1CE4E63AA56}"/>
-          </ac:spMkLst>
-        </pc:spChg>
-        <pc:spChg chg="add del">
-          <ac:chgData name="Katerina Lama" userId="4e8f923e51bc8f8b" providerId="LiveId" clId="{032BFE3C-8ACE-4959-82C8-F4C52BA9C5BE}" dt="2026-01-11T19:14:58.318" v="927" actId="26606"/>
-          <ac:spMkLst>
-            <pc:docMk/>
-            <pc:sldMk cId="1575404963" sldId="257"/>
-            <ac:spMk id="17" creationId="{43F8A58B-5155-44CE-A5FF-7647B47D0A7A}"/>
-          </ac:spMkLst>
-        </pc:spChg>
-        <pc:spChg chg="add del">
-          <ac:chgData name="Katerina Lama" userId="4e8f923e51bc8f8b" providerId="LiveId" clId="{032BFE3C-8ACE-4959-82C8-F4C52BA9C5BE}" dt="2026-01-11T19:14:58.318" v="927" actId="26606"/>
-          <ac:spMkLst>
-            <pc:docMk/>
-            <pc:sldMk cId="1575404963" sldId="257"/>
-            <ac:spMk id="18" creationId="{BACC6370-2D7E-4714-9D71-7542949D7D5D}"/>
-          </ac:spMkLst>
-        </pc:spChg>
-        <pc:spChg chg="add del">
-          <ac:chgData name="Katerina Lama" userId="4e8f923e51bc8f8b" providerId="LiveId" clId="{032BFE3C-8ACE-4959-82C8-F4C52BA9C5BE}" dt="2026-01-11T19:14:58.318" v="927" actId="26606"/>
-          <ac:spMkLst>
-            <pc:docMk/>
-            <pc:sldMk cId="1575404963" sldId="257"/>
-            <ac:spMk id="19" creationId="{443F2ACA-E6D6-4028-82DD-F03C262D5DE6}"/>
-          </ac:spMkLst>
-        </pc:spChg>
-        <pc:spChg chg="add del">
-          <ac:chgData name="Katerina Lama" userId="4e8f923e51bc8f8b" providerId="LiveId" clId="{032BFE3C-8ACE-4959-82C8-F4C52BA9C5BE}" dt="2026-01-11T19:14:58.318" v="927" actId="26606"/>
-          <ac:spMkLst>
-            <pc:docMk/>
-            <pc:sldMk cId="1575404963" sldId="257"/>
-            <ac:spMk id="20" creationId="{256B2C21-A230-48C0-8DF1-C46611373C44}"/>
-          </ac:spMkLst>
-        </pc:spChg>
-        <pc:spChg chg="add del">
-          <ac:chgData name="Katerina Lama" userId="4e8f923e51bc8f8b" providerId="LiveId" clId="{032BFE3C-8ACE-4959-82C8-F4C52BA9C5BE}" dt="2026-01-11T19:14:58.318" v="927" actId="26606"/>
-          <ac:spMkLst>
-            <pc:docMk/>
-            <pc:sldMk cId="1575404963" sldId="257"/>
-            <ac:spMk id="21" creationId="{3847E18C-932D-4C95-AABA-FEC7C9499AD7}"/>
-          </ac:spMkLst>
-        </pc:spChg>
-        <pc:spChg chg="add del">
-          <ac:chgData name="Katerina Lama" userId="4e8f923e51bc8f8b" providerId="LiveId" clId="{032BFE3C-8ACE-4959-82C8-F4C52BA9C5BE}" dt="2026-01-11T19:14:58.318" v="927" actId="26606"/>
-          <ac:spMkLst>
-            <pc:docMk/>
-            <pc:sldMk cId="1575404963" sldId="257"/>
-            <ac:spMk id="22" creationId="{3150CB11-0C61-439E-910F-5787759E72A0}"/>
-          </ac:spMkLst>
-        </pc:spChg>
-        <pc:graphicFrameChg chg="add del">
-          <ac:chgData name="Katerina Lama" userId="4e8f923e51bc8f8b" providerId="LiveId" clId="{032BFE3C-8ACE-4959-82C8-F4C52BA9C5BE}" dt="2026-01-11T19:10:11.902" v="913" actId="26606"/>
-          <ac:graphicFrameMkLst>
-            <pc:docMk/>
-            <pc:sldMk cId="1575404963" sldId="257"/>
-            <ac:graphicFrameMk id="5" creationId="{68E9DCF0-7D77-B966-06EF-B3AE4C999AAD}"/>
-          </ac:graphicFrameMkLst>
-        </pc:graphicFrameChg>
-        <pc:graphicFrameChg chg="add del mod modGraphic">
-          <ac:chgData name="Katerina Lama" userId="4e8f923e51bc8f8b" providerId="LiveId" clId="{032BFE3C-8ACE-4959-82C8-F4C52BA9C5BE}" dt="2026-01-11T19:14:58.318" v="927" actId="26606"/>
-          <ac:graphicFrameMkLst>
-            <pc:docMk/>
-            <pc:sldMk cId="1575404963" sldId="257"/>
-            <ac:graphicFrameMk id="23" creationId="{DBA3F8C7-6CF4-141B-1949-0B889EEA4BDD}"/>
-          </ac:graphicFrameMkLst>
-        </pc:graphicFrameChg>
       </pc:sldChg>
-      <pc:sldChg chg="modSp new del mod">
-        <pc:chgData name="Katerina Lama" userId="4e8f923e51bc8f8b" providerId="LiveId" clId="{032BFE3C-8ACE-4959-82C8-F4C52BA9C5BE}" dt="2026-01-10T12:08:48.665" v="254" actId="2696"/>
-        <pc:sldMkLst>
-          <pc:docMk/>
-          <pc:sldMk cId="3132801809" sldId="258"/>
-        </pc:sldMkLst>
-        <pc:spChg chg="mod">
-          <ac:chgData name="Katerina Lama" userId="4e8f923e51bc8f8b" providerId="LiveId" clId="{032BFE3C-8ACE-4959-82C8-F4C52BA9C5BE}" dt="2026-01-10T11:44:34.365" v="251" actId="207"/>
-          <ac:spMkLst>
-            <pc:docMk/>
-            <pc:sldMk cId="3132801809" sldId="258"/>
-            <ac:spMk id="2" creationId="{72E980B6-EAA1-2B70-B8C3-34CBB2096D22}"/>
-          </ac:spMkLst>
-        </pc:spChg>
-        <pc:spChg chg="mod">
-          <ac:chgData name="Katerina Lama" userId="4e8f923e51bc8f8b" providerId="LiveId" clId="{032BFE3C-8ACE-4959-82C8-F4C52BA9C5BE}" dt="2026-01-10T11:46:46.512" v="253" actId="5793"/>
-          <ac:spMkLst>
-            <pc:docMk/>
-            <pc:sldMk cId="3132801809" sldId="258"/>
-            <ac:spMk id="3" creationId="{D1D74D2C-3E90-79EE-5F5E-ED245A5E73B2}"/>
-          </ac:spMkLst>
-        </pc:spChg>
-      </pc:sldChg>
-      <pc:sldChg chg="addSp delSp modSp add mod">
-        <pc:chgData name="Katerina Lama" userId="4e8f923e51bc8f8b" providerId="LiveId" clId="{032BFE3C-8ACE-4959-82C8-F4C52BA9C5BE}" dt="2026-01-11T19:19:53.427" v="979" actId="1076"/>
+      <pc:sldChg chg="addSp delSp modSp add mod setBg">
+        <pc:chgData name="Katerina Lama" userId="4e8f923e51bc8f8b" providerId="LiveId" clId="{032BFE3C-8ACE-4959-82C8-F4C52BA9C5BE}" dt="2026-01-18T23:47:32.374" v="1242"/>
         <pc:sldMkLst>
           <pc:docMk/>
           <pc:sldMk cId="3943745945" sldId="258"/>
         </pc:sldMkLst>
-        <pc:spChg chg="del mod">
-          <ac:chgData name="Katerina Lama" userId="4e8f923e51bc8f8b" providerId="LiveId" clId="{032BFE3C-8ACE-4959-82C8-F4C52BA9C5BE}" dt="2026-01-11T19:18:38.076" v="962" actId="21"/>
-          <ac:spMkLst>
-            <pc:docMk/>
-            <pc:sldMk cId="3943745945" sldId="258"/>
-            <ac:spMk id="2" creationId="{8E194144-456F-0114-7581-205897A2D291}"/>
-          </ac:spMkLst>
-        </pc:spChg>
-        <pc:spChg chg="del mod">
-          <ac:chgData name="Katerina Lama" userId="4e8f923e51bc8f8b" providerId="LiveId" clId="{032BFE3C-8ACE-4959-82C8-F4C52BA9C5BE}" dt="2026-01-10T12:42:57.544" v="308" actId="21"/>
-          <ac:spMkLst>
-            <pc:docMk/>
-            <pc:sldMk cId="3943745945" sldId="258"/>
-            <ac:spMk id="3" creationId="{A72B3FA6-6DD9-61AE-F9A7-B76F93C43C53}"/>
-          </ac:spMkLst>
-        </pc:spChg>
         <pc:spChg chg="add mod">
-          <ac:chgData name="Katerina Lama" userId="4e8f923e51bc8f8b" providerId="LiveId" clId="{032BFE3C-8ACE-4959-82C8-F4C52BA9C5BE}" dt="2026-01-11T19:19:49.902" v="978" actId="1076"/>
+          <ac:chgData name="Katerina Lama" userId="4e8f923e51bc8f8b" providerId="LiveId" clId="{032BFE3C-8ACE-4959-82C8-F4C52BA9C5BE}" dt="2026-01-18T23:44:03.792" v="1227" actId="1076"/>
           <ac:spMkLst>
             <pc:docMk/>
             <pc:sldMk cId="3943745945" sldId="258"/>
@@ -389,52 +218,60 @@
           </ac:spMkLst>
         </pc:spChg>
         <pc:spChg chg="add mod">
-          <ac:chgData name="Katerina Lama" userId="4e8f923e51bc8f8b" providerId="LiveId" clId="{032BFE3C-8ACE-4959-82C8-F4C52BA9C5BE}" dt="2026-01-11T19:19:37.238" v="976" actId="14100"/>
+          <ac:chgData name="Katerina Lama" userId="4e8f923e51bc8f8b" providerId="LiveId" clId="{032BFE3C-8ACE-4959-82C8-F4C52BA9C5BE}" dt="2026-01-18T23:44:09.717" v="1228" actId="2711"/>
+          <ac:spMkLst>
+            <pc:docMk/>
+            <pc:sldMk cId="3943745945" sldId="258"/>
+            <ac:spMk id="5" creationId="{B96904F5-6BD9-9CD9-D0CF-2B5A87FB8B28}"/>
+          </ac:spMkLst>
+        </pc:spChg>
+        <pc:spChg chg="add mod">
+          <ac:chgData name="Katerina Lama" userId="4e8f923e51bc8f8b" providerId="LiveId" clId="{032BFE3C-8ACE-4959-82C8-F4C52BA9C5BE}" dt="2026-01-18T23:47:07.421" v="1240" actId="207"/>
           <ac:spMkLst>
             <pc:docMk/>
             <pc:sldMk cId="3943745945" sldId="258"/>
             <ac:spMk id="7" creationId="{D6B07252-7E25-63AF-B0AC-38E1F437E7D1}"/>
           </ac:spMkLst>
         </pc:spChg>
-        <pc:spChg chg="add del mod">
-          <ac:chgData name="Katerina Lama" userId="4e8f923e51bc8f8b" providerId="LiveId" clId="{032BFE3C-8ACE-4959-82C8-F4C52BA9C5BE}" dt="2026-01-11T19:19:10.792" v="970" actId="21"/>
-          <ac:spMkLst>
-            <pc:docMk/>
-            <pc:sldMk cId="3943745945" sldId="258"/>
-            <ac:spMk id="9" creationId="{08DBB426-E842-C1E3-3F2A-CD7417666E23}"/>
-          </ac:spMkLst>
-        </pc:spChg>
         <pc:spChg chg="add mod">
-          <ac:chgData name="Katerina Lama" userId="4e8f923e51bc8f8b" providerId="LiveId" clId="{032BFE3C-8ACE-4959-82C8-F4C52BA9C5BE}" dt="2026-01-11T19:19:33.289" v="975" actId="1076"/>
+          <ac:chgData name="Katerina Lama" userId="4e8f923e51bc8f8b" providerId="LiveId" clId="{032BFE3C-8ACE-4959-82C8-F4C52BA9C5BE}" dt="2026-01-18T23:47:22.705" v="1241" actId="207"/>
           <ac:spMkLst>
             <pc:docMk/>
             <pc:sldMk cId="3943745945" sldId="258"/>
             <ac:spMk id="10" creationId="{8E194144-456F-0114-7581-205897A2D291}"/>
           </ac:spMkLst>
         </pc:spChg>
-        <pc:picChg chg="add mod">
-          <ac:chgData name="Katerina Lama" userId="4e8f923e51bc8f8b" providerId="LiveId" clId="{032BFE3C-8ACE-4959-82C8-F4C52BA9C5BE}" dt="2026-01-11T19:19:53.427" v="979" actId="1076"/>
+        <pc:picChg chg="add mod modCrop">
+          <ac:chgData name="Katerina Lama" userId="4e8f923e51bc8f8b" providerId="LiveId" clId="{032BFE3C-8ACE-4959-82C8-F4C52BA9C5BE}" dt="2026-01-18T23:46:49.154" v="1239" actId="1076"/>
+          <ac:picMkLst>
+            <pc:docMk/>
+            <pc:sldMk cId="3943745945" sldId="258"/>
+            <ac:picMk id="3" creationId="{AF0F3ACF-75E7-9ADB-67FC-F6521DEB7A1B}"/>
+          </ac:picMkLst>
+        </pc:picChg>
+        <pc:picChg chg="add del mod">
+          <ac:chgData name="Katerina Lama" userId="4e8f923e51bc8f8b" providerId="LiveId" clId="{032BFE3C-8ACE-4959-82C8-F4C52BA9C5BE}" dt="2026-01-18T23:40:59.892" v="1093" actId="21"/>
           <ac:picMkLst>
             <pc:docMk/>
             <pc:sldMk cId="3943745945" sldId="258"/>
             <ac:picMk id="6" creationId="{458F3357-A8AF-19F3-E951-876A7FD34B79}"/>
           </ac:picMkLst>
         </pc:picChg>
+        <pc:picChg chg="add mod modCrop">
+          <ac:chgData name="Katerina Lama" userId="4e8f923e51bc8f8b" providerId="LiveId" clId="{032BFE3C-8ACE-4959-82C8-F4C52BA9C5BE}" dt="2026-01-18T23:46:39.017" v="1238" actId="1076"/>
+          <ac:picMkLst>
+            <pc:docMk/>
+            <pc:sldMk cId="3943745945" sldId="258"/>
+            <ac:picMk id="9" creationId="{523A191B-8090-7768-351C-FF8326BC3FB6}"/>
+          </ac:picMkLst>
+        </pc:picChg>
       </pc:sldChg>
       <pc:sldChg chg="addSp delSp modSp add mod setBg">
-        <pc:chgData name="Katerina Lama" userId="4e8f923e51bc8f8b" providerId="LiveId" clId="{032BFE3C-8ACE-4959-82C8-F4C52BA9C5BE}" dt="2026-01-11T19:21:36.052" v="999" actId="1076"/>
+        <pc:chgData name="Katerina Lama" userId="4e8f923e51bc8f8b" providerId="LiveId" clId="{032BFE3C-8ACE-4959-82C8-F4C52BA9C5BE}" dt="2026-01-18T23:49:22.442" v="1252" actId="207"/>
         <pc:sldMkLst>
           <pc:docMk/>
           <pc:sldMk cId="1224935063" sldId="259"/>
         </pc:sldMkLst>
-        <pc:spChg chg="del mod">
-          <ac:chgData name="Katerina Lama" userId="4e8f923e51bc8f8b" providerId="LiveId" clId="{032BFE3C-8ACE-4959-82C8-F4C52BA9C5BE}" dt="2026-01-11T19:20:41.165" v="987" actId="21"/>
-          <ac:spMkLst>
-            <pc:docMk/>
-            <pc:sldMk cId="1224935063" sldId="259"/>
-            <ac:spMk id="2" creationId="{A3AF37B0-94AB-AE73-981E-475BEED7C275}"/>
-          </ac:spMkLst>
-        </pc:spChg>
         <pc:spChg chg="add mod">
           <ac:chgData name="Katerina Lama" userId="4e8f923e51bc8f8b" providerId="LiveId" clId="{032BFE3C-8ACE-4959-82C8-F4C52BA9C5BE}" dt="2026-01-11T19:21:33.051" v="998" actId="1076"/>
           <ac:spMkLst>
@@ -443,56 +280,16 @@
             <ac:spMk id="3" creationId="{05E9CA35-2279-F504-70FF-7C303C0D4D2C}"/>
           </ac:spMkLst>
         </pc:spChg>
-        <pc:spChg chg="add del">
-          <ac:chgData name="Katerina Lama" userId="4e8f923e51bc8f8b" providerId="LiveId" clId="{032BFE3C-8ACE-4959-82C8-F4C52BA9C5BE}" dt="2026-01-11T18:10:35.841" v="616" actId="26606"/>
-          <ac:spMkLst>
-            <pc:docMk/>
-            <pc:sldMk cId="1224935063" sldId="259"/>
-            <ac:spMk id="14" creationId="{26FF42C2-EA15-4154-B242-E98E88CED99C}"/>
-          </ac:spMkLst>
-        </pc:spChg>
         <pc:spChg chg="add mod">
-          <ac:chgData name="Katerina Lama" userId="4e8f923e51bc8f8b" providerId="LiveId" clId="{032BFE3C-8ACE-4959-82C8-F4C52BA9C5BE}" dt="2026-01-11T19:20:28.029" v="984" actId="14100"/>
+          <ac:chgData name="Katerina Lama" userId="4e8f923e51bc8f8b" providerId="LiveId" clId="{032BFE3C-8ACE-4959-82C8-F4C52BA9C5BE}" dt="2026-01-18T23:49:12.266" v="1250" actId="207"/>
           <ac:spMkLst>
             <pc:docMk/>
             <pc:sldMk cId="1224935063" sldId="259"/>
             <ac:spMk id="15" creationId="{C5874D17-AF96-70D2-56B9-961E334B4F74}"/>
           </ac:spMkLst>
         </pc:spChg>
-        <pc:spChg chg="add del">
-          <ac:chgData name="Katerina Lama" userId="4e8f923e51bc8f8b" providerId="LiveId" clId="{032BFE3C-8ACE-4959-82C8-F4C52BA9C5BE}" dt="2026-01-11T18:10:35.841" v="616" actId="26606"/>
-          <ac:spMkLst>
-            <pc:docMk/>
-            <pc:sldMk cId="1224935063" sldId="259"/>
-            <ac:spMk id="16" creationId="{D79DE9F7-28C4-4856-BA57-D696E124C137}"/>
-          </ac:spMkLst>
-        </pc:spChg>
-        <pc:spChg chg="add del">
-          <ac:chgData name="Katerina Lama" userId="4e8f923e51bc8f8b" providerId="LiveId" clId="{032BFE3C-8ACE-4959-82C8-F4C52BA9C5BE}" dt="2026-01-11T18:10:35.841" v="616" actId="26606"/>
-          <ac:spMkLst>
-            <pc:docMk/>
-            <pc:sldMk cId="1224935063" sldId="259"/>
-            <ac:spMk id="18" creationId="{E1F9ED9C-121B-44C6-A308-5824769C40D5}"/>
-          </ac:spMkLst>
-        </pc:spChg>
-        <pc:spChg chg="add del mod">
-          <ac:chgData name="Katerina Lama" userId="4e8f923e51bc8f8b" providerId="LiveId" clId="{032BFE3C-8ACE-4959-82C8-F4C52BA9C5BE}" dt="2026-01-11T19:21:21.204" v="995" actId="21"/>
-          <ac:spMkLst>
-            <pc:docMk/>
-            <pc:sldMk cId="1224935063" sldId="259"/>
-            <ac:spMk id="19" creationId="{A9CF25EE-5DE1-2D55-CD07-908F14F03A9F}"/>
-          </ac:spMkLst>
-        </pc:spChg>
-        <pc:spChg chg="add del">
-          <ac:chgData name="Katerina Lama" userId="4e8f923e51bc8f8b" providerId="LiveId" clId="{032BFE3C-8ACE-4959-82C8-F4C52BA9C5BE}" dt="2026-01-11T18:10:35.841" v="616" actId="26606"/>
-          <ac:spMkLst>
-            <pc:docMk/>
-            <pc:sldMk cId="1224935063" sldId="259"/>
-            <ac:spMk id="20" creationId="{4A5F8185-F27B-4E99-A06C-007336FE3F2D}"/>
-          </ac:spMkLst>
-        </pc:spChg>
         <pc:spChg chg="add mod">
-          <ac:chgData name="Katerina Lama" userId="4e8f923e51bc8f8b" providerId="LiveId" clId="{032BFE3C-8ACE-4959-82C8-F4C52BA9C5BE}" dt="2026-01-11T19:21:06.806" v="993" actId="1076"/>
+          <ac:chgData name="Katerina Lama" userId="4e8f923e51bc8f8b" providerId="LiveId" clId="{032BFE3C-8ACE-4959-82C8-F4C52BA9C5BE}" dt="2026-01-18T23:49:22.442" v="1252" actId="207"/>
           <ac:spMkLst>
             <pc:docMk/>
             <pc:sldMk cId="1224935063" sldId="259"/>
@@ -540,46 +337,22 @@
           </ac:picMkLst>
         </pc:picChg>
       </pc:sldChg>
-      <pc:sldChg chg="addSp delSp modSp add mod">
-        <pc:chgData name="Katerina Lama" userId="4e8f923e51bc8f8b" providerId="LiveId" clId="{032BFE3C-8ACE-4959-82C8-F4C52BA9C5BE}" dt="2026-01-11T19:24:00.730" v="1031" actId="1076"/>
+      <pc:sldChg chg="addSp delSp modSp add mod setBg">
+        <pc:chgData name="Katerina Lama" userId="4e8f923e51bc8f8b" providerId="LiveId" clId="{032BFE3C-8ACE-4959-82C8-F4C52BA9C5BE}" dt="2026-01-18T23:52:47.990" v="1283" actId="207"/>
         <pc:sldMkLst>
           <pc:docMk/>
           <pc:sldMk cId="2942031164" sldId="260"/>
         </pc:sldMkLst>
-        <pc:spChg chg="del mod">
-          <ac:chgData name="Katerina Lama" userId="4e8f923e51bc8f8b" providerId="LiveId" clId="{032BFE3C-8ACE-4959-82C8-F4C52BA9C5BE}" dt="2026-01-11T19:23:04.586" v="1015" actId="21"/>
-          <ac:spMkLst>
-            <pc:docMk/>
-            <pc:sldMk cId="2942031164" sldId="260"/>
-            <ac:spMk id="2" creationId="{55AE656C-8D78-73C1-DE77-D3EE464458C6}"/>
-          </ac:spMkLst>
-        </pc:spChg>
-        <pc:spChg chg="del mod">
-          <ac:chgData name="Katerina Lama" userId="4e8f923e51bc8f8b" providerId="LiveId" clId="{032BFE3C-8ACE-4959-82C8-F4C52BA9C5BE}" dt="2026-01-11T18:21:49.162" v="696" actId="21"/>
-          <ac:spMkLst>
-            <pc:docMk/>
-            <pc:sldMk cId="2942031164" sldId="260"/>
-            <ac:spMk id="3" creationId="{2F0F851B-E4B4-F48C-87C1-5311FB3CE91E}"/>
-          </ac:spMkLst>
-        </pc:spChg>
         <pc:spChg chg="add mod">
-          <ac:chgData name="Katerina Lama" userId="4e8f923e51bc8f8b" providerId="LiveId" clId="{032BFE3C-8ACE-4959-82C8-F4C52BA9C5BE}" dt="2026-01-11T19:23:54.488" v="1030" actId="14100"/>
+          <ac:chgData name="Katerina Lama" userId="4e8f923e51bc8f8b" providerId="LiveId" clId="{032BFE3C-8ACE-4959-82C8-F4C52BA9C5BE}" dt="2026-01-18T23:52:40.278" v="1282" actId="207"/>
           <ac:spMkLst>
             <pc:docMk/>
             <pc:sldMk cId="2942031164" sldId="260"/>
             <ac:spMk id="9" creationId="{390A2EFC-20C3-0CB2-BCF6-C6B19B11E96F}"/>
           </ac:spMkLst>
         </pc:spChg>
-        <pc:spChg chg="add del mod">
-          <ac:chgData name="Katerina Lama" userId="4e8f923e51bc8f8b" providerId="LiveId" clId="{032BFE3C-8ACE-4959-82C8-F4C52BA9C5BE}" dt="2026-01-11T19:23:38.330" v="1026" actId="21"/>
-          <ac:spMkLst>
-            <pc:docMk/>
-            <pc:sldMk cId="2942031164" sldId="260"/>
-            <ac:spMk id="12" creationId="{6111B894-A58E-C0F0-AA2C-3973C2BBB3FC}"/>
-          </ac:spMkLst>
-        </pc:spChg>
         <pc:spChg chg="add mod">
-          <ac:chgData name="Katerina Lama" userId="4e8f923e51bc8f8b" providerId="LiveId" clId="{032BFE3C-8ACE-4959-82C8-F4C52BA9C5BE}" dt="2026-01-11T19:24:00.730" v="1031" actId="1076"/>
+          <ac:chgData name="Katerina Lama" userId="4e8f923e51bc8f8b" providerId="LiveId" clId="{032BFE3C-8ACE-4959-82C8-F4C52BA9C5BE}" dt="2026-01-18T23:52:47.990" v="1283" actId="207"/>
           <ac:spMkLst>
             <pc:docMk/>
             <pc:sldMk cId="2942031164" sldId="260"/>
@@ -602,79 +375,31 @@
             <ac:picMk id="7" creationId="{F4FC030E-9D03-C645-ED42-7FF7C30C76BC}"/>
           </ac:picMkLst>
         </pc:picChg>
-        <pc:picChg chg="add del mod">
-          <ac:chgData name="Katerina Lama" userId="4e8f923e51bc8f8b" providerId="LiveId" clId="{032BFE3C-8ACE-4959-82C8-F4C52BA9C5BE}" dt="2026-01-11T18:36:12.779" v="785" actId="21"/>
-          <ac:picMkLst>
-            <pc:docMk/>
-            <pc:sldMk cId="2942031164" sldId="260"/>
-            <ac:picMk id="8" creationId="{D9F789F3-DC65-CE1A-1EF0-3FD2FD053017}"/>
-          </ac:picMkLst>
-        </pc:picChg>
-        <pc:picChg chg="add del mod">
-          <ac:chgData name="Katerina Lama" userId="4e8f923e51bc8f8b" providerId="LiveId" clId="{032BFE3C-8ACE-4959-82C8-F4C52BA9C5BE}" dt="2026-01-11T18:34:59.562" v="780" actId="478"/>
-          <ac:picMkLst>
-            <pc:docMk/>
-            <pc:sldMk cId="2942031164" sldId="260"/>
-            <ac:picMk id="11" creationId="{C28F6BCD-9D3A-D243-1639-FA0C7FE0EA8B}"/>
-          </ac:picMkLst>
-        </pc:picChg>
       </pc:sldChg>
       <pc:sldChg chg="addSp delSp modSp add mod ord setBg">
-        <pc:chgData name="Katerina Lama" userId="4e8f923e51bc8f8b" providerId="LiveId" clId="{032BFE3C-8ACE-4959-82C8-F4C52BA9C5BE}" dt="2026-01-11T19:22:41.171" v="1012" actId="1076"/>
+        <pc:chgData name="Katerina Lama" userId="4e8f923e51bc8f8b" providerId="LiveId" clId="{032BFE3C-8ACE-4959-82C8-F4C52BA9C5BE}" dt="2026-01-18T23:52:27.566" v="1280" actId="1076"/>
         <pc:sldMkLst>
           <pc:docMk/>
           <pc:sldMk cId="505344178" sldId="261"/>
         </pc:sldMkLst>
-        <pc:spChg chg="del mod">
-          <ac:chgData name="Katerina Lama" userId="4e8f923e51bc8f8b" providerId="LiveId" clId="{032BFE3C-8ACE-4959-82C8-F4C52BA9C5BE}" dt="2026-01-11T19:21:55.831" v="1001" actId="21"/>
-          <ac:spMkLst>
-            <pc:docMk/>
-            <pc:sldMk cId="505344178" sldId="261"/>
-            <ac:spMk id="2" creationId="{8C085DCB-C148-E5AC-0A8B-8769D4A7BF07}"/>
-          </ac:spMkLst>
-        </pc:spChg>
-        <pc:spChg chg="del">
-          <ac:chgData name="Katerina Lama" userId="4e8f923e51bc8f8b" providerId="LiveId" clId="{032BFE3C-8ACE-4959-82C8-F4C52BA9C5BE}" dt="2026-01-10T19:08:54.812" v="500" actId="21"/>
-          <ac:spMkLst>
-            <pc:docMk/>
-            <pc:sldMk cId="505344178" sldId="261"/>
-            <ac:spMk id="3" creationId="{8DFCD7B7-DC47-6392-2EAE-624D37D216BE}"/>
-          </ac:spMkLst>
-        </pc:spChg>
         <pc:spChg chg="add mod">
-          <ac:chgData name="Katerina Lama" userId="4e8f923e51bc8f8b" providerId="LiveId" clId="{032BFE3C-8ACE-4959-82C8-F4C52BA9C5BE}" dt="2026-01-11T19:22:41.171" v="1012" actId="1076"/>
+          <ac:chgData name="Katerina Lama" userId="4e8f923e51bc8f8b" providerId="LiveId" clId="{032BFE3C-8ACE-4959-82C8-F4C52BA9C5BE}" dt="2026-01-18T23:52:26.516" v="1279" actId="1076"/>
           <ac:spMkLst>
             <pc:docMk/>
             <pc:sldMk cId="505344178" sldId="261"/>
             <ac:spMk id="6" creationId="{2F0F851B-E4B4-F48C-87C1-5311FB3CE91E}"/>
           </ac:spMkLst>
         </pc:spChg>
-        <pc:spChg chg="add del">
-          <ac:chgData name="Katerina Lama" userId="4e8f923e51bc8f8b" providerId="LiveId" clId="{032BFE3C-8ACE-4959-82C8-F4C52BA9C5BE}" dt="2026-01-11T18:21:41.005" v="694" actId="26606"/>
-          <ac:spMkLst>
-            <pc:docMk/>
-            <pc:sldMk cId="505344178" sldId="261"/>
-            <ac:spMk id="10" creationId="{D4771268-CB57-404A-9271-370EB28F6090}"/>
-          </ac:spMkLst>
-        </pc:spChg>
         <pc:spChg chg="add mod">
-          <ac:chgData name="Katerina Lama" userId="4e8f923e51bc8f8b" providerId="LiveId" clId="{032BFE3C-8ACE-4959-82C8-F4C52BA9C5BE}" dt="2026-01-11T19:22:26.380" v="1009" actId="14100"/>
+          <ac:chgData name="Katerina Lama" userId="4e8f923e51bc8f8b" providerId="LiveId" clId="{032BFE3C-8ACE-4959-82C8-F4C52BA9C5BE}" dt="2026-01-18T23:49:36.394" v="1254" actId="207"/>
           <ac:spMkLst>
             <pc:docMk/>
             <pc:sldMk cId="505344178" sldId="261"/>
             <ac:spMk id="12" creationId="{6D6106C5-820F-29BC-1FAE-1E924A43C02B}"/>
           </ac:spMkLst>
         </pc:spChg>
-        <pc:spChg chg="add del mod">
-          <ac:chgData name="Katerina Lama" userId="4e8f923e51bc8f8b" providerId="LiveId" clId="{032BFE3C-8ACE-4959-82C8-F4C52BA9C5BE}" dt="2026-01-11T19:22:03.956" v="1004" actId="21"/>
-          <ac:spMkLst>
-            <pc:docMk/>
-            <pc:sldMk cId="505344178" sldId="261"/>
-            <ac:spMk id="14" creationId="{1D5DF555-4590-057A-750F-F398223E59F7}"/>
-          </ac:spMkLst>
-        </pc:spChg>
         <pc:spChg chg="add mod">
-          <ac:chgData name="Katerina Lama" userId="4e8f923e51bc8f8b" providerId="LiveId" clId="{032BFE3C-8ACE-4959-82C8-F4C52BA9C5BE}" dt="2026-01-11T19:22:21.756" v="1008" actId="1076"/>
+          <ac:chgData name="Katerina Lama" userId="4e8f923e51bc8f8b" providerId="LiveId" clId="{032BFE3C-8ACE-4959-82C8-F4C52BA9C5BE}" dt="2026-01-18T23:49:41.520" v="1255" actId="207"/>
           <ac:spMkLst>
             <pc:docMk/>
             <pc:sldMk cId="505344178" sldId="261"/>
@@ -682,125 +407,37 @@
           </ac:spMkLst>
         </pc:spChg>
         <pc:picChg chg="add mod">
-          <ac:chgData name="Katerina Lama" userId="4e8f923e51bc8f8b" providerId="LiveId" clId="{032BFE3C-8ACE-4959-82C8-F4C52BA9C5BE}" dt="2026-01-11T18:37:29.421" v="799" actId="14100"/>
+          <ac:chgData name="Katerina Lama" userId="4e8f923e51bc8f8b" providerId="LiveId" clId="{032BFE3C-8ACE-4959-82C8-F4C52BA9C5BE}" dt="2026-01-18T23:52:27.566" v="1280" actId="1076"/>
           <ac:picMkLst>
             <pc:docMk/>
             <pc:sldMk cId="505344178" sldId="261"/>
             <ac:picMk id="5" creationId="{E47A2B7F-D031-50C6-2105-7EABC18A3366}"/>
           </ac:picMkLst>
         </pc:picChg>
-        <pc:picChg chg="add del mod">
-          <ac:chgData name="Katerina Lama" userId="4e8f923e51bc8f8b" providerId="LiveId" clId="{032BFE3C-8ACE-4959-82C8-F4C52BA9C5BE}" dt="2026-01-11T18:32:08.150" v="753" actId="21"/>
-          <ac:picMkLst>
-            <pc:docMk/>
-            <pc:sldMk cId="505344178" sldId="261"/>
-            <ac:picMk id="8" creationId="{D9F789F3-DC65-CE1A-1EF0-3FD2FD053017}"/>
-          </ac:picMkLst>
-        </pc:picChg>
-        <pc:picChg chg="add del mod">
-          <ac:chgData name="Katerina Lama" userId="4e8f923e51bc8f8b" providerId="LiveId" clId="{032BFE3C-8ACE-4959-82C8-F4C52BA9C5BE}" dt="2026-01-11T18:31:45.753" v="748" actId="21"/>
-          <ac:picMkLst>
-            <pc:docMk/>
-            <pc:sldMk cId="505344178" sldId="261"/>
-            <ac:picMk id="11" creationId="{C28F6BCD-9D3A-D243-1639-FA0C7FE0EA8B}"/>
-          </ac:picMkLst>
-        </pc:picChg>
       </pc:sldChg>
-      <pc:sldChg chg="addSp delSp modSp add mod">
-        <pc:chgData name="Katerina Lama" userId="4e8f923e51bc8f8b" providerId="LiveId" clId="{032BFE3C-8ACE-4959-82C8-F4C52BA9C5BE}" dt="2026-01-11T19:26:17.545" v="1053" actId="1076"/>
+      <pc:sldChg chg="addSp delSp modSp add del mod">
+        <pc:chgData name="Katerina Lama" userId="4e8f923e51bc8f8b" providerId="LiveId" clId="{032BFE3C-8ACE-4959-82C8-F4C52BA9C5BE}" dt="2026-01-18T23:53:31.689" v="1290" actId="2696"/>
         <pc:sldMkLst>
           <pc:docMk/>
           <pc:sldMk cId="3802383116" sldId="262"/>
         </pc:sldMkLst>
-        <pc:spChg chg="del mod">
-          <ac:chgData name="Katerina Lama" userId="4e8f923e51bc8f8b" providerId="LiveId" clId="{032BFE3C-8ACE-4959-82C8-F4C52BA9C5BE}" dt="2026-01-11T19:25:52.313" v="1046" actId="21"/>
-          <ac:spMkLst>
-            <pc:docMk/>
-            <pc:sldMk cId="3802383116" sldId="262"/>
-            <ac:spMk id="2" creationId="{771AB182-9EA3-2DF1-1F00-D3809406DEE9}"/>
-          </ac:spMkLst>
-        </pc:spChg>
-        <pc:spChg chg="del mod">
-          <ac:chgData name="Katerina Lama" userId="4e8f923e51bc8f8b" providerId="LiveId" clId="{032BFE3C-8ACE-4959-82C8-F4C52BA9C5BE}" dt="2026-01-10T19:13:58.886" v="550"/>
-          <ac:spMkLst>
-            <pc:docMk/>
-            <pc:sldMk cId="3802383116" sldId="262"/>
-            <ac:spMk id="3" creationId="{0343A205-B8C4-64AA-7134-43A07CEC14D4}"/>
-          </ac:spMkLst>
-        </pc:spChg>
-        <pc:spChg chg="add mod">
-          <ac:chgData name="Katerina Lama" userId="4e8f923e51bc8f8b" providerId="LiveId" clId="{032BFE3C-8ACE-4959-82C8-F4C52BA9C5BE}" dt="2026-01-11T19:26:03.348" v="1050" actId="1076"/>
-          <ac:spMkLst>
-            <pc:docMk/>
-            <pc:sldMk cId="3802383116" sldId="262"/>
-            <ac:spMk id="6" creationId="{8A9DA361-C9F6-6CBB-5453-070E3C6FE2CF}"/>
-          </ac:spMkLst>
-        </pc:spChg>
-        <pc:spChg chg="add del mod">
-          <ac:chgData name="Katerina Lama" userId="4e8f923e51bc8f8b" providerId="LiveId" clId="{032BFE3C-8ACE-4959-82C8-F4C52BA9C5BE}" dt="2026-01-11T19:25:59.733" v="1049" actId="21"/>
-          <ac:spMkLst>
-            <pc:docMk/>
-            <pc:sldMk cId="3802383116" sldId="262"/>
-            <ac:spMk id="8" creationId="{C38FF1C3-E96B-6659-0DAB-3005017E6ED0}"/>
-          </ac:spMkLst>
-        </pc:spChg>
-        <pc:spChg chg="add del mod">
-          <ac:chgData name="Katerina Lama" userId="4e8f923e51bc8f8b" providerId="LiveId" clId="{032BFE3C-8ACE-4959-82C8-F4C52BA9C5BE}" dt="2026-01-11T19:26:09.777" v="1051" actId="21"/>
-          <ac:spMkLst>
-            <pc:docMk/>
-            <pc:sldMk cId="3802383116" sldId="262"/>
-            <ac:spMk id="9" creationId="{771AB182-9EA3-2DF1-1F00-D3809406DEE9}"/>
-          </ac:spMkLst>
-        </pc:spChg>
-        <pc:spChg chg="add mod">
-          <ac:chgData name="Katerina Lama" userId="4e8f923e51bc8f8b" providerId="LiveId" clId="{032BFE3C-8ACE-4959-82C8-F4C52BA9C5BE}" dt="2026-01-11T19:26:17.545" v="1053" actId="1076"/>
-          <ac:spMkLst>
-            <pc:docMk/>
-            <pc:sldMk cId="3802383116" sldId="262"/>
-            <ac:spMk id="10" creationId="{771AB182-9EA3-2DF1-1F00-D3809406DEE9}"/>
-          </ac:spMkLst>
-        </pc:spChg>
-        <pc:picChg chg="add mod">
-          <ac:chgData name="Katerina Lama" userId="4e8f923e51bc8f8b" providerId="LiveId" clId="{032BFE3C-8ACE-4959-82C8-F4C52BA9C5BE}" dt="2026-01-11T18:44:38.809" v="874" actId="1076"/>
-          <ac:picMkLst>
-            <pc:docMk/>
-            <pc:sldMk cId="3802383116" sldId="262"/>
-            <ac:picMk id="5" creationId="{C4587E87-468C-399C-B7AE-91A0692CBE75}"/>
-          </ac:picMkLst>
-        </pc:picChg>
       </pc:sldChg>
-      <pc:sldChg chg="addSp delSp modSp add mod">
-        <pc:chgData name="Katerina Lama" userId="4e8f923e51bc8f8b" providerId="LiveId" clId="{032BFE3C-8ACE-4959-82C8-F4C52BA9C5BE}" dt="2026-01-11T19:27:32.702" v="1064" actId="1076"/>
+      <pc:sldChg chg="addSp delSp modSp add mod setBg">
+        <pc:chgData name="Katerina Lama" userId="4e8f923e51bc8f8b" providerId="LiveId" clId="{032BFE3C-8ACE-4959-82C8-F4C52BA9C5BE}" dt="2026-01-19T00:01:13.477" v="1434" actId="1076"/>
         <pc:sldMkLst>
           <pc:docMk/>
           <pc:sldMk cId="1728812209" sldId="263"/>
         </pc:sldMkLst>
-        <pc:spChg chg="del mod">
-          <ac:chgData name="Katerina Lama" userId="4e8f923e51bc8f8b" providerId="LiveId" clId="{032BFE3C-8ACE-4959-82C8-F4C52BA9C5BE}" dt="2026-01-11T19:27:02.020" v="1054" actId="21"/>
+        <pc:spChg chg="add mod">
+          <ac:chgData name="Katerina Lama" userId="4e8f923e51bc8f8b" providerId="LiveId" clId="{032BFE3C-8ACE-4959-82C8-F4C52BA9C5BE}" dt="2026-01-19T00:01:08.423" v="1433" actId="1076"/>
           <ac:spMkLst>
             <pc:docMk/>
             <pc:sldMk cId="1728812209" sldId="263"/>
-            <ac:spMk id="2" creationId="{43308F0C-D758-9CF2-2345-ECE56D5E482F}"/>
-          </ac:spMkLst>
-        </pc:spChg>
-        <pc:spChg chg="add del mod">
-          <ac:chgData name="Katerina Lama" userId="4e8f923e51bc8f8b" providerId="LiveId" clId="{032BFE3C-8ACE-4959-82C8-F4C52BA9C5BE}" dt="2026-01-11T19:27:09.211" v="1057" actId="21"/>
-          <ac:spMkLst>
-            <pc:docMk/>
-            <pc:sldMk cId="1728812209" sldId="263"/>
-            <ac:spMk id="6" creationId="{9AE6B2C7-55E9-982C-A5D6-726F95DBEC5A}"/>
-          </ac:spMkLst>
-        </pc:spChg>
-        <pc:spChg chg="add del mod">
-          <ac:chgData name="Katerina Lama" userId="4e8f923e51bc8f8b" providerId="LiveId" clId="{032BFE3C-8ACE-4959-82C8-F4C52BA9C5BE}" dt="2026-01-11T19:27:25.707" v="1061" actId="21"/>
-          <ac:spMkLst>
-            <pc:docMk/>
-            <pc:sldMk cId="1728812209" sldId="263"/>
-            <ac:spMk id="7" creationId="{43308F0C-D758-9CF2-2345-ECE56D5E482F}"/>
+            <ac:spMk id="7" creationId="{D4AD9628-BBDD-27CE-49EA-A15972CED90B}"/>
           </ac:spMkLst>
         </pc:spChg>
         <pc:spChg chg="add mod">
-          <ac:chgData name="Katerina Lama" userId="4e8f923e51bc8f8b" providerId="LiveId" clId="{032BFE3C-8ACE-4959-82C8-F4C52BA9C5BE}" dt="2026-01-11T19:27:27.179" v="1062" actId="1076"/>
+          <ac:chgData name="Katerina Lama" userId="4e8f923e51bc8f8b" providerId="LiveId" clId="{032BFE3C-8ACE-4959-82C8-F4C52BA9C5BE}" dt="2026-01-18T23:56:33.040" v="1337" actId="14100"/>
           <ac:spMkLst>
             <pc:docMk/>
             <pc:sldMk cId="1728812209" sldId="263"/>
@@ -808,54 +445,94 @@
           </ac:spMkLst>
         </pc:spChg>
         <pc:spChg chg="add mod">
-          <ac:chgData name="Katerina Lama" userId="4e8f923e51bc8f8b" providerId="LiveId" clId="{032BFE3C-8ACE-4959-82C8-F4C52BA9C5BE}" dt="2026-01-11T19:27:32.702" v="1064" actId="1076"/>
+          <ac:chgData name="Katerina Lama" userId="4e8f923e51bc8f8b" providerId="LiveId" clId="{032BFE3C-8ACE-4959-82C8-F4C52BA9C5BE}" dt="2026-01-18T23:56:26.577" v="1336" actId="1076"/>
           <ac:spMkLst>
             <pc:docMk/>
             <pc:sldMk cId="1728812209" sldId="263"/>
             <ac:spMk id="9" creationId="{43308F0C-D758-9CF2-2345-ECE56D5E482F}"/>
           </ac:spMkLst>
         </pc:spChg>
+        <pc:spChg chg="add mod">
+          <ac:chgData name="Katerina Lama" userId="4e8f923e51bc8f8b" providerId="LiveId" clId="{032BFE3C-8ACE-4959-82C8-F4C52BA9C5BE}" dt="2026-01-19T00:01:13.477" v="1434" actId="1076"/>
+          <ac:spMkLst>
+            <pc:docMk/>
+            <pc:sldMk cId="1728812209" sldId="263"/>
+            <ac:spMk id="12" creationId="{C1E8F734-A652-8A9E-A4BA-EDCA097E66DD}"/>
+          </ac:spMkLst>
+        </pc:spChg>
+        <pc:spChg chg="add mod">
+          <ac:chgData name="Katerina Lama" userId="4e8f923e51bc8f8b" providerId="LiveId" clId="{032BFE3C-8ACE-4959-82C8-F4C52BA9C5BE}" dt="2026-01-19T00:00:38.668" v="1414" actId="20577"/>
+          <ac:spMkLst>
+            <pc:docMk/>
+            <pc:sldMk cId="1728812209" sldId="263"/>
+            <ac:spMk id="13" creationId="{033D2CAD-5551-EEE4-F5BD-23A1BD467C60}"/>
+          </ac:spMkLst>
+        </pc:spChg>
         <pc:picChg chg="add mod">
-          <ac:chgData name="Katerina Lama" userId="4e8f923e51bc8f8b" providerId="LiveId" clId="{032BFE3C-8ACE-4959-82C8-F4C52BA9C5BE}" dt="2026-01-11T19:27:20.487" v="1059" actId="1076"/>
+          <ac:chgData name="Katerina Lama" userId="4e8f923e51bc8f8b" providerId="LiveId" clId="{032BFE3C-8ACE-4959-82C8-F4C52BA9C5BE}" dt="2026-01-18T23:57:54.768" v="1371" actId="1076"/>
+          <ac:picMkLst>
+            <pc:docMk/>
+            <pc:sldMk cId="1728812209" sldId="263"/>
+            <ac:picMk id="3" creationId="{DF4852EA-C147-DFC8-07EF-9E0A937CB2A5}"/>
+          </ac:picMkLst>
+        </pc:picChg>
+        <pc:picChg chg="add del mod">
+          <ac:chgData name="Katerina Lama" userId="4e8f923e51bc8f8b" providerId="LiveId" clId="{032BFE3C-8ACE-4959-82C8-F4C52BA9C5BE}" dt="2026-01-18T23:54:28.005" v="1294" actId="21"/>
           <ac:picMkLst>
             <pc:docMk/>
             <pc:sldMk cId="1728812209" sldId="263"/>
             <ac:picMk id="4" creationId="{994A7B08-E29C-C959-51BD-A0A80AECFC8C}"/>
           </ac:picMkLst>
         </pc:picChg>
+        <pc:picChg chg="add mod">
+          <ac:chgData name="Katerina Lama" userId="4e8f923e51bc8f8b" providerId="LiveId" clId="{032BFE3C-8ACE-4959-82C8-F4C52BA9C5BE}" dt="2026-01-18T23:58:46.298" v="1385" actId="1076"/>
+          <ac:picMkLst>
+            <pc:docMk/>
+            <pc:sldMk cId="1728812209" sldId="263"/>
+            <ac:picMk id="6" creationId="{BB5986CF-3AE8-7292-6B02-D985D631D9FB}"/>
+          </ac:picMkLst>
+        </pc:picChg>
+        <pc:picChg chg="add del">
+          <ac:chgData name="Katerina Lama" userId="4e8f923e51bc8f8b" providerId="LiveId" clId="{032BFE3C-8ACE-4959-82C8-F4C52BA9C5BE}" dt="2026-01-18T23:56:56.087" v="1343" actId="22"/>
+          <ac:picMkLst>
+            <pc:docMk/>
+            <pc:sldMk cId="1728812209" sldId="263"/>
+            <ac:picMk id="11" creationId="{99967F87-A73D-A395-2352-EFAB7041E5EF}"/>
+          </ac:picMkLst>
+        </pc:picChg>
+        <pc:picChg chg="add mod">
+          <ac:chgData name="Katerina Lama" userId="4e8f923e51bc8f8b" providerId="LiveId" clId="{032BFE3C-8ACE-4959-82C8-F4C52BA9C5BE}" dt="2026-01-19T00:00:55.188" v="1427" actId="14100"/>
+          <ac:picMkLst>
+            <pc:docMk/>
+            <pc:sldMk cId="1728812209" sldId="263"/>
+            <ac:picMk id="15" creationId="{FA8BD5EE-D96E-D85D-B057-C36780144D0C}"/>
+          </ac:picMkLst>
+        </pc:picChg>
+        <pc:picChg chg="add mod">
+          <ac:chgData name="Katerina Lama" userId="4e8f923e51bc8f8b" providerId="LiveId" clId="{032BFE3C-8ACE-4959-82C8-F4C52BA9C5BE}" dt="2026-01-19T00:01:04.467" v="1432" actId="1076"/>
+          <ac:picMkLst>
+            <pc:docMk/>
+            <pc:sldMk cId="1728812209" sldId="263"/>
+            <ac:picMk id="17" creationId="{B7738741-3E61-72D5-63D6-4A796C37AA4E}"/>
+          </ac:picMkLst>
+        </pc:picChg>
       </pc:sldChg>
-      <pc:sldChg chg="addSp delSp modSp add mod">
-        <pc:chgData name="Katerina Lama" userId="4e8f923e51bc8f8b" providerId="LiveId" clId="{032BFE3C-8ACE-4959-82C8-F4C52BA9C5BE}" dt="2026-01-11T19:24:48.162" v="1039" actId="1076"/>
+      <pc:sldChg chg="addSp delSp modSp add mod setBg">
+        <pc:chgData name="Katerina Lama" userId="4e8f923e51bc8f8b" providerId="LiveId" clId="{032BFE3C-8ACE-4959-82C8-F4C52BA9C5BE}" dt="2026-01-18T23:53:02.554" v="1286" actId="207"/>
         <pc:sldMkLst>
           <pc:docMk/>
           <pc:sldMk cId="2283698882" sldId="264"/>
         </pc:sldMkLst>
-        <pc:spChg chg="del mod">
-          <ac:chgData name="Katerina Lama" userId="4e8f923e51bc8f8b" providerId="LiveId" clId="{032BFE3C-8ACE-4959-82C8-F4C52BA9C5BE}" dt="2026-01-11T19:24:27.952" v="1034" actId="21"/>
-          <ac:spMkLst>
-            <pc:docMk/>
-            <pc:sldMk cId="2283698882" sldId="264"/>
-            <ac:spMk id="2" creationId="{CBC6C360-28FF-C49A-2943-A70EAB38AA22}"/>
-          </ac:spMkLst>
-        </pc:spChg>
         <pc:spChg chg="add del mod">
-          <ac:chgData name="Katerina Lama" userId="4e8f923e51bc8f8b" providerId="LiveId" clId="{032BFE3C-8ACE-4959-82C8-F4C52BA9C5BE}" dt="2026-01-11T19:24:38.540" v="1037" actId="21"/>
+          <ac:chgData name="Katerina Lama" userId="4e8f923e51bc8f8b" providerId="LiveId" clId="{032BFE3C-8ACE-4959-82C8-F4C52BA9C5BE}" dt="2026-01-18T23:52:58.064" v="1285" actId="207"/>
           <ac:spMkLst>
             <pc:docMk/>
             <pc:sldMk cId="2283698882" sldId="264"/>
             <ac:spMk id="7" creationId="{6BF634E4-004D-D31D-DEC6-200CEF163CFF}"/>
           </ac:spMkLst>
         </pc:spChg>
-        <pc:spChg chg="add del mod">
-          <ac:chgData name="Katerina Lama" userId="4e8f923e51bc8f8b" providerId="LiveId" clId="{032BFE3C-8ACE-4959-82C8-F4C52BA9C5BE}" dt="2026-01-11T19:24:42.367" v="1038" actId="21"/>
-          <ac:spMkLst>
-            <pc:docMk/>
-            <pc:sldMk cId="2283698882" sldId="264"/>
-            <ac:spMk id="10" creationId="{E10D7B0F-56D6-3393-DD43-98A064F124DE}"/>
-          </ac:spMkLst>
-        </pc:spChg>
         <pc:spChg chg="add mod">
-          <ac:chgData name="Katerina Lama" userId="4e8f923e51bc8f8b" providerId="LiveId" clId="{032BFE3C-8ACE-4959-82C8-F4C52BA9C5BE}" dt="2026-01-11T19:24:48.162" v="1039" actId="1076"/>
+          <ac:chgData name="Katerina Lama" userId="4e8f923e51bc8f8b" providerId="LiveId" clId="{032BFE3C-8ACE-4959-82C8-F4C52BA9C5BE}" dt="2026-01-18T23:53:02.554" v="1286" actId="207"/>
           <ac:spMkLst>
             <pc:docMk/>
             <pc:sldMk cId="2283698882" sldId="264"/>
@@ -878,47 +555,15 @@
             <ac:picMk id="6" creationId="{DE471585-1492-A94E-3995-64E513D4D7F8}"/>
           </ac:picMkLst>
         </pc:picChg>
-        <pc:picChg chg="del">
-          <ac:chgData name="Katerina Lama" userId="4e8f923e51bc8f8b" providerId="LiveId" clId="{032BFE3C-8ACE-4959-82C8-F4C52BA9C5BE}" dt="2026-01-11T18:34:56.461" v="778" actId="478"/>
-          <ac:picMkLst>
-            <pc:docMk/>
-            <pc:sldMk cId="2283698882" sldId="264"/>
-            <ac:picMk id="8" creationId="{DEEEFC38-F712-E0B0-711C-2251465EE439}"/>
-          </ac:picMkLst>
-        </pc:picChg>
-        <pc:picChg chg="del">
-          <ac:chgData name="Katerina Lama" userId="4e8f923e51bc8f8b" providerId="LiveId" clId="{032BFE3C-8ACE-4959-82C8-F4C52BA9C5BE}" dt="2026-01-11T18:34:54.668" v="777" actId="478"/>
-          <ac:picMkLst>
-            <pc:docMk/>
-            <pc:sldMk cId="2283698882" sldId="264"/>
-            <ac:picMk id="11" creationId="{30EB8AB0-8C28-A8CC-E80A-680CDA0F8684}"/>
-          </ac:picMkLst>
-        </pc:picChg>
       </pc:sldChg>
-      <pc:sldChg chg="addSp delSp modSp add mod">
-        <pc:chgData name="Katerina Lama" userId="4e8f923e51bc8f8b" providerId="LiveId" clId="{032BFE3C-8ACE-4959-82C8-F4C52BA9C5BE}" dt="2026-01-11T19:25:24.832" v="1043"/>
+      <pc:sldChg chg="addSp delSp modSp add mod setBg">
+        <pc:chgData name="Katerina Lama" userId="4e8f923e51bc8f8b" providerId="LiveId" clId="{032BFE3C-8ACE-4959-82C8-F4C52BA9C5BE}" dt="2026-01-18T23:53:20.084" v="1289"/>
         <pc:sldMkLst>
           <pc:docMk/>
           <pc:sldMk cId="570824870" sldId="265"/>
         </pc:sldMkLst>
-        <pc:spChg chg="del">
-          <ac:chgData name="Katerina Lama" userId="4e8f923e51bc8f8b" providerId="LiveId" clId="{032BFE3C-8ACE-4959-82C8-F4C52BA9C5BE}" dt="2026-01-11T19:25:03.527" v="1040" actId="21"/>
-          <ac:spMkLst>
-            <pc:docMk/>
-            <pc:sldMk cId="570824870" sldId="265"/>
-            <ac:spMk id="2" creationId="{EF7B6DDE-3F77-FB21-6786-9E11DF86B15E}"/>
-          </ac:spMkLst>
-        </pc:spChg>
-        <pc:spChg chg="add del mod">
-          <ac:chgData name="Katerina Lama" userId="4e8f923e51bc8f8b" providerId="LiveId" clId="{032BFE3C-8ACE-4959-82C8-F4C52BA9C5BE}" dt="2026-01-11T19:25:06.249" v="1041" actId="21"/>
-          <ac:spMkLst>
-            <pc:docMk/>
-            <pc:sldMk cId="570824870" sldId="265"/>
-            <ac:spMk id="10" creationId="{22DE4BA5-AE25-2378-E3E7-229151A27439}"/>
-          </ac:spMkLst>
-        </pc:spChg>
         <pc:spChg chg="add mod">
-          <ac:chgData name="Katerina Lama" userId="4e8f923e51bc8f8b" providerId="LiveId" clId="{032BFE3C-8ACE-4959-82C8-F4C52BA9C5BE}" dt="2026-01-11T19:25:15.734" v="1042"/>
+          <ac:chgData name="Katerina Lama" userId="4e8f923e51bc8f8b" providerId="LiveId" clId="{032BFE3C-8ACE-4959-82C8-F4C52BA9C5BE}" dt="2026-01-18T23:53:12.291" v="1287" actId="207"/>
           <ac:spMkLst>
             <pc:docMk/>
             <pc:sldMk cId="570824870" sldId="265"/>
@@ -926,35 +571,19 @@
           </ac:spMkLst>
         </pc:spChg>
         <pc:spChg chg="add mod">
-          <ac:chgData name="Katerina Lama" userId="4e8f923e51bc8f8b" providerId="LiveId" clId="{032BFE3C-8ACE-4959-82C8-F4C52BA9C5BE}" dt="2026-01-11T19:25:24.832" v="1043"/>
+          <ac:chgData name="Katerina Lama" userId="4e8f923e51bc8f8b" providerId="LiveId" clId="{032BFE3C-8ACE-4959-82C8-F4C52BA9C5BE}" dt="2026-01-18T23:53:16.129" v="1288" actId="207"/>
           <ac:spMkLst>
             <pc:docMk/>
             <pc:sldMk cId="570824870" sldId="265"/>
             <ac:spMk id="12" creationId="{883FCA97-BA38-450D-0C96-900457FEEB82}"/>
           </ac:spMkLst>
         </pc:spChg>
-        <pc:picChg chg="del">
-          <ac:chgData name="Katerina Lama" userId="4e8f923e51bc8f8b" providerId="LiveId" clId="{032BFE3C-8ACE-4959-82C8-F4C52BA9C5BE}" dt="2026-01-11T18:40:19.320" v="828" actId="478"/>
-          <ac:picMkLst>
-            <pc:docMk/>
-            <pc:sldMk cId="570824870" sldId="265"/>
-            <ac:picMk id="4" creationId="{B015C854-B16D-8865-C710-E52B8AE30F1E}"/>
-          </ac:picMkLst>
-        </pc:picChg>
         <pc:picChg chg="add mod">
           <ac:chgData name="Katerina Lama" userId="4e8f923e51bc8f8b" providerId="LiveId" clId="{032BFE3C-8ACE-4959-82C8-F4C52BA9C5BE}" dt="2026-01-11T18:43:01.705" v="844" actId="14100"/>
           <ac:picMkLst>
             <pc:docMk/>
             <pc:sldMk cId="570824870" sldId="265"/>
             <ac:picMk id="5" creationId="{B4EB30AB-103C-D2F6-0ECA-E1379EC18AC2}"/>
-          </ac:picMkLst>
-        </pc:picChg>
-        <pc:picChg chg="del">
-          <ac:chgData name="Katerina Lama" userId="4e8f923e51bc8f8b" providerId="LiveId" clId="{032BFE3C-8ACE-4959-82C8-F4C52BA9C5BE}" dt="2026-01-11T18:40:21.633" v="829" actId="478"/>
-          <ac:picMkLst>
-            <pc:docMk/>
-            <pc:sldMk cId="570824870" sldId="265"/>
-            <ac:picMk id="6" creationId="{FDBA822B-AA2F-68AD-13B6-9EA4E9B6C164}"/>
           </ac:picMkLst>
         </pc:picChg>
         <pc:picChg chg="add mod">
@@ -967,35 +596,11 @@
         </pc:picChg>
       </pc:sldChg>
       <pc:sldChg chg="addSp delSp modSp new mod setBg">
-        <pc:chgData name="Katerina Lama" userId="4e8f923e51bc8f8b" providerId="LiveId" clId="{032BFE3C-8ACE-4959-82C8-F4C52BA9C5BE}" dt="2026-01-11T19:09:05.685" v="911" actId="1076"/>
+        <pc:chgData name="Katerina Lama" userId="4e8f923e51bc8f8b" providerId="LiveId" clId="{032BFE3C-8ACE-4959-82C8-F4C52BA9C5BE}" dt="2026-01-19T00:01:22.295" v="1435"/>
         <pc:sldMkLst>
           <pc:docMk/>
           <pc:sldMk cId="607198187" sldId="266"/>
         </pc:sldMkLst>
-        <pc:spChg chg="del">
-          <ac:chgData name="Katerina Lama" userId="4e8f923e51bc8f8b" providerId="LiveId" clId="{032BFE3C-8ACE-4959-82C8-F4C52BA9C5BE}" dt="2026-01-11T19:02:01.425" v="895" actId="21"/>
-          <ac:spMkLst>
-            <pc:docMk/>
-            <pc:sldMk cId="607198187" sldId="266"/>
-            <ac:spMk id="2" creationId="{2B28903E-935E-46AE-2438-5BE3CA996F44}"/>
-          </ac:spMkLst>
-        </pc:spChg>
-        <pc:spChg chg="del">
-          <ac:chgData name="Katerina Lama" userId="4e8f923e51bc8f8b" providerId="LiveId" clId="{032BFE3C-8ACE-4959-82C8-F4C52BA9C5BE}" dt="2026-01-11T19:01:40.051" v="892"/>
-          <ac:spMkLst>
-            <pc:docMk/>
-            <pc:sldMk cId="607198187" sldId="266"/>
-            <ac:spMk id="3" creationId="{442404A3-F050-5808-A6B4-64F5FF5A838B}"/>
-          </ac:spMkLst>
-        </pc:spChg>
-        <pc:spChg chg="add del mod">
-          <ac:chgData name="Katerina Lama" userId="4e8f923e51bc8f8b" providerId="LiveId" clId="{032BFE3C-8ACE-4959-82C8-F4C52BA9C5BE}" dt="2026-01-11T19:01:45.709" v="893" actId="21"/>
-          <ac:spMkLst>
-            <pc:docMk/>
-            <pc:sldMk cId="607198187" sldId="266"/>
-            <ac:spMk id="4" creationId="{3CB5D208-0B98-B4F4-83FE-2685370CEBFB}"/>
-          </ac:spMkLst>
-        </pc:spChg>
         <pc:picChg chg="add mod">
           <ac:chgData name="Katerina Lama" userId="4e8f923e51bc8f8b" providerId="LiveId" clId="{032BFE3C-8ACE-4959-82C8-F4C52BA9C5BE}" dt="2026-01-11T19:09:05.685" v="911" actId="1076"/>
           <ac:picMkLst>
@@ -1092,7 +697,7 @@
           <a:p>
             <a:fld id="{50F0266D-10A3-4C81-A48C-04AEE43CF0B8}" type="datetimeFigureOut">
               <a:rPr lang="en-US" smtClean="0"/>
-              <a:t>1/10/2026</a:t>
+              <a:t>1/19/2026</a:t>
             </a:fld>
             <a:endParaRPr lang="en-US"/>
           </a:p>
@@ -1506,7 +1111,7 @@
           <a:p>
             <a:fld id="{D4ED692D-2067-4D16-ADA0-2C731CBB6F5D}" type="datetimeFigureOut">
               <a:rPr lang="en-US" smtClean="0"/>
-              <a:t>1/10/2026</a:t>
+              <a:t>1/19/2026</a:t>
             </a:fld>
             <a:endParaRPr lang="en-US"/>
           </a:p>
@@ -1704,7 +1309,7 @@
           <a:p>
             <a:fld id="{D4ED692D-2067-4D16-ADA0-2C731CBB6F5D}" type="datetimeFigureOut">
               <a:rPr lang="en-US" smtClean="0"/>
-              <a:t>1/10/2026</a:t>
+              <a:t>1/19/2026</a:t>
             </a:fld>
             <a:endParaRPr lang="en-US"/>
           </a:p>
@@ -1912,7 +1517,7 @@
           <a:p>
             <a:fld id="{D4ED692D-2067-4D16-ADA0-2C731CBB6F5D}" type="datetimeFigureOut">
               <a:rPr lang="en-US" smtClean="0"/>
-              <a:t>1/10/2026</a:t>
+              <a:t>1/19/2026</a:t>
             </a:fld>
             <a:endParaRPr lang="en-US"/>
           </a:p>
@@ -2110,7 +1715,7 @@
           <a:p>
             <a:fld id="{D4ED692D-2067-4D16-ADA0-2C731CBB6F5D}" type="datetimeFigureOut">
               <a:rPr lang="en-US" smtClean="0"/>
-              <a:t>1/10/2026</a:t>
+              <a:t>1/19/2026</a:t>
             </a:fld>
             <a:endParaRPr lang="en-US"/>
           </a:p>
@@ -2385,7 +1990,7 @@
           <a:p>
             <a:fld id="{D4ED692D-2067-4D16-ADA0-2C731CBB6F5D}" type="datetimeFigureOut">
               <a:rPr lang="en-US" smtClean="0"/>
-              <a:t>1/10/2026</a:t>
+              <a:t>1/19/2026</a:t>
             </a:fld>
             <a:endParaRPr lang="en-US"/>
           </a:p>
@@ -2650,7 +2255,7 @@
           <a:p>
             <a:fld id="{D4ED692D-2067-4D16-ADA0-2C731CBB6F5D}" type="datetimeFigureOut">
               <a:rPr lang="en-US" smtClean="0"/>
-              <a:t>1/10/2026</a:t>
+              <a:t>1/19/2026</a:t>
             </a:fld>
             <a:endParaRPr lang="en-US"/>
           </a:p>
@@ -3062,7 +2667,7 @@
           <a:p>
             <a:fld id="{D4ED692D-2067-4D16-ADA0-2C731CBB6F5D}" type="datetimeFigureOut">
               <a:rPr lang="en-US" smtClean="0"/>
-              <a:t>1/10/2026</a:t>
+              <a:t>1/19/2026</a:t>
             </a:fld>
             <a:endParaRPr lang="en-US"/>
           </a:p>
@@ -3203,7 +2808,7 @@
           <a:p>
             <a:fld id="{D4ED692D-2067-4D16-ADA0-2C731CBB6F5D}" type="datetimeFigureOut">
               <a:rPr lang="en-US" smtClean="0"/>
-              <a:t>1/10/2026</a:t>
+              <a:t>1/19/2026</a:t>
             </a:fld>
             <a:endParaRPr lang="en-US"/>
           </a:p>
@@ -3316,7 +2921,7 @@
           <a:p>
             <a:fld id="{D4ED692D-2067-4D16-ADA0-2C731CBB6F5D}" type="datetimeFigureOut">
               <a:rPr lang="en-US" smtClean="0"/>
-              <a:t>1/10/2026</a:t>
+              <a:t>1/19/2026</a:t>
             </a:fld>
             <a:endParaRPr lang="en-US"/>
           </a:p>
@@ -3627,7 +3232,7 @@
           <a:p>
             <a:fld id="{D4ED692D-2067-4D16-ADA0-2C731CBB6F5D}" type="datetimeFigureOut">
               <a:rPr lang="en-US" smtClean="0"/>
-              <a:t>1/10/2026</a:t>
+              <a:t>1/19/2026</a:t>
             </a:fld>
             <a:endParaRPr lang="en-US"/>
           </a:p>
@@ -3915,7 +3520,7 @@
           <a:p>
             <a:fld id="{D4ED692D-2067-4D16-ADA0-2C731CBB6F5D}" type="datetimeFigureOut">
               <a:rPr lang="en-US" smtClean="0"/>
-              <a:t>1/10/2026</a:t>
+              <a:t>1/19/2026</a:t>
             </a:fld>
             <a:endParaRPr lang="en-US"/>
           </a:p>
@@ -4156,7 +3761,7 @@
           <a:p>
             <a:fld id="{D4ED692D-2067-4D16-ADA0-2C731CBB6F5D}" type="datetimeFigureOut">
               <a:rPr lang="en-US" smtClean="0"/>
-              <a:t>1/10/2026</a:t>
+              <a:t>1/19/2026</a:t>
             </a:fld>
             <a:endParaRPr lang="en-US"/>
           </a:p>
@@ -4562,9 +4167,9 @@
     <p:bg>
       <p:bgPr>
         <a:solidFill>
-          <a:schemeClr val="accent6">
-            <a:lumMod val="20000"/>
-            <a:lumOff val="80000"/>
+          <a:schemeClr val="tx2">
+            <a:lumMod val="10000"/>
+            <a:lumOff val="90000"/>
           </a:schemeClr>
         </a:solidFill>
         <a:effectLst/>
@@ -4636,10 +4241,7 @@
             <a:avLst/>
           </a:prstGeom>
           <a:solidFill>
-            <a:schemeClr val="accent3">
-              <a:lumMod val="60000"/>
-              <a:lumOff val="40000"/>
-            </a:schemeClr>
+            <a:srgbClr val="0070C0"/>
           </a:solidFill>
         </p:spPr>
         <p:style>
@@ -4697,6 +4299,9 @@
           <a:p>
             <a:r>
               <a:rPr lang="en-US" sz="4000" b="1" dirty="0">
+                <a:solidFill>
+                  <a:schemeClr val="bg1"/>
+                </a:solidFill>
                 <a:latin typeface="Arial" panose="020B0604020202020204" pitchFamily="34" charset="0"/>
                 <a:cs typeface="Arial" panose="020B0604020202020204" pitchFamily="34" charset="0"/>
               </a:rPr>
@@ -4704,18 +4309,27 @@
             </a:r>
             <a:br>
               <a:rPr lang="en-US" sz="4000" b="1" dirty="0">
+                <a:solidFill>
+                  <a:schemeClr val="bg1"/>
+                </a:solidFill>
                 <a:latin typeface="Arial" panose="020B0604020202020204" pitchFamily="34" charset="0"/>
                 <a:cs typeface="Arial" panose="020B0604020202020204" pitchFamily="34" charset="0"/>
               </a:rPr>
             </a:br>
             <a:br>
               <a:rPr lang="en-US" sz="2200" b="1" dirty="0">
+                <a:solidFill>
+                  <a:schemeClr val="bg1"/>
+                </a:solidFill>
                 <a:latin typeface="Arial" panose="020B0604020202020204" pitchFamily="34" charset="0"/>
                 <a:cs typeface="Arial" panose="020B0604020202020204" pitchFamily="34" charset="0"/>
               </a:rPr>
             </a:br>
             <a:r>
               <a:rPr lang="en-US" sz="2200" b="1" dirty="0">
+                <a:solidFill>
+                  <a:schemeClr val="bg1"/>
+                </a:solidFill>
                 <a:latin typeface="Arial" panose="020B0604020202020204" pitchFamily="34" charset="0"/>
                 <a:cs typeface="Arial" panose="020B0604020202020204" pitchFamily="34" charset="0"/>
               </a:rPr>
@@ -4723,12 +4337,18 @@
             </a:r>
             <a:br>
               <a:rPr lang="en-US" sz="2200" b="1" dirty="0">
+                <a:solidFill>
+                  <a:schemeClr val="bg1"/>
+                </a:solidFill>
                 <a:latin typeface="Arial" panose="020B0604020202020204" pitchFamily="34" charset="0"/>
                 <a:cs typeface="Arial" panose="020B0604020202020204" pitchFamily="34" charset="0"/>
               </a:rPr>
             </a:br>
             <a:r>
               <a:rPr lang="en-US" sz="2200" b="1" dirty="0">
+                <a:solidFill>
+                  <a:schemeClr val="bg1"/>
+                </a:solidFill>
                 <a:latin typeface="Arial" panose="020B0604020202020204" pitchFamily="34" charset="0"/>
                 <a:cs typeface="Arial" panose="020B0604020202020204" pitchFamily="34" charset="0"/>
               </a:rPr>
@@ -4736,12 +4356,18 @@
             </a:r>
             <a:br>
               <a:rPr lang="en-US" sz="2200" b="1" dirty="0">
+                <a:solidFill>
+                  <a:schemeClr val="bg1"/>
+                </a:solidFill>
                 <a:latin typeface="Arial" panose="020B0604020202020204" pitchFamily="34" charset="0"/>
                 <a:cs typeface="Arial" panose="020B0604020202020204" pitchFamily="34" charset="0"/>
               </a:rPr>
             </a:br>
             <a:r>
               <a:rPr lang="en-US" sz="2200" b="1" dirty="0">
+                <a:solidFill>
+                  <a:schemeClr val="bg1"/>
+                </a:solidFill>
                 <a:latin typeface="Arial" panose="020B0604020202020204" pitchFamily="34" charset="0"/>
                 <a:cs typeface="Arial" panose="020B0604020202020204" pitchFamily="34" charset="0"/>
               </a:rPr>
@@ -4779,196 +4405,9 @@
     <p:bg>
       <p:bgPr>
         <a:solidFill>
-          <a:schemeClr val="accent6">
-            <a:lumMod val="20000"/>
-            <a:lumOff val="80000"/>
-          </a:schemeClr>
-        </a:solidFill>
-        <a:effectLst/>
-      </p:bgPr>
-    </p:bg>
-    <p:spTree>
-      <p:nvGrpSpPr>
-        <p:cNvPr id="1" name="">
-          <a:extLst>
-            <a:ext uri="{FF2B5EF4-FFF2-40B4-BE49-F238E27FC236}">
-              <a16:creationId xmlns:a16="http://schemas.microsoft.com/office/drawing/2014/main" id="{5F23FE6E-0030-9FE2-A3CD-A72BBFC11361}"/>
-            </a:ext>
-          </a:extLst>
-        </p:cNvPr>
-        <p:cNvGrpSpPr/>
-        <p:nvPr/>
-      </p:nvGrpSpPr>
-      <p:grpSpPr>
-        <a:xfrm>
-          <a:off x="0" y="0"/>
-          <a:ext cx="0" cy="0"/>
-          <a:chOff x="0" y="0"/>
-          <a:chExt cx="0" cy="0"/>
-        </a:xfrm>
-      </p:grpSpPr>
-      <p:pic>
-        <p:nvPicPr>
-          <p:cNvPr id="4" name="Picture 3">
-            <a:extLst>
-              <a:ext uri="{FF2B5EF4-FFF2-40B4-BE49-F238E27FC236}">
-                <a16:creationId xmlns:a16="http://schemas.microsoft.com/office/drawing/2014/main" id="{994A7B08-E29C-C959-51BD-A0A80AECFC8C}"/>
-              </a:ext>
-            </a:extLst>
-          </p:cNvPr>
-          <p:cNvPicPr>
-            <a:picLocks noChangeAspect="1"/>
-          </p:cNvPicPr>
-          <p:nvPr/>
-        </p:nvPicPr>
-        <p:blipFill>
-          <a:blip r:embed="rId2"/>
-          <a:stretch>
-            <a:fillRect/>
-          </a:stretch>
-        </p:blipFill>
-        <p:spPr>
-          <a:xfrm>
-            <a:off x="2668024" y="1630114"/>
-            <a:ext cx="6729632" cy="3931920"/>
-          </a:xfrm>
-          <a:prstGeom prst="rect">
-            <a:avLst/>
-          </a:prstGeom>
-        </p:spPr>
-      </p:pic>
-      <p:sp>
-        <p:nvSpPr>
-          <p:cNvPr id="8" name="Rectangle 7">
-            <a:extLst>
-              <a:ext uri="{FF2B5EF4-FFF2-40B4-BE49-F238E27FC236}">
-                <a16:creationId xmlns:a16="http://schemas.microsoft.com/office/drawing/2014/main" id="{FA1E5721-6CBB-E173-8EF9-8F5BCBF0E741}"/>
-              </a:ext>
-            </a:extLst>
-          </p:cNvPr>
-          <p:cNvSpPr/>
-          <p:nvPr/>
-        </p:nvSpPr>
-        <p:spPr>
-          <a:xfrm>
-            <a:off x="355940" y="358994"/>
-            <a:ext cx="11353800" cy="771944"/>
-          </a:xfrm>
-          <a:prstGeom prst="rect">
-            <a:avLst/>
-          </a:prstGeom>
-          <a:solidFill>
-            <a:schemeClr val="accent3">
-              <a:lumMod val="60000"/>
-              <a:lumOff val="40000"/>
-            </a:schemeClr>
-          </a:solidFill>
-        </p:spPr>
-        <p:style>
-          <a:lnRef idx="2">
-            <a:schemeClr val="accent1">
-              <a:shade val="15000"/>
-            </a:schemeClr>
-          </a:lnRef>
-          <a:fillRef idx="1">
-            <a:schemeClr val="accent1"/>
-          </a:fillRef>
-          <a:effectRef idx="0">
-            <a:schemeClr val="accent1"/>
-          </a:effectRef>
-          <a:fontRef idx="minor">
-            <a:schemeClr val="lt1"/>
-          </a:fontRef>
-        </p:style>
-        <p:txBody>
-          <a:bodyPr rtlCol="0" anchor="ctr"/>
-          <a:lstStyle/>
-          <a:p>
-            <a:pPr algn="ctr"/>
-            <a:endParaRPr lang="en-US"/>
-          </a:p>
-        </p:txBody>
-      </p:sp>
-      <p:sp>
-        <p:nvSpPr>
-          <p:cNvPr id="9" name="Title 1">
-            <a:extLst>
-              <a:ext uri="{FF2B5EF4-FFF2-40B4-BE49-F238E27FC236}">
-                <a16:creationId xmlns:a16="http://schemas.microsoft.com/office/drawing/2014/main" id="{43308F0C-D758-9CF2-2345-ECE56D5E482F}"/>
-              </a:ext>
-            </a:extLst>
-          </p:cNvPr>
-          <p:cNvSpPr txBox="1">
-            <a:spLocks/>
-          </p:cNvSpPr>
-          <p:nvPr/>
-        </p:nvSpPr>
-        <p:spPr>
-          <a:xfrm>
-            <a:off x="932975" y="82184"/>
-            <a:ext cx="10903085" cy="1325563"/>
-          </a:xfrm>
-          <a:prstGeom prst="rect">
-            <a:avLst/>
-          </a:prstGeom>
-        </p:spPr>
-        <p:txBody>
-          <a:bodyPr vert="horz" lIns="91440" tIns="45720" rIns="91440" bIns="45720" rtlCol="0" anchor="ctr">
-            <a:normAutofit/>
-          </a:bodyPr>
-          <a:lstStyle>
-            <a:lvl1pPr algn="l" defTabSz="914400" rtl="0" eaLnBrk="1" latinLnBrk="0" hangingPunct="1">
-              <a:lnSpc>
-                <a:spcPct val="90000"/>
-              </a:lnSpc>
-              <a:spcBef>
-                <a:spcPct val="0"/>
-              </a:spcBef>
-              <a:buNone/>
-              <a:defRPr sz="4400" kern="1200">
-                <a:solidFill>
-                  <a:schemeClr val="tx1"/>
-                </a:solidFill>
-                <a:latin typeface="+mj-lt"/>
-                <a:ea typeface="+mj-ea"/>
-                <a:cs typeface="+mj-cs"/>
-              </a:defRPr>
-            </a:lvl1pPr>
-          </a:lstStyle>
-          <a:p>
-            <a:pPr fontAlgn="base"/>
-            <a:r>
-              <a:rPr lang="en-US" sz="2400" b="1" dirty="0">
-                <a:latin typeface="Arial" panose="020B0604020202020204" pitchFamily="34" charset="0"/>
-                <a:cs typeface="Arial" panose="020B0604020202020204" pitchFamily="34" charset="0"/>
-              </a:rPr>
-              <a:t>Carbon Footprint Comparison of High Protein vs Low Protein Foods?</a:t>
-            </a:r>
-          </a:p>
-        </p:txBody>
-      </p:sp>
-    </p:spTree>
-    <p:extLst>
-      <p:ext uri="{BB962C8B-B14F-4D97-AF65-F5344CB8AC3E}">
-        <p14:creationId xmlns:p14="http://schemas.microsoft.com/office/powerpoint/2010/main" val="1728812209"/>
-      </p:ext>
-    </p:extLst>
-  </p:cSld>
-  <p:clrMapOvr>
-    <a:masterClrMapping/>
-  </p:clrMapOvr>
-</p:sld>
-</file>
-
-<file path=ppt/slides/slide11.xml><?xml version="1.0" encoding="utf-8"?>
-<p:sld xmlns:a="http://schemas.openxmlformats.org/drawingml/2006/main" xmlns:r="http://schemas.openxmlformats.org/officeDocument/2006/relationships" xmlns:p="http://schemas.openxmlformats.org/presentationml/2006/main">
-  <p:cSld>
-    <p:bg>
-      <p:bgPr>
-        <a:solidFill>
-          <a:schemeClr val="accent6">
-            <a:lumMod val="20000"/>
-            <a:lumOff val="80000"/>
+          <a:schemeClr val="tx2">
+            <a:lumMod val="10000"/>
+            <a:lumOff val="90000"/>
           </a:schemeClr>
         </a:solidFill>
         <a:effectLst/>
@@ -5037,9 +4476,9 @@
     <p:bg>
       <p:bgPr>
         <a:solidFill>
-          <a:schemeClr val="accent6">
-            <a:lumMod val="20000"/>
-            <a:lumOff val="80000"/>
+          <a:schemeClr val="tx2">
+            <a:lumMod val="10000"/>
+            <a:lumOff val="90000"/>
           </a:schemeClr>
         </a:solidFill>
         <a:effectLst/>
@@ -5178,17 +4617,14 @@
         </p:nvSpPr>
         <p:spPr>
           <a:xfrm>
-            <a:off x="381001" y="783771"/>
+            <a:off x="413655" y="812954"/>
             <a:ext cx="4974772" cy="3526971"/>
           </a:xfrm>
           <a:prstGeom prst="rect">
             <a:avLst/>
           </a:prstGeom>
           <a:solidFill>
-            <a:schemeClr val="accent3">
-              <a:lumMod val="60000"/>
-              <a:lumOff val="40000"/>
-            </a:schemeClr>
+            <a:srgbClr val="0070C0"/>
           </a:solidFill>
         </p:spPr>
         <p:style>
@@ -5292,9 +4728,9 @@
     <p:bg>
       <p:bgPr>
         <a:solidFill>
-          <a:schemeClr val="accent6">
-            <a:lumMod val="20000"/>
-            <a:lumOff val="80000"/>
+          <a:schemeClr val="tx2">
+            <a:lumMod val="10000"/>
+            <a:lumOff val="90000"/>
           </a:schemeClr>
         </a:solidFill>
         <a:effectLst/>
@@ -5334,8 +4770,8 @@
         </p:nvSpPr>
         <p:spPr>
           <a:xfrm>
-            <a:off x="2144486" y="1466417"/>
-            <a:ext cx="9443936" cy="400110"/>
+            <a:off x="2582231" y="1040917"/>
+            <a:ext cx="9443936" cy="369332"/>
           </a:xfrm>
           <a:prstGeom prst="rect">
             <a:avLst/>
@@ -5349,42 +4785,15 @@
           <a:lstStyle/>
           <a:p>
             <a:r>
-              <a:rPr lang="en-US" sz="2000" dirty="0"/>
+              <a:rPr lang="en-US" dirty="0">
+                <a:latin typeface="Arial" panose="020B0604020202020204" pitchFamily="34" charset="0"/>
+                <a:cs typeface="Arial" panose="020B0604020202020204" pitchFamily="34" charset="0"/>
+              </a:rPr>
               <a:t>Which types of food have more negative impact on the environment?</a:t>
             </a:r>
           </a:p>
         </p:txBody>
       </p:sp>
-      <p:pic>
-        <p:nvPicPr>
-          <p:cNvPr id="6" name="Picture 5">
-            <a:extLst>
-              <a:ext uri="{FF2B5EF4-FFF2-40B4-BE49-F238E27FC236}">
-                <a16:creationId xmlns:a16="http://schemas.microsoft.com/office/drawing/2014/main" id="{458F3357-A8AF-19F3-E951-876A7FD34B79}"/>
-              </a:ext>
-            </a:extLst>
-          </p:cNvPr>
-          <p:cNvPicPr>
-            <a:picLocks noChangeAspect="1"/>
-          </p:cNvPicPr>
-          <p:nvPr/>
-        </p:nvPicPr>
-        <p:blipFill>
-          <a:blip r:embed="rId2"/>
-          <a:stretch>
-            <a:fillRect/>
-          </a:stretch>
-        </p:blipFill>
-        <p:spPr>
-          <a:xfrm>
-            <a:off x="1546465" y="2091972"/>
-            <a:ext cx="9099068" cy="4572396"/>
-          </a:xfrm>
-          <a:prstGeom prst="rect">
-            <a:avLst/>
-          </a:prstGeom>
-        </p:spPr>
-      </p:pic>
       <p:sp>
         <p:nvSpPr>
           <p:cNvPr id="7" name="Rectangle 6">
@@ -5400,16 +4809,13 @@
         <p:spPr>
           <a:xfrm>
             <a:off x="952499" y="140854"/>
-            <a:ext cx="10287001" cy="1100118"/>
+            <a:ext cx="10287001" cy="831912"/>
           </a:xfrm>
           <a:prstGeom prst="rect">
             <a:avLst/>
           </a:prstGeom>
           <a:solidFill>
-            <a:schemeClr val="accent3">
-              <a:lumMod val="60000"/>
-              <a:lumOff val="40000"/>
-            </a:schemeClr>
+            <a:srgbClr val="0070C0"/>
           </a:solidFill>
         </p:spPr>
         <p:style>
@@ -5453,7 +4859,7 @@
         </p:nvSpPr>
         <p:spPr>
           <a:xfrm>
-            <a:off x="2416628" y="74877"/>
+            <a:off x="3000288" y="-84591"/>
             <a:ext cx="10515600" cy="1325563"/>
           </a:xfrm>
           <a:prstGeom prst="rect">
@@ -5485,7 +4891,10 @@
           </a:lstStyle>
           <a:p>
             <a:r>
-              <a:rPr lang="en-US" sz="3200" b="1" dirty="0">
+              <a:rPr lang="en-US" sz="2800" b="1" dirty="0">
+                <a:solidFill>
+                  <a:schemeClr val="bg1"/>
+                </a:solidFill>
                 <a:latin typeface="Arial" panose="020B0604020202020204" pitchFamily="34" charset="0"/>
                 <a:cs typeface="Arial" panose="020B0604020202020204" pitchFamily="34" charset="0"/>
               </a:rPr>
@@ -5494,6 +4903,106 @@
           </a:p>
         </p:txBody>
       </p:sp>
+      <p:pic>
+        <p:nvPicPr>
+          <p:cNvPr id="3" name="Picture 2">
+            <a:extLst>
+              <a:ext uri="{FF2B5EF4-FFF2-40B4-BE49-F238E27FC236}">
+                <a16:creationId xmlns:a16="http://schemas.microsoft.com/office/drawing/2014/main" id="{AF0F3ACF-75E7-9ADB-67FC-F6521DEB7A1B}"/>
+              </a:ext>
+            </a:extLst>
+          </p:cNvPr>
+          <p:cNvPicPr>
+            <a:picLocks noChangeAspect="1"/>
+          </p:cNvPicPr>
+          <p:nvPr/>
+        </p:nvPicPr>
+        <p:blipFill>
+          <a:blip r:embed="rId2"/>
+          <a:srcRect l="1207"/>
+          <a:stretch>
+            <a:fillRect/>
+          </a:stretch>
+        </p:blipFill>
+        <p:spPr>
+          <a:xfrm>
+            <a:off x="1792071" y="4559060"/>
+            <a:ext cx="8823598" cy="2133785"/>
+          </a:xfrm>
+          <a:prstGeom prst="rect">
+            <a:avLst/>
+          </a:prstGeom>
+        </p:spPr>
+      </p:pic>
+      <p:sp>
+        <p:nvSpPr>
+          <p:cNvPr id="5" name="TextBox 4">
+            <a:extLst>
+              <a:ext uri="{FF2B5EF4-FFF2-40B4-BE49-F238E27FC236}">
+                <a16:creationId xmlns:a16="http://schemas.microsoft.com/office/drawing/2014/main" id="{B96904F5-6BD9-9CD9-D0CF-2B5A87FB8B28}"/>
+              </a:ext>
+            </a:extLst>
+          </p:cNvPr>
+          <p:cNvSpPr txBox="1"/>
+          <p:nvPr/>
+        </p:nvSpPr>
+        <p:spPr>
+          <a:xfrm>
+            <a:off x="3123738" y="4022649"/>
+            <a:ext cx="9443936" cy="369332"/>
+          </a:xfrm>
+          <a:prstGeom prst="rect">
+            <a:avLst/>
+          </a:prstGeom>
+          <a:noFill/>
+        </p:spPr>
+        <p:txBody>
+          <a:bodyPr wrap="square" rtlCol="0">
+            <a:spAutoFit/>
+          </a:bodyPr>
+          <a:lstStyle/>
+          <a:p>
+            <a:r>
+              <a:rPr lang="en-US" dirty="0">
+                <a:latin typeface="Arial" panose="020B0604020202020204" pitchFamily="34" charset="0"/>
+                <a:cs typeface="Arial" panose="020B0604020202020204" pitchFamily="34" charset="0"/>
+              </a:rPr>
+              <a:t>Animal-Based Products vs Plant-Based Products</a:t>
+            </a:r>
+          </a:p>
+        </p:txBody>
+      </p:sp>
+      <p:pic>
+        <p:nvPicPr>
+          <p:cNvPr id="9" name="Picture 8">
+            <a:extLst>
+              <a:ext uri="{FF2B5EF4-FFF2-40B4-BE49-F238E27FC236}">
+                <a16:creationId xmlns:a16="http://schemas.microsoft.com/office/drawing/2014/main" id="{523A191B-8090-7768-351C-FF8326BC3FB6}"/>
+              </a:ext>
+            </a:extLst>
+          </p:cNvPr>
+          <p:cNvPicPr>
+            <a:picLocks noChangeAspect="1"/>
+          </p:cNvPicPr>
+          <p:nvPr/>
+        </p:nvPicPr>
+        <p:blipFill>
+          <a:blip r:embed="rId3"/>
+          <a:srcRect l="345" r="1017" b="4163"/>
+          <a:stretch>
+            <a:fillRect/>
+          </a:stretch>
+        </p:blipFill>
+        <p:spPr>
+          <a:xfrm>
+            <a:off x="1828800" y="1577193"/>
+            <a:ext cx="8750141" cy="2377440"/>
+          </a:xfrm>
+          <a:prstGeom prst="rect">
+            <a:avLst/>
+          </a:prstGeom>
+        </p:spPr>
+      </p:pic>
     </p:spTree>
     <p:extLst>
       <p:ext uri="{BB962C8B-B14F-4D97-AF65-F5344CB8AC3E}">
@@ -5513,9 +5022,9 @@
     <p:bg>
       <p:bgPr>
         <a:solidFill>
-          <a:schemeClr val="accent6">
-            <a:lumMod val="20000"/>
-            <a:lumOff val="80000"/>
+          <a:schemeClr val="tx2">
+            <a:lumMod val="10000"/>
+            <a:lumOff val="90000"/>
           </a:schemeClr>
         </a:solidFill>
         <a:effectLst/>
@@ -5784,10 +5293,7 @@
             <a:avLst/>
           </a:prstGeom>
           <a:solidFill>
-            <a:schemeClr val="accent3">
-              <a:lumMod val="60000"/>
-              <a:lumOff val="40000"/>
-            </a:schemeClr>
+            <a:srgbClr val="0070C0"/>
           </a:solidFill>
         </p:spPr>
         <p:style>
@@ -5864,6 +5370,9 @@
           <a:p>
             <a:r>
               <a:rPr lang="en-US" sz="3600" b="1" dirty="0">
+                <a:solidFill>
+                  <a:schemeClr val="bg1"/>
+                </a:solidFill>
                 <a:latin typeface="Arial" panose="020B0604020202020204" pitchFamily="34" charset="0"/>
                 <a:cs typeface="Arial" panose="020B0604020202020204" pitchFamily="34" charset="0"/>
               </a:rPr>
@@ -5891,9 +5400,9 @@
     <p:bg>
       <p:bgPr>
         <a:solidFill>
-          <a:schemeClr val="accent6">
-            <a:lumMod val="20000"/>
-            <a:lumOff val="80000"/>
+          <a:schemeClr val="tx2">
+            <a:lumMod val="10000"/>
+            <a:lumOff val="90000"/>
           </a:schemeClr>
         </a:solidFill>
         <a:effectLst/>
@@ -6006,10 +5515,7 @@
             <a:avLst/>
           </a:prstGeom>
           <a:solidFill>
-            <a:schemeClr val="accent3">
-              <a:lumMod val="60000"/>
-              <a:lumOff val="40000"/>
-            </a:schemeClr>
+            <a:srgbClr val="0070C0"/>
           </a:solidFill>
         </p:spPr>
         <p:style>
@@ -6086,6 +5592,9 @@
           <a:p>
             <a:r>
               <a:rPr lang="en-US" sz="2800" b="1" dirty="0">
+                <a:solidFill>
+                  <a:schemeClr val="bg1"/>
+                </a:solidFill>
                 <a:latin typeface="Arial" panose="020B0604020202020204" pitchFamily="34" charset="0"/>
                 <a:cs typeface="Arial" panose="020B0604020202020204" pitchFamily="34" charset="0"/>
               </a:rPr>
@@ -6113,9 +5622,9 @@
     <p:bg>
       <p:bgPr>
         <a:solidFill>
-          <a:schemeClr val="accent6">
-            <a:lumMod val="20000"/>
-            <a:lumOff val="80000"/>
+          <a:schemeClr val="tx2">
+            <a:lumMod val="10000"/>
+            <a:lumOff val="90000"/>
           </a:schemeClr>
         </a:solidFill>
         <a:effectLst/>
@@ -6222,10 +5731,7 @@
             <a:avLst/>
           </a:prstGeom>
           <a:solidFill>
-            <a:schemeClr val="accent3">
-              <a:lumMod val="60000"/>
-              <a:lumOff val="40000"/>
-            </a:schemeClr>
+            <a:srgbClr val="0070C0"/>
           </a:solidFill>
         </p:spPr>
         <p:style>
@@ -6302,6 +5808,9 @@
           <a:p>
             <a:r>
               <a:rPr lang="en-US" sz="2800" b="1" dirty="0">
+                <a:solidFill>
+                  <a:schemeClr val="bg1"/>
+                </a:solidFill>
                 <a:latin typeface="Arial" panose="020B0604020202020204" pitchFamily="34" charset="0"/>
                 <a:cs typeface="Arial" panose="020B0604020202020204" pitchFamily="34" charset="0"/>
               </a:rPr>
@@ -6329,9 +5838,9 @@
     <p:bg>
       <p:bgPr>
         <a:solidFill>
-          <a:schemeClr val="accent6">
-            <a:lumMod val="20000"/>
-            <a:lumOff val="80000"/>
+          <a:schemeClr val="tx2">
+            <a:lumMod val="10000"/>
+            <a:lumOff val="90000"/>
           </a:schemeClr>
         </a:solidFill>
         <a:effectLst/>
@@ -6438,10 +5947,7 @@
             <a:avLst/>
           </a:prstGeom>
           <a:solidFill>
-            <a:schemeClr val="accent3">
-              <a:lumMod val="60000"/>
-              <a:lumOff val="40000"/>
-            </a:schemeClr>
+            <a:srgbClr val="0070C0"/>
           </a:solidFill>
         </p:spPr>
         <p:style>
@@ -6518,6 +6024,9 @@
           <a:p>
             <a:r>
               <a:rPr lang="en-US" sz="2800" b="1" dirty="0">
+                <a:solidFill>
+                  <a:schemeClr val="bg1"/>
+                </a:solidFill>
                 <a:latin typeface="Arial" panose="020B0604020202020204" pitchFamily="34" charset="0"/>
                 <a:cs typeface="Arial" panose="020B0604020202020204" pitchFamily="34" charset="0"/>
               </a:rPr>
@@ -6545,9 +6054,9 @@
     <p:bg>
       <p:bgPr>
         <a:solidFill>
-          <a:schemeClr val="accent6">
-            <a:lumMod val="20000"/>
-            <a:lumOff val="80000"/>
+          <a:schemeClr val="tx2">
+            <a:lumMod val="10000"/>
+            <a:lumOff val="90000"/>
           </a:schemeClr>
         </a:solidFill>
         <a:effectLst/>
@@ -6654,10 +6163,7 @@
             <a:avLst/>
           </a:prstGeom>
           <a:solidFill>
-            <a:schemeClr val="accent3">
-              <a:lumMod val="60000"/>
-              <a:lumOff val="40000"/>
-            </a:schemeClr>
+            <a:srgbClr val="0070C0"/>
           </a:solidFill>
         </p:spPr>
         <p:style>
@@ -6734,6 +6240,9 @@
           <a:p>
             <a:r>
               <a:rPr lang="en-US" sz="2800" b="1" dirty="0">
+                <a:solidFill>
+                  <a:schemeClr val="bg1"/>
+                </a:solidFill>
                 <a:latin typeface="Arial" panose="020B0604020202020204" pitchFamily="34" charset="0"/>
                 <a:cs typeface="Arial" panose="020B0604020202020204" pitchFamily="34" charset="0"/>
               </a:rPr>
@@ -6761,9 +6270,9 @@
     <p:bg>
       <p:bgPr>
         <a:solidFill>
-          <a:schemeClr val="accent6">
-            <a:lumMod val="20000"/>
-            <a:lumOff val="80000"/>
+          <a:schemeClr val="tx2">
+            <a:lumMod val="10000"/>
+            <a:lumOff val="90000"/>
           </a:schemeClr>
         </a:solidFill>
         <a:effectLst/>
@@ -6774,7 +6283,7 @@
         <p:cNvPr id="1" name="">
           <a:extLst>
             <a:ext uri="{FF2B5EF4-FFF2-40B4-BE49-F238E27FC236}">
-              <a16:creationId xmlns:a16="http://schemas.microsoft.com/office/drawing/2014/main" id="{873559DE-67B3-FBE1-326F-9F7794714EA9}"/>
+              <a16:creationId xmlns:a16="http://schemas.microsoft.com/office/drawing/2014/main" id="{5F23FE6E-0030-9FE2-A3CD-A72BBFC11361}"/>
             </a:ext>
           </a:extLst>
         </p:cNvPr>
@@ -6789,42 +6298,12 @@
           <a:chExt cx="0" cy="0"/>
         </a:xfrm>
       </p:grpSpPr>
-      <p:pic>
-        <p:nvPicPr>
-          <p:cNvPr id="5" name="Picture 4">
-            <a:extLst>
-              <a:ext uri="{FF2B5EF4-FFF2-40B4-BE49-F238E27FC236}">
-                <a16:creationId xmlns:a16="http://schemas.microsoft.com/office/drawing/2014/main" id="{C4587E87-468C-399C-B7AE-91A0692CBE75}"/>
-              </a:ext>
-            </a:extLst>
-          </p:cNvPr>
-          <p:cNvPicPr>
-            <a:picLocks noChangeAspect="1"/>
-          </p:cNvPicPr>
-          <p:nvPr/>
-        </p:nvPicPr>
-        <p:blipFill>
-          <a:blip r:embed="rId2"/>
-          <a:stretch>
-            <a:fillRect/>
-          </a:stretch>
-        </p:blipFill>
-        <p:spPr>
-          <a:xfrm>
-            <a:off x="838200" y="1758933"/>
-            <a:ext cx="10389280" cy="3566160"/>
-          </a:xfrm>
-          <a:prstGeom prst="rect">
-            <a:avLst/>
-          </a:prstGeom>
-        </p:spPr>
-      </p:pic>
-      <p:sp>
-        <p:nvSpPr>
-          <p:cNvPr id="6" name="Rectangle 5">
-            <a:extLst>
-              <a:ext uri="{FF2B5EF4-FFF2-40B4-BE49-F238E27FC236}">
-                <a16:creationId xmlns:a16="http://schemas.microsoft.com/office/drawing/2014/main" id="{8A9DA361-C9F6-6CBB-5453-070E3C6FE2CF}"/>
+      <p:sp>
+        <p:nvSpPr>
+          <p:cNvPr id="8" name="Rectangle 7">
+            <a:extLst>
+              <a:ext uri="{FF2B5EF4-FFF2-40B4-BE49-F238E27FC236}">
+                <a16:creationId xmlns:a16="http://schemas.microsoft.com/office/drawing/2014/main" id="{FA1E5721-6CBB-E173-8EF9-8F5BCBF0E741}"/>
               </a:ext>
             </a:extLst>
           </p:cNvPr>
@@ -6833,17 +6312,14 @@
         </p:nvSpPr>
         <p:spPr>
           <a:xfrm>
-            <a:off x="355940" y="329811"/>
-            <a:ext cx="11353800" cy="771944"/>
+            <a:off x="419100" y="82184"/>
+            <a:ext cx="11353800" cy="734939"/>
           </a:xfrm>
           <a:prstGeom prst="rect">
             <a:avLst/>
           </a:prstGeom>
           <a:solidFill>
-            <a:schemeClr val="accent3">
-              <a:lumMod val="60000"/>
-              <a:lumOff val="40000"/>
-            </a:schemeClr>
+            <a:srgbClr val="0070C0"/>
           </a:solidFill>
         </p:spPr>
         <p:style>
@@ -6873,10 +6349,10 @@
       </p:sp>
       <p:sp>
         <p:nvSpPr>
-          <p:cNvPr id="10" name="Title 1">
-            <a:extLst>
-              <a:ext uri="{FF2B5EF4-FFF2-40B4-BE49-F238E27FC236}">
-                <a16:creationId xmlns:a16="http://schemas.microsoft.com/office/drawing/2014/main" id="{771AB182-9EA3-2DF1-1F00-D3809406DEE9}"/>
+          <p:cNvPr id="9" name="Title 1">
+            <a:extLst>
+              <a:ext uri="{FF2B5EF4-FFF2-40B4-BE49-F238E27FC236}">
+                <a16:creationId xmlns:a16="http://schemas.microsoft.com/office/drawing/2014/main" id="{43308F0C-D758-9CF2-2345-ECE56D5E482F}"/>
               </a:ext>
             </a:extLst>
           </p:cNvPr>
@@ -6887,7 +6363,7 @@
         </p:nvSpPr>
         <p:spPr>
           <a:xfrm>
-            <a:off x="838200" y="53001"/>
+            <a:off x="1059435" y="-295299"/>
             <a:ext cx="10903085" cy="1325563"/>
           </a:xfrm>
           <a:prstGeom prst="rect">
@@ -6921,18 +6397,255 @@
             <a:pPr fontAlgn="base"/>
             <a:r>
               <a:rPr lang="en-US" sz="2400" b="1" dirty="0">
+                <a:solidFill>
+                  <a:schemeClr val="bg1"/>
+                </a:solidFill>
                 <a:latin typeface="Arial" panose="020B0604020202020204" pitchFamily="34" charset="0"/>
                 <a:cs typeface="Arial" panose="020B0604020202020204" pitchFamily="34" charset="0"/>
               </a:rPr>
-              <a:t>Carbon Footprint Comparison of Plant-Based Foods vs Animal-Based?</a:t>
-            </a:r>
-          </a:p>
-        </p:txBody>
-      </p:sp>
+              <a:t>Carbon Footprint Comparison of High Protein vs Low Protein Foods?</a:t>
+            </a:r>
+          </a:p>
+        </p:txBody>
+      </p:sp>
+      <p:pic>
+        <p:nvPicPr>
+          <p:cNvPr id="3" name="Picture 2">
+            <a:extLst>
+              <a:ext uri="{FF2B5EF4-FFF2-40B4-BE49-F238E27FC236}">
+                <a16:creationId xmlns:a16="http://schemas.microsoft.com/office/drawing/2014/main" id="{DF4852EA-C147-DFC8-07EF-9E0A937CB2A5}"/>
+              </a:ext>
+            </a:extLst>
+          </p:cNvPr>
+          <p:cNvPicPr>
+            <a:picLocks noChangeAspect="1"/>
+          </p:cNvPicPr>
+          <p:nvPr/>
+        </p:nvPicPr>
+        <p:blipFill>
+          <a:blip r:embed="rId2"/>
+          <a:stretch>
+            <a:fillRect/>
+          </a:stretch>
+        </p:blipFill>
+        <p:spPr>
+          <a:xfrm>
+            <a:off x="128077" y="1030264"/>
+            <a:ext cx="5105593" cy="3017520"/>
+          </a:xfrm>
+          <a:prstGeom prst="rect">
+            <a:avLst/>
+          </a:prstGeom>
+        </p:spPr>
+      </p:pic>
+      <p:pic>
+        <p:nvPicPr>
+          <p:cNvPr id="6" name="Picture 5">
+            <a:extLst>
+              <a:ext uri="{FF2B5EF4-FFF2-40B4-BE49-F238E27FC236}">
+                <a16:creationId xmlns:a16="http://schemas.microsoft.com/office/drawing/2014/main" id="{BB5986CF-3AE8-7292-6B02-D985D631D9FB}"/>
+              </a:ext>
+            </a:extLst>
+          </p:cNvPr>
+          <p:cNvPicPr>
+            <a:picLocks noChangeAspect="1"/>
+          </p:cNvPicPr>
+          <p:nvPr/>
+        </p:nvPicPr>
+        <p:blipFill>
+          <a:blip r:embed="rId3"/>
+          <a:stretch>
+            <a:fillRect/>
+          </a:stretch>
+        </p:blipFill>
+        <p:spPr>
+          <a:xfrm>
+            <a:off x="5364113" y="1239627"/>
+            <a:ext cx="6699810" cy="2103120"/>
+          </a:xfrm>
+          <a:prstGeom prst="rect">
+            <a:avLst/>
+          </a:prstGeom>
+        </p:spPr>
+      </p:pic>
+      <p:sp>
+        <p:nvSpPr>
+          <p:cNvPr id="7" name="TextBox 6">
+            <a:extLst>
+              <a:ext uri="{FF2B5EF4-FFF2-40B4-BE49-F238E27FC236}">
+                <a16:creationId xmlns:a16="http://schemas.microsoft.com/office/drawing/2014/main" id="{D4AD9628-BBDD-27CE-49EA-A15972CED90B}"/>
+              </a:ext>
+            </a:extLst>
+          </p:cNvPr>
+          <p:cNvSpPr txBox="1"/>
+          <p:nvPr/>
+        </p:nvSpPr>
+        <p:spPr>
+          <a:xfrm>
+            <a:off x="7782887" y="931850"/>
+            <a:ext cx="2704290" cy="307777"/>
+          </a:xfrm>
+          <a:prstGeom prst="rect">
+            <a:avLst/>
+          </a:prstGeom>
+          <a:noFill/>
+        </p:spPr>
+        <p:txBody>
+          <a:bodyPr wrap="square" rtlCol="0">
+            <a:spAutoFit/>
+          </a:bodyPr>
+          <a:lstStyle/>
+          <a:p>
+            <a:r>
+              <a:rPr lang="en-US" sz="1400" b="1" dirty="0">
+                <a:latin typeface="Arial" panose="020B0604020202020204" pitchFamily="34" charset="0"/>
+                <a:cs typeface="Arial" panose="020B0604020202020204" pitchFamily="34" charset="0"/>
+              </a:rPr>
+              <a:t>High Protein Products</a:t>
+            </a:r>
+          </a:p>
+        </p:txBody>
+      </p:sp>
+      <p:sp>
+        <p:nvSpPr>
+          <p:cNvPr id="12" name="TextBox 11">
+            <a:extLst>
+              <a:ext uri="{FF2B5EF4-FFF2-40B4-BE49-F238E27FC236}">
+                <a16:creationId xmlns:a16="http://schemas.microsoft.com/office/drawing/2014/main" id="{C1E8F734-A652-8A9E-A4BA-EDCA097E66DD}"/>
+              </a:ext>
+            </a:extLst>
+          </p:cNvPr>
+          <p:cNvSpPr txBox="1"/>
+          <p:nvPr/>
+        </p:nvSpPr>
+        <p:spPr>
+          <a:xfrm>
+            <a:off x="7782887" y="3648273"/>
+            <a:ext cx="2704290" cy="307777"/>
+          </a:xfrm>
+          <a:prstGeom prst="rect">
+            <a:avLst/>
+          </a:prstGeom>
+          <a:noFill/>
+        </p:spPr>
+        <p:txBody>
+          <a:bodyPr wrap="square" rtlCol="0">
+            <a:spAutoFit/>
+          </a:bodyPr>
+          <a:lstStyle/>
+          <a:p>
+            <a:r>
+              <a:rPr lang="en-US" sz="1400" b="1" dirty="0">
+                <a:latin typeface="Arial" panose="020B0604020202020204" pitchFamily="34" charset="0"/>
+                <a:cs typeface="Arial" panose="020B0604020202020204" pitchFamily="34" charset="0"/>
+              </a:rPr>
+              <a:t>Low Protein Products</a:t>
+            </a:r>
+          </a:p>
+        </p:txBody>
+      </p:sp>
+      <p:sp>
+        <p:nvSpPr>
+          <p:cNvPr id="13" name="TextBox 12">
+            <a:extLst>
+              <a:ext uri="{FF2B5EF4-FFF2-40B4-BE49-F238E27FC236}">
+                <a16:creationId xmlns:a16="http://schemas.microsoft.com/office/drawing/2014/main" id="{033D2CAD-5551-EEE4-F5BD-23A1BD467C60}"/>
+              </a:ext>
+            </a:extLst>
+          </p:cNvPr>
+          <p:cNvSpPr txBox="1"/>
+          <p:nvPr/>
+        </p:nvSpPr>
+        <p:spPr>
+          <a:xfrm>
+            <a:off x="1059435" y="4260925"/>
+            <a:ext cx="2704290" cy="307777"/>
+          </a:xfrm>
+          <a:prstGeom prst="rect">
+            <a:avLst/>
+          </a:prstGeom>
+          <a:noFill/>
+        </p:spPr>
+        <p:txBody>
+          <a:bodyPr wrap="square" rtlCol="0">
+            <a:spAutoFit/>
+          </a:bodyPr>
+          <a:lstStyle/>
+          <a:p>
+            <a:r>
+              <a:rPr lang="en-US" sz="1400" b="1" dirty="0">
+                <a:latin typeface="Arial" panose="020B0604020202020204" pitchFamily="34" charset="0"/>
+                <a:cs typeface="Arial" panose="020B0604020202020204" pitchFamily="34" charset="0"/>
+              </a:rPr>
+              <a:t>Medium Protein Products</a:t>
+            </a:r>
+          </a:p>
+        </p:txBody>
+      </p:sp>
+      <p:pic>
+        <p:nvPicPr>
+          <p:cNvPr id="15" name="Picture 14">
+            <a:extLst>
+              <a:ext uri="{FF2B5EF4-FFF2-40B4-BE49-F238E27FC236}">
+                <a16:creationId xmlns:a16="http://schemas.microsoft.com/office/drawing/2014/main" id="{FA8BD5EE-D96E-D85D-B057-C36780144D0C}"/>
+              </a:ext>
+            </a:extLst>
+          </p:cNvPr>
+          <p:cNvPicPr>
+            <a:picLocks noChangeAspect="1"/>
+          </p:cNvPicPr>
+          <p:nvPr/>
+        </p:nvPicPr>
+        <p:blipFill>
+          <a:blip r:embed="rId4"/>
+          <a:stretch>
+            <a:fillRect/>
+          </a:stretch>
+        </p:blipFill>
+        <p:spPr>
+          <a:xfrm>
+            <a:off x="85090" y="4781843"/>
+            <a:ext cx="5120640" cy="1591732"/>
+          </a:xfrm>
+          <a:prstGeom prst="rect">
+            <a:avLst/>
+          </a:prstGeom>
+        </p:spPr>
+      </p:pic>
+      <p:pic>
+        <p:nvPicPr>
+          <p:cNvPr id="17" name="Picture 16">
+            <a:extLst>
+              <a:ext uri="{FF2B5EF4-FFF2-40B4-BE49-F238E27FC236}">
+                <a16:creationId xmlns:a16="http://schemas.microsoft.com/office/drawing/2014/main" id="{B7738741-3E61-72D5-63D6-4A796C37AA4E}"/>
+              </a:ext>
+            </a:extLst>
+          </p:cNvPr>
+          <p:cNvPicPr>
+            <a:picLocks noChangeAspect="1"/>
+          </p:cNvPicPr>
+          <p:nvPr/>
+        </p:nvPicPr>
+        <p:blipFill>
+          <a:blip r:embed="rId5"/>
+          <a:stretch>
+            <a:fillRect/>
+          </a:stretch>
+        </p:blipFill>
+        <p:spPr>
+          <a:xfrm>
+            <a:off x="5346364" y="4015303"/>
+            <a:ext cx="6717559" cy="2103120"/>
+          </a:xfrm>
+          <a:prstGeom prst="rect">
+            <a:avLst/>
+          </a:prstGeom>
+        </p:spPr>
+      </p:pic>
     </p:spTree>
     <p:extLst>
       <p:ext uri="{BB962C8B-B14F-4D97-AF65-F5344CB8AC3E}">
-        <p14:creationId xmlns:p14="http://schemas.microsoft.com/office/powerpoint/2010/main" val="3802383116"/>
+        <p14:creationId xmlns:p14="http://schemas.microsoft.com/office/powerpoint/2010/main" val="1728812209"/>
       </p:ext>
     </p:extLst>
   </p:cSld>

</xml_diff>

<commit_message>
Upload optimizations in Power BI file & Powerpoint file
</commit_message>
<xml_diff>
--- a/presentation/Project_2.pptx
+++ b/presentation/Project_2.pptx
@@ -5,19 +5,20 @@
     <p:sldMasterId id="2147483648" r:id="rId1"/>
   </p:sldMasterIdLst>
   <p:notesMasterIdLst>
-    <p:notesMasterId r:id="rId12"/>
+    <p:notesMasterId r:id="rId13"/>
   </p:notesMasterIdLst>
   <p:sldIdLst>
     <p:sldId id="256" r:id="rId2"/>
     <p:sldId id="257" r:id="rId3"/>
-    <p:sldId id="258" r:id="rId4"/>
-    <p:sldId id="259" r:id="rId5"/>
-    <p:sldId id="261" r:id="rId6"/>
-    <p:sldId id="260" r:id="rId7"/>
-    <p:sldId id="264" r:id="rId8"/>
-    <p:sldId id="265" r:id="rId9"/>
-    <p:sldId id="263" r:id="rId10"/>
-    <p:sldId id="266" r:id="rId11"/>
+    <p:sldId id="267" r:id="rId4"/>
+    <p:sldId id="258" r:id="rId5"/>
+    <p:sldId id="263" r:id="rId6"/>
+    <p:sldId id="261" r:id="rId7"/>
+    <p:sldId id="260" r:id="rId8"/>
+    <p:sldId id="264" r:id="rId9"/>
+    <p:sldId id="265" r:id="rId10"/>
+    <p:sldId id="259" r:id="rId11"/>
+    <p:sldId id="266" r:id="rId12"/>
   </p:sldIdLst>
   <p:sldSz cx="12192000" cy="6858000"/>
   <p:notesSz cx="6858000" cy="9144000"/>
@@ -127,7 +128,7 @@
 <file path=ppt/revisionInfo.xml><?xml version="1.0" encoding="utf-8"?>
 <p1510:revInfo xmlns:a="http://schemas.openxmlformats.org/drawingml/2006/main" xmlns:r="http://schemas.openxmlformats.org/officeDocument/2006/relationships" xmlns:p1510="http://schemas.microsoft.com/office/powerpoint/2015/10/main">
   <p1510:revLst>
-    <p1510:client id="{0F0844A4-C27F-4CD2-833D-E131F7093C18}" v="77" dt="2026-01-19T00:01:22.295"/>
+    <p1510:client id="{0F0844A4-C27F-4CD2-833D-E131F7093C18}" v="81" dt="2026-01-19T11:43:27.659"/>
   </p1510:revLst>
 </p1510:revInfo>
 </file>
@@ -137,7 +138,7 @@
   <pc:docChgLst>
     <pc:chgData name="Katerina Lama" userId="4e8f923e51bc8f8b" providerId="LiveId" clId="{032BFE3C-8ACE-4959-82C8-F4C52BA9C5BE}"/>
     <pc:docChg chg="undo custSel addSld delSld modSld sldOrd">
-      <pc:chgData name="Katerina Lama" userId="4e8f923e51bc8f8b" providerId="LiveId" clId="{032BFE3C-8ACE-4959-82C8-F4C52BA9C5BE}" dt="2026-01-19T00:01:22.295" v="1435"/>
+      <pc:chgData name="Katerina Lama" userId="4e8f923e51bc8f8b" providerId="LiveId" clId="{032BFE3C-8ACE-4959-82C8-F4C52BA9C5BE}" dt="2026-01-19T12:00:30.096" v="1945" actId="1076"/>
       <pc:docMkLst>
         <pc:docMk/>
       </pc:docMkLst>
@@ -204,7 +205,7 @@
         </pc:spChg>
       </pc:sldChg>
       <pc:sldChg chg="addSp delSp modSp add mod setBg">
-        <pc:chgData name="Katerina Lama" userId="4e8f923e51bc8f8b" providerId="LiveId" clId="{032BFE3C-8ACE-4959-82C8-F4C52BA9C5BE}" dt="2026-01-18T23:47:32.374" v="1242"/>
+        <pc:chgData name="Katerina Lama" userId="4e8f923e51bc8f8b" providerId="LiveId" clId="{032BFE3C-8ACE-4959-82C8-F4C52BA9C5BE}" dt="2026-01-19T11:52:12.357" v="1858" actId="1076"/>
         <pc:sldMkLst>
           <pc:docMk/>
           <pc:sldMk cId="3943745945" sldId="258"/>
@@ -241,8 +242,8 @@
             <ac:spMk id="10" creationId="{8E194144-456F-0114-7581-205897A2D291}"/>
           </ac:spMkLst>
         </pc:spChg>
-        <pc:picChg chg="add mod modCrop">
-          <ac:chgData name="Katerina Lama" userId="4e8f923e51bc8f8b" providerId="LiveId" clId="{032BFE3C-8ACE-4959-82C8-F4C52BA9C5BE}" dt="2026-01-18T23:46:49.154" v="1239" actId="1076"/>
+        <pc:picChg chg="add del mod modCrop">
+          <ac:chgData name="Katerina Lama" userId="4e8f923e51bc8f8b" providerId="LiveId" clId="{032BFE3C-8ACE-4959-82C8-F4C52BA9C5BE}" dt="2026-01-19T11:49:48.114" v="1839" actId="21"/>
           <ac:picMkLst>
             <pc:docMk/>
             <pc:sldMk cId="3943745945" sldId="258"/>
@@ -257,17 +258,33 @@
             <ac:picMk id="6" creationId="{458F3357-A8AF-19F3-E951-876A7FD34B79}"/>
           </ac:picMkLst>
         </pc:picChg>
-        <pc:picChg chg="add mod modCrop">
-          <ac:chgData name="Katerina Lama" userId="4e8f923e51bc8f8b" providerId="LiveId" clId="{032BFE3C-8ACE-4959-82C8-F4C52BA9C5BE}" dt="2026-01-18T23:46:39.017" v="1238" actId="1076"/>
+        <pc:picChg chg="add mod">
+          <ac:chgData name="Katerina Lama" userId="4e8f923e51bc8f8b" providerId="LiveId" clId="{032BFE3C-8ACE-4959-82C8-F4C52BA9C5BE}" dt="2026-01-19T11:50:00.372" v="1844" actId="1076"/>
+          <ac:picMkLst>
+            <pc:docMk/>
+            <pc:sldMk cId="3943745945" sldId="258"/>
+            <ac:picMk id="6" creationId="{9CD77FD7-1CB7-039E-6B91-3514F167CBCD}"/>
+          </ac:picMkLst>
+        </pc:picChg>
+        <pc:picChg chg="add del mod modCrop">
+          <ac:chgData name="Katerina Lama" userId="4e8f923e51bc8f8b" providerId="LiveId" clId="{032BFE3C-8ACE-4959-82C8-F4C52BA9C5BE}" dt="2026-01-19T11:49:25.625" v="1836" actId="21"/>
           <ac:picMkLst>
             <pc:docMk/>
             <pc:sldMk cId="3943745945" sldId="258"/>
             <ac:picMk id="9" creationId="{523A191B-8090-7768-351C-FF8326BC3FB6}"/>
           </ac:picMkLst>
         </pc:picChg>
+        <pc:picChg chg="add mod modCrop">
+          <ac:chgData name="Katerina Lama" userId="4e8f923e51bc8f8b" providerId="LiveId" clId="{032BFE3C-8ACE-4959-82C8-F4C52BA9C5BE}" dt="2026-01-19T11:52:12.357" v="1858" actId="1076"/>
+          <ac:picMkLst>
+            <pc:docMk/>
+            <pc:sldMk cId="3943745945" sldId="258"/>
+            <ac:picMk id="11" creationId="{B2DDA1FA-4844-8175-2747-D172683A59BB}"/>
+          </ac:picMkLst>
+        </pc:picChg>
       </pc:sldChg>
-      <pc:sldChg chg="addSp delSp modSp add mod setBg">
-        <pc:chgData name="Katerina Lama" userId="4e8f923e51bc8f8b" providerId="LiveId" clId="{032BFE3C-8ACE-4959-82C8-F4C52BA9C5BE}" dt="2026-01-18T23:49:22.442" v="1252" actId="207"/>
+      <pc:sldChg chg="addSp delSp modSp add mod ord setBg">
+        <pc:chgData name="Katerina Lama" userId="4e8f923e51bc8f8b" providerId="LiveId" clId="{032BFE3C-8ACE-4959-82C8-F4C52BA9C5BE}" dt="2026-01-19T11:45:27.633" v="1777"/>
         <pc:sldMkLst>
           <pc:docMk/>
           <pc:sldMk cId="1224935063" sldId="259"/>
@@ -422,8 +439,8 @@
           <pc:sldMk cId="3802383116" sldId="262"/>
         </pc:sldMkLst>
       </pc:sldChg>
-      <pc:sldChg chg="addSp delSp modSp add mod setBg">
-        <pc:chgData name="Katerina Lama" userId="4e8f923e51bc8f8b" providerId="LiveId" clId="{032BFE3C-8ACE-4959-82C8-F4C52BA9C5BE}" dt="2026-01-19T00:01:13.477" v="1434" actId="1076"/>
+      <pc:sldChg chg="addSp delSp modSp add mod ord setBg">
+        <pc:chgData name="Katerina Lama" userId="4e8f923e51bc8f8b" providerId="LiveId" clId="{032BFE3C-8ACE-4959-82C8-F4C52BA9C5BE}" dt="2026-01-19T12:00:30.096" v="1945" actId="1076"/>
         <pc:sldMkLst>
           <pc:docMk/>
           <pc:sldMk cId="1728812209" sldId="263"/>
@@ -453,7 +470,7 @@
           </ac:spMkLst>
         </pc:spChg>
         <pc:spChg chg="add mod">
-          <ac:chgData name="Katerina Lama" userId="4e8f923e51bc8f8b" providerId="LiveId" clId="{032BFE3C-8ACE-4959-82C8-F4C52BA9C5BE}" dt="2026-01-19T00:01:13.477" v="1434" actId="1076"/>
+          <ac:chgData name="Katerina Lama" userId="4e8f923e51bc8f8b" providerId="LiveId" clId="{032BFE3C-8ACE-4959-82C8-F4C52BA9C5BE}" dt="2026-01-19T11:58:07.349" v="1911" actId="1076"/>
           <ac:spMkLst>
             <pc:docMk/>
             <pc:sldMk cId="1728812209" sldId="263"/>
@@ -461,15 +478,15 @@
           </ac:spMkLst>
         </pc:spChg>
         <pc:spChg chg="add mod">
-          <ac:chgData name="Katerina Lama" userId="4e8f923e51bc8f8b" providerId="LiveId" clId="{032BFE3C-8ACE-4959-82C8-F4C52BA9C5BE}" dt="2026-01-19T00:00:38.668" v="1414" actId="20577"/>
+          <ac:chgData name="Katerina Lama" userId="4e8f923e51bc8f8b" providerId="LiveId" clId="{032BFE3C-8ACE-4959-82C8-F4C52BA9C5BE}" dt="2026-01-19T11:59:09.765" v="1927" actId="1076"/>
           <ac:spMkLst>
             <pc:docMk/>
             <pc:sldMk cId="1728812209" sldId="263"/>
             <ac:spMk id="13" creationId="{033D2CAD-5551-EEE4-F5BD-23A1BD467C60}"/>
           </ac:spMkLst>
         </pc:spChg>
-        <pc:picChg chg="add mod">
-          <ac:chgData name="Katerina Lama" userId="4e8f923e51bc8f8b" providerId="LiveId" clId="{032BFE3C-8ACE-4959-82C8-F4C52BA9C5BE}" dt="2026-01-18T23:57:54.768" v="1371" actId="1076"/>
+        <pc:picChg chg="add del mod">
+          <ac:chgData name="Katerina Lama" userId="4e8f923e51bc8f8b" providerId="LiveId" clId="{032BFE3C-8ACE-4959-82C8-F4C52BA9C5BE}" dt="2026-01-19T11:53:13.597" v="1859" actId="21"/>
           <ac:picMkLst>
             <pc:docMk/>
             <pc:sldMk cId="1728812209" sldId="263"/>
@@ -484,12 +501,28 @@
             <ac:picMk id="4" creationId="{994A7B08-E29C-C959-51BD-A0A80AECFC8C}"/>
           </ac:picMkLst>
         </pc:picChg>
-        <pc:picChg chg="add mod">
-          <ac:chgData name="Katerina Lama" userId="4e8f923e51bc8f8b" providerId="LiveId" clId="{032BFE3C-8ACE-4959-82C8-F4C52BA9C5BE}" dt="2026-01-18T23:58:46.298" v="1385" actId="1076"/>
+        <pc:picChg chg="add del mod modCrop">
+          <ac:chgData name="Katerina Lama" userId="4e8f923e51bc8f8b" providerId="LiveId" clId="{032BFE3C-8ACE-4959-82C8-F4C52BA9C5BE}" dt="2026-01-19T11:58:17.095" v="1913" actId="21"/>
+          <ac:picMkLst>
+            <pc:docMk/>
+            <pc:sldMk cId="1728812209" sldId="263"/>
+            <ac:picMk id="4" creationId="{D6E12D1C-B4F9-1F2A-13DE-F06E0B9F8023}"/>
+          </ac:picMkLst>
+        </pc:picChg>
+        <pc:picChg chg="add del mod">
+          <ac:chgData name="Katerina Lama" userId="4e8f923e51bc8f8b" providerId="LiveId" clId="{032BFE3C-8ACE-4959-82C8-F4C52BA9C5BE}" dt="2026-01-19T11:53:49.838" v="1878" actId="21"/>
           <ac:picMkLst>
             <pc:docMk/>
             <pc:sldMk cId="1728812209" sldId="263"/>
             <ac:picMk id="6" creationId="{BB5986CF-3AE8-7292-6B02-D985D631D9FB}"/>
+          </ac:picMkLst>
+        </pc:picChg>
+        <pc:picChg chg="add mod">
+          <ac:chgData name="Katerina Lama" userId="4e8f923e51bc8f8b" providerId="LiveId" clId="{032BFE3C-8ACE-4959-82C8-F4C52BA9C5BE}" dt="2026-01-19T11:54:54.091" v="1884" actId="1076"/>
+          <ac:picMkLst>
+            <pc:docMk/>
+            <pc:sldMk cId="1728812209" sldId="263"/>
+            <ac:picMk id="10" creationId="{FED070EC-AA5A-14D1-1D5B-B6C6EF74ED7D}"/>
           </ac:picMkLst>
         </pc:picChg>
         <pc:picChg chg="add del">
@@ -500,20 +533,60 @@
             <ac:picMk id="11" creationId="{99967F87-A73D-A395-2352-EFAB7041E5EF}"/>
           </ac:picMkLst>
         </pc:picChg>
-        <pc:picChg chg="add mod">
-          <ac:chgData name="Katerina Lama" userId="4e8f923e51bc8f8b" providerId="LiveId" clId="{032BFE3C-8ACE-4959-82C8-F4C52BA9C5BE}" dt="2026-01-19T00:00:55.188" v="1427" actId="14100"/>
+        <pc:picChg chg="add del mod">
+          <ac:chgData name="Katerina Lama" userId="4e8f923e51bc8f8b" providerId="LiveId" clId="{032BFE3C-8ACE-4959-82C8-F4C52BA9C5BE}" dt="2026-01-19T11:55:44.363" v="1894" actId="21"/>
+          <ac:picMkLst>
+            <pc:docMk/>
+            <pc:sldMk cId="1728812209" sldId="263"/>
+            <ac:picMk id="14" creationId="{A538CF1E-8E99-7345-76F2-2E62F97B686D}"/>
+          </ac:picMkLst>
+        </pc:picChg>
+        <pc:picChg chg="add del mod">
+          <ac:chgData name="Katerina Lama" userId="4e8f923e51bc8f8b" providerId="LiveId" clId="{032BFE3C-8ACE-4959-82C8-F4C52BA9C5BE}" dt="2026-01-19T11:56:36.287" v="1902" actId="21"/>
           <ac:picMkLst>
             <pc:docMk/>
             <pc:sldMk cId="1728812209" sldId="263"/>
             <ac:picMk id="15" creationId="{FA8BD5EE-D96E-D85D-B057-C36780144D0C}"/>
           </ac:picMkLst>
         </pc:picChg>
-        <pc:picChg chg="add mod">
-          <ac:chgData name="Katerina Lama" userId="4e8f923e51bc8f8b" providerId="LiveId" clId="{032BFE3C-8ACE-4959-82C8-F4C52BA9C5BE}" dt="2026-01-19T00:01:04.467" v="1432" actId="1076"/>
+        <pc:picChg chg="add del mod">
+          <ac:chgData name="Katerina Lama" userId="4e8f923e51bc8f8b" providerId="LiveId" clId="{032BFE3C-8ACE-4959-82C8-F4C52BA9C5BE}" dt="2026-01-19T11:54:58.597" v="1885" actId="21"/>
           <ac:picMkLst>
             <pc:docMk/>
             <pc:sldMk cId="1728812209" sldId="263"/>
             <ac:picMk id="17" creationId="{B7738741-3E61-72D5-63D6-4A796C37AA4E}"/>
+          </ac:picMkLst>
+        </pc:picChg>
+        <pc:picChg chg="add del mod">
+          <ac:chgData name="Katerina Lama" userId="4e8f923e51bc8f8b" providerId="LiveId" clId="{032BFE3C-8ACE-4959-82C8-F4C52BA9C5BE}" dt="2026-01-19T11:57:42.891" v="1904" actId="21"/>
+          <ac:picMkLst>
+            <pc:docMk/>
+            <pc:sldMk cId="1728812209" sldId="263"/>
+            <ac:picMk id="18" creationId="{60F53592-DF0E-E9A6-F7DA-51D3B28E3339}"/>
+          </ac:picMkLst>
+        </pc:picChg>
+        <pc:picChg chg="add mod">
+          <ac:chgData name="Katerina Lama" userId="4e8f923e51bc8f8b" providerId="LiveId" clId="{032BFE3C-8ACE-4959-82C8-F4C52BA9C5BE}" dt="2026-01-19T11:57:59.067" v="1910" actId="1076"/>
+          <ac:picMkLst>
+            <pc:docMk/>
+            <pc:sldMk cId="1728812209" sldId="263"/>
+            <ac:picMk id="20" creationId="{06FA5C1C-0CCE-A969-19EF-3F1775A70B2B}"/>
+          </ac:picMkLst>
+        </pc:picChg>
+        <pc:picChg chg="add mod">
+          <ac:chgData name="Katerina Lama" userId="4e8f923e51bc8f8b" providerId="LiveId" clId="{032BFE3C-8ACE-4959-82C8-F4C52BA9C5BE}" dt="2026-01-19T11:59:03.765" v="1926" actId="14100"/>
+          <ac:picMkLst>
+            <pc:docMk/>
+            <pc:sldMk cId="1728812209" sldId="263"/>
+            <ac:picMk id="22" creationId="{27817013-636B-E7E6-0501-DB9FAE837926}"/>
+          </ac:picMkLst>
+        </pc:picChg>
+        <pc:picChg chg="add mod">
+          <ac:chgData name="Katerina Lama" userId="4e8f923e51bc8f8b" providerId="LiveId" clId="{032BFE3C-8ACE-4959-82C8-F4C52BA9C5BE}" dt="2026-01-19T12:00:30.096" v="1945" actId="1076"/>
+          <ac:picMkLst>
+            <pc:docMk/>
+            <pc:sldMk cId="1728812209" sldId="263"/>
+            <ac:picMk id="24" creationId="{C22E5075-C966-FBDA-1A8F-BB5920D1B075}"/>
           </ac:picMkLst>
         </pc:picChg>
       </pc:sldChg>
@@ -609,6 +682,53 @@
             <ac:picMk id="5" creationId="{836E6131-6E57-737C-C433-F3456D53F8C5}"/>
           </ac:picMkLst>
         </pc:picChg>
+      </pc:sldChg>
+      <pc:sldChg chg="addSp delSp modSp new mod setBg">
+        <pc:chgData name="Katerina Lama" userId="4e8f923e51bc8f8b" providerId="LiveId" clId="{032BFE3C-8ACE-4959-82C8-F4C52BA9C5BE}" dt="2026-01-19T11:47:56.327" v="1835" actId="20577"/>
+        <pc:sldMkLst>
+          <pc:docMk/>
+          <pc:sldMk cId="2160857731" sldId="267"/>
+        </pc:sldMkLst>
+        <pc:spChg chg="del mod">
+          <ac:chgData name="Katerina Lama" userId="4e8f923e51bc8f8b" providerId="LiveId" clId="{032BFE3C-8ACE-4959-82C8-F4C52BA9C5BE}" dt="2026-01-19T09:57:36.166" v="1452" actId="21"/>
+          <ac:spMkLst>
+            <pc:docMk/>
+            <pc:sldMk cId="2160857731" sldId="267"/>
+            <ac:spMk id="2" creationId="{7D1D165D-6629-0BD8-2A22-DC32E1B74086}"/>
+          </ac:spMkLst>
+        </pc:spChg>
+        <pc:spChg chg="mod">
+          <ac:chgData name="Katerina Lama" userId="4e8f923e51bc8f8b" providerId="LiveId" clId="{032BFE3C-8ACE-4959-82C8-F4C52BA9C5BE}" dt="2026-01-19T11:47:56.327" v="1835" actId="20577"/>
+          <ac:spMkLst>
+            <pc:docMk/>
+            <pc:sldMk cId="2160857731" sldId="267"/>
+            <ac:spMk id="3" creationId="{EDB5B845-7ECF-C8CA-D17D-80512795703E}"/>
+          </ac:spMkLst>
+        </pc:spChg>
+        <pc:spChg chg="add del mod">
+          <ac:chgData name="Katerina Lama" userId="4e8f923e51bc8f8b" providerId="LiveId" clId="{032BFE3C-8ACE-4959-82C8-F4C52BA9C5BE}" dt="2026-01-19T09:57:47.299" v="1454" actId="21"/>
+          <ac:spMkLst>
+            <pc:docMk/>
+            <pc:sldMk cId="2160857731" sldId="267"/>
+            <ac:spMk id="7" creationId="{9AE14518-D846-A560-4AFA-A54A78984DCC}"/>
+          </ac:spMkLst>
+        </pc:spChg>
+        <pc:spChg chg="add mod">
+          <ac:chgData name="Katerina Lama" userId="4e8f923e51bc8f8b" providerId="LiveId" clId="{032BFE3C-8ACE-4959-82C8-F4C52BA9C5BE}" dt="2026-01-19T11:38:16.237" v="1468" actId="1076"/>
+          <ac:spMkLst>
+            <pc:docMk/>
+            <pc:sldMk cId="2160857731" sldId="267"/>
+            <ac:spMk id="8" creationId="{4C572F5E-7C4C-9E06-CF20-8920B3DDF5B2}"/>
+          </ac:spMkLst>
+        </pc:spChg>
+        <pc:spChg chg="add mod">
+          <ac:chgData name="Katerina Lama" userId="4e8f923e51bc8f8b" providerId="LiveId" clId="{032BFE3C-8ACE-4959-82C8-F4C52BA9C5BE}" dt="2026-01-19T11:47:16.553" v="1790" actId="1076"/>
+          <ac:spMkLst>
+            <pc:docMk/>
+            <pc:sldMk cId="2160857731" sldId="267"/>
+            <ac:spMk id="9" creationId="{F1F254B8-EB45-AABC-7FB5-9EAD57BF7770}"/>
+          </ac:spMkLst>
+        </pc:spChg>
       </pc:sldChg>
     </pc:docChg>
   </pc:docChgLst>
@@ -4415,6 +4535,384 @@
     </p:bg>
     <p:spTree>
       <p:nvGrpSpPr>
+        <p:cNvPr id="1" name="">
+          <a:extLst>
+            <a:ext uri="{FF2B5EF4-FFF2-40B4-BE49-F238E27FC236}">
+              <a16:creationId xmlns:a16="http://schemas.microsoft.com/office/drawing/2014/main" id="{1927E9EA-3F9F-7F49-80F4-B667CADC9C28}"/>
+            </a:ext>
+          </a:extLst>
+        </p:cNvPr>
+        <p:cNvGrpSpPr/>
+        <p:nvPr/>
+      </p:nvGrpSpPr>
+      <p:grpSpPr>
+        <a:xfrm>
+          <a:off x="0" y="0"/>
+          <a:ext cx="0" cy="0"/>
+          <a:chOff x="0" y="0"/>
+          <a:chExt cx="0" cy="0"/>
+        </a:xfrm>
+      </p:grpSpPr>
+      <p:sp>
+        <p:nvSpPr>
+          <p:cNvPr id="3" name="TextBox 2">
+            <a:extLst>
+              <a:ext uri="{FF2B5EF4-FFF2-40B4-BE49-F238E27FC236}">
+                <a16:creationId xmlns:a16="http://schemas.microsoft.com/office/drawing/2014/main" id="{05E9CA35-2279-F504-70FF-7C303C0D4D2C}"/>
+              </a:ext>
+            </a:extLst>
+          </p:cNvPr>
+          <p:cNvSpPr txBox="1"/>
+          <p:nvPr/>
+        </p:nvSpPr>
+        <p:spPr>
+          <a:xfrm>
+            <a:off x="902240" y="762329"/>
+            <a:ext cx="10387519" cy="1661993"/>
+          </a:xfrm>
+          <a:prstGeom prst="rect">
+            <a:avLst/>
+          </a:prstGeom>
+          <a:noFill/>
+        </p:spPr>
+        <p:txBody>
+          <a:bodyPr wrap="square" rtlCol="0">
+            <a:spAutoFit/>
+          </a:bodyPr>
+          <a:lstStyle/>
+          <a:p>
+            <a:r>
+              <a:rPr lang="en-US" sz="1600" dirty="0">
+                <a:latin typeface="Arial" panose="020B0604020202020204" pitchFamily="34" charset="0"/>
+                <a:cs typeface="Arial" panose="020B0604020202020204" pitchFamily="34" charset="0"/>
+              </a:rPr>
+              <a:t>What types of food production should be </a:t>
+            </a:r>
+          </a:p>
+          <a:p>
+            <a:r>
+              <a:rPr lang="en-US" sz="1600" dirty="0">
+                <a:latin typeface="Arial" panose="020B0604020202020204" pitchFamily="34" charset="0"/>
+                <a:cs typeface="Arial" panose="020B0604020202020204" pitchFamily="34" charset="0"/>
+              </a:rPr>
+              <a:t>encouraged to consume nutritious diet in </a:t>
+            </a:r>
+          </a:p>
+          <a:p>
+            <a:r>
+              <a:rPr lang="en-US" sz="1600" dirty="0">
+                <a:latin typeface="Arial" panose="020B0604020202020204" pitchFamily="34" charset="0"/>
+                <a:cs typeface="Arial" panose="020B0604020202020204" pitchFamily="34" charset="0"/>
+              </a:rPr>
+              <a:t>a sustainable way?</a:t>
+            </a:r>
+          </a:p>
+          <a:p>
+            <a:endParaRPr lang="en-US" dirty="0"/>
+          </a:p>
+          <a:p>
+            <a:r>
+              <a:rPr lang="en-US" sz="1600" dirty="0">
+                <a:latin typeface="Arial" panose="020B0604020202020204" pitchFamily="34" charset="0"/>
+                <a:cs typeface="Arial" panose="020B0604020202020204" pitchFamily="34" charset="0"/>
+              </a:rPr>
+              <a:t>How food production affects the land use?</a:t>
+            </a:r>
+          </a:p>
+          <a:p>
+            <a:endParaRPr lang="en-US" dirty="0"/>
+          </a:p>
+        </p:txBody>
+      </p:sp>
+      <p:pic>
+        <p:nvPicPr>
+          <p:cNvPr id="5" name="Picture 4">
+            <a:extLst>
+              <a:ext uri="{FF2B5EF4-FFF2-40B4-BE49-F238E27FC236}">
+                <a16:creationId xmlns:a16="http://schemas.microsoft.com/office/drawing/2014/main" id="{07973527-BF04-A647-8506-C71D5BB2731E}"/>
+              </a:ext>
+            </a:extLst>
+          </p:cNvPr>
+          <p:cNvPicPr>
+            <a:picLocks noChangeAspect="1"/>
+          </p:cNvPicPr>
+          <p:nvPr/>
+        </p:nvPicPr>
+        <p:blipFill>
+          <a:blip r:embed="rId2"/>
+          <a:srcRect b="3505"/>
+          <a:stretch>
+            <a:fillRect/>
+          </a:stretch>
+        </p:blipFill>
+        <p:spPr>
+          <a:xfrm>
+            <a:off x="1422141" y="2128273"/>
+            <a:ext cx="3537057" cy="2470598"/>
+          </a:xfrm>
+          <a:prstGeom prst="rect">
+            <a:avLst/>
+          </a:prstGeom>
+        </p:spPr>
+      </p:pic>
+      <p:pic>
+        <p:nvPicPr>
+          <p:cNvPr id="7" name="Picture 6">
+            <a:extLst>
+              <a:ext uri="{FF2B5EF4-FFF2-40B4-BE49-F238E27FC236}">
+                <a16:creationId xmlns:a16="http://schemas.microsoft.com/office/drawing/2014/main" id="{158EAB36-3BE5-1A70-A41F-46B120E23CB3}"/>
+              </a:ext>
+            </a:extLst>
+          </p:cNvPr>
+          <p:cNvPicPr>
+            <a:picLocks noChangeAspect="1"/>
+          </p:cNvPicPr>
+          <p:nvPr/>
+        </p:nvPicPr>
+        <p:blipFill>
+          <a:blip r:embed="rId3"/>
+          <a:stretch>
+            <a:fillRect/>
+          </a:stretch>
+        </p:blipFill>
+        <p:spPr>
+          <a:xfrm>
+            <a:off x="6015054" y="753979"/>
+            <a:ext cx="6077746" cy="1828800"/>
+          </a:xfrm>
+          <a:prstGeom prst="rect">
+            <a:avLst/>
+          </a:prstGeom>
+        </p:spPr>
+      </p:pic>
+      <p:pic>
+        <p:nvPicPr>
+          <p:cNvPr id="9" name="Picture 8">
+            <a:extLst>
+              <a:ext uri="{FF2B5EF4-FFF2-40B4-BE49-F238E27FC236}">
+                <a16:creationId xmlns:a16="http://schemas.microsoft.com/office/drawing/2014/main" id="{C9EDF481-BDD0-9258-04C3-78D744A9A659}"/>
+              </a:ext>
+            </a:extLst>
+          </p:cNvPr>
+          <p:cNvPicPr>
+            <a:picLocks noChangeAspect="1"/>
+          </p:cNvPicPr>
+          <p:nvPr/>
+        </p:nvPicPr>
+        <p:blipFill>
+          <a:blip r:embed="rId4"/>
+          <a:stretch>
+            <a:fillRect/>
+          </a:stretch>
+        </p:blipFill>
+        <p:spPr>
+          <a:xfrm>
+            <a:off x="6015054" y="2582779"/>
+            <a:ext cx="6077746" cy="2103120"/>
+          </a:xfrm>
+          <a:prstGeom prst="rect">
+            <a:avLst/>
+          </a:prstGeom>
+        </p:spPr>
+      </p:pic>
+      <p:pic>
+        <p:nvPicPr>
+          <p:cNvPr id="11" name="Picture 10">
+            <a:extLst>
+              <a:ext uri="{FF2B5EF4-FFF2-40B4-BE49-F238E27FC236}">
+                <a16:creationId xmlns:a16="http://schemas.microsoft.com/office/drawing/2014/main" id="{4B42371C-5AC0-31C1-AB66-DEB02F3DCD2D}"/>
+              </a:ext>
+            </a:extLst>
+          </p:cNvPr>
+          <p:cNvPicPr>
+            <a:picLocks noChangeAspect="1"/>
+          </p:cNvPicPr>
+          <p:nvPr/>
+        </p:nvPicPr>
+        <p:blipFill>
+          <a:blip r:embed="rId5"/>
+          <a:stretch>
+            <a:fillRect/>
+          </a:stretch>
+        </p:blipFill>
+        <p:spPr>
+          <a:xfrm>
+            <a:off x="6015054" y="4685899"/>
+            <a:ext cx="6077745" cy="2124838"/>
+          </a:xfrm>
+          <a:prstGeom prst="rect">
+            <a:avLst/>
+          </a:prstGeom>
+        </p:spPr>
+      </p:pic>
+      <p:pic>
+        <p:nvPicPr>
+          <p:cNvPr id="13" name="Picture 12">
+            <a:extLst>
+              <a:ext uri="{FF2B5EF4-FFF2-40B4-BE49-F238E27FC236}">
+                <a16:creationId xmlns:a16="http://schemas.microsoft.com/office/drawing/2014/main" id="{A87D3E5C-A51A-868F-F152-99064B34671C}"/>
+              </a:ext>
+            </a:extLst>
+          </p:cNvPr>
+          <p:cNvPicPr>
+            <a:picLocks noChangeAspect="1"/>
+          </p:cNvPicPr>
+          <p:nvPr/>
+        </p:nvPicPr>
+        <p:blipFill>
+          <a:blip r:embed="rId6"/>
+          <a:stretch>
+            <a:fillRect/>
+          </a:stretch>
+        </p:blipFill>
+        <p:spPr>
+          <a:xfrm>
+            <a:off x="559338" y="4667172"/>
+            <a:ext cx="5262665" cy="2143565"/>
+          </a:xfrm>
+          <a:prstGeom prst="rect">
+            <a:avLst/>
+          </a:prstGeom>
+        </p:spPr>
+      </p:pic>
+      <p:sp>
+        <p:nvSpPr>
+          <p:cNvPr id="15" name="Rectangle 14">
+            <a:extLst>
+              <a:ext uri="{FF2B5EF4-FFF2-40B4-BE49-F238E27FC236}">
+                <a16:creationId xmlns:a16="http://schemas.microsoft.com/office/drawing/2014/main" id="{C5874D17-AF96-70D2-56B9-961E334B4F74}"/>
+              </a:ext>
+            </a:extLst>
+          </p:cNvPr>
+          <p:cNvSpPr/>
+          <p:nvPr/>
+        </p:nvSpPr>
+        <p:spPr>
+          <a:xfrm>
+            <a:off x="674915" y="140854"/>
+            <a:ext cx="11321142" cy="547136"/>
+          </a:xfrm>
+          <a:prstGeom prst="rect">
+            <a:avLst/>
+          </a:prstGeom>
+          <a:solidFill>
+            <a:srgbClr val="0070C0"/>
+          </a:solidFill>
+        </p:spPr>
+        <p:style>
+          <a:lnRef idx="2">
+            <a:schemeClr val="accent1">
+              <a:shade val="15000"/>
+            </a:schemeClr>
+          </a:lnRef>
+          <a:fillRef idx="1">
+            <a:schemeClr val="accent1"/>
+          </a:fillRef>
+          <a:effectRef idx="0">
+            <a:schemeClr val="accent1"/>
+          </a:effectRef>
+          <a:fontRef idx="minor">
+            <a:schemeClr val="lt1"/>
+          </a:fontRef>
+        </p:style>
+        <p:txBody>
+          <a:bodyPr rtlCol="0" anchor="ctr"/>
+          <a:lstStyle/>
+          <a:p>
+            <a:pPr algn="ctr"/>
+            <a:endParaRPr lang="en-US"/>
+          </a:p>
+        </p:txBody>
+      </p:sp>
+      <p:sp>
+        <p:nvSpPr>
+          <p:cNvPr id="21" name="Title 1">
+            <a:extLst>
+              <a:ext uri="{FF2B5EF4-FFF2-40B4-BE49-F238E27FC236}">
+                <a16:creationId xmlns:a16="http://schemas.microsoft.com/office/drawing/2014/main" id="{A3AF37B0-94AB-AE73-981E-475BEED7C275}"/>
+              </a:ext>
+            </a:extLst>
+          </p:cNvPr>
+          <p:cNvSpPr txBox="1">
+            <a:spLocks/>
+          </p:cNvSpPr>
+          <p:nvPr/>
+        </p:nvSpPr>
+        <p:spPr>
+          <a:xfrm>
+            <a:off x="1973057" y="-204841"/>
+            <a:ext cx="10515600" cy="1325563"/>
+          </a:xfrm>
+          <a:prstGeom prst="rect">
+            <a:avLst/>
+          </a:prstGeom>
+        </p:spPr>
+        <p:txBody>
+          <a:bodyPr vert="horz" lIns="91440" tIns="45720" rIns="91440" bIns="45720" rtlCol="0" anchor="ctr">
+            <a:normAutofit/>
+          </a:bodyPr>
+          <a:lstStyle>
+            <a:lvl1pPr algn="l" defTabSz="914400" rtl="0" eaLnBrk="1" latinLnBrk="0" hangingPunct="1">
+              <a:lnSpc>
+                <a:spcPct val="90000"/>
+              </a:lnSpc>
+              <a:spcBef>
+                <a:spcPct val="0"/>
+              </a:spcBef>
+              <a:buNone/>
+              <a:defRPr sz="4400" kern="1200">
+                <a:solidFill>
+                  <a:schemeClr val="tx1"/>
+                </a:solidFill>
+                <a:latin typeface="+mj-lt"/>
+                <a:ea typeface="+mj-ea"/>
+                <a:cs typeface="+mj-cs"/>
+              </a:defRPr>
+            </a:lvl1pPr>
+          </a:lstStyle>
+          <a:p>
+            <a:r>
+              <a:rPr lang="en-US" sz="3600" b="1" dirty="0">
+                <a:solidFill>
+                  <a:schemeClr val="bg1"/>
+                </a:solidFill>
+                <a:latin typeface="Arial" panose="020B0604020202020204" pitchFamily="34" charset="0"/>
+                <a:cs typeface="Arial" panose="020B0604020202020204" pitchFamily="34" charset="0"/>
+              </a:rPr>
+              <a:t>Food Product vs Land Use Change</a:t>
+            </a:r>
+          </a:p>
+        </p:txBody>
+      </p:sp>
+    </p:spTree>
+    <p:extLst>
+      <p:ext uri="{BB962C8B-B14F-4D97-AF65-F5344CB8AC3E}">
+        <p14:creationId xmlns:p14="http://schemas.microsoft.com/office/powerpoint/2010/main" val="1224935063"/>
+      </p:ext>
+    </p:extLst>
+  </p:cSld>
+  <p:clrMapOvr>
+    <a:masterClrMapping/>
+  </p:clrMapOvr>
+</p:sld>
+</file>
+
+<file path=ppt/slides/slide11.xml><?xml version="1.0" encoding="utf-8"?>
+<p:sld xmlns:a="http://schemas.openxmlformats.org/drawingml/2006/main" xmlns:r="http://schemas.openxmlformats.org/officeDocument/2006/relationships" xmlns:p="http://schemas.openxmlformats.org/presentationml/2006/main">
+  <p:cSld>
+    <p:bg>
+      <p:bgPr>
+        <a:solidFill>
+          <a:schemeClr val="tx2">
+            <a:lumMod val="10000"/>
+            <a:lumOff val="90000"/>
+          </a:schemeClr>
+        </a:solidFill>
+        <a:effectLst/>
+      </p:bgPr>
+    </p:bg>
+    <p:spTree>
+      <p:nvGrpSpPr>
         <p:cNvPr id="1" name=""/>
         <p:cNvGrpSpPr/>
         <p:nvPr/>
@@ -4738,13 +5236,7 @@
     </p:bg>
     <p:spTree>
       <p:nvGrpSpPr>
-        <p:cNvPr id="1" name="">
-          <a:extLst>
-            <a:ext uri="{FF2B5EF4-FFF2-40B4-BE49-F238E27FC236}">
-              <a16:creationId xmlns:a16="http://schemas.microsoft.com/office/drawing/2014/main" id="{0F8FBD29-63F0-BCFD-1E32-782CDB1410DD}"/>
-            </a:ext>
-          </a:extLst>
-        </p:cNvPr>
+        <p:cNvPr id="1" name=""/>
         <p:cNvGrpSpPr/>
         <p:nvPr/>
       </p:nvGrpSpPr>
@@ -4758,48 +5250,140 @@
       </p:grpSpPr>
       <p:sp>
         <p:nvSpPr>
-          <p:cNvPr id="4" name="TextBox 3">
-            <a:extLst>
-              <a:ext uri="{FF2B5EF4-FFF2-40B4-BE49-F238E27FC236}">
-                <a16:creationId xmlns:a16="http://schemas.microsoft.com/office/drawing/2014/main" id="{A5DD30A3-38AC-BBF8-A3D8-79E07460607C}"/>
-              </a:ext>
-            </a:extLst>
-          </p:cNvPr>
-          <p:cNvSpPr txBox="1"/>
-          <p:nvPr/>
-        </p:nvSpPr>
-        <p:spPr>
-          <a:xfrm>
-            <a:off x="2582231" y="1040917"/>
-            <a:ext cx="9443936" cy="369332"/>
-          </a:xfrm>
-          <a:prstGeom prst="rect">
-            <a:avLst/>
-          </a:prstGeom>
-          <a:noFill/>
-        </p:spPr>
-        <p:txBody>
-          <a:bodyPr wrap="square" rtlCol="0">
-            <a:spAutoFit/>
+          <p:cNvPr id="3" name="Content Placeholder 2">
+            <a:extLst>
+              <a:ext uri="{FF2B5EF4-FFF2-40B4-BE49-F238E27FC236}">
+                <a16:creationId xmlns:a16="http://schemas.microsoft.com/office/drawing/2014/main" id="{EDB5B845-7ECF-C8CA-D17D-80512795703E}"/>
+              </a:ext>
+            </a:extLst>
+          </p:cNvPr>
+          <p:cNvSpPr>
+            <a:spLocks noGrp="1"/>
+          </p:cNvSpPr>
+          <p:nvPr>
+            <p:ph idx="1"/>
+          </p:nvPr>
+        </p:nvSpPr>
+        <p:spPr>
+          <a:xfrm>
+            <a:off x="838200" y="1712069"/>
+            <a:ext cx="10515600" cy="4464894"/>
+          </a:xfrm>
+        </p:spPr>
+        <p:txBody>
+          <a:bodyPr>
+            <a:normAutofit/>
           </a:bodyPr>
           <a:lstStyle/>
           <a:p>
-            <a:r>
-              <a:rPr lang="en-US" dirty="0">
+            <a:pPr marL="0" indent="0">
+              <a:buNone/>
+            </a:pPr>
+            <a:r>
+              <a:rPr lang="en-US" sz="2000" b="1" u="sng" dirty="0">
                 <a:latin typeface="Arial" panose="020B0604020202020204" pitchFamily="34" charset="0"/>
                 <a:cs typeface="Arial" panose="020B0604020202020204" pitchFamily="34" charset="0"/>
               </a:rPr>
-              <a:t>Which types of food have more negative impact on the environment?</a:t>
-            </a:r>
-          </a:p>
-        </p:txBody>
-      </p:sp>
-      <p:sp>
-        <p:nvSpPr>
-          <p:cNvPr id="7" name="Rectangle 6">
-            <a:extLst>
-              <a:ext uri="{FF2B5EF4-FFF2-40B4-BE49-F238E27FC236}">
-                <a16:creationId xmlns:a16="http://schemas.microsoft.com/office/drawing/2014/main" id="{D6B07252-7E25-63AF-B0AC-38E1F437E7D1}"/>
+              <a:t>Important Key Takeaways</a:t>
+            </a:r>
+          </a:p>
+          <a:p>
+            <a:r>
+              <a:rPr lang="en-US" sz="2000" dirty="0">
+                <a:latin typeface="Arial" panose="020B0604020202020204" pitchFamily="34" charset="0"/>
+                <a:cs typeface="Arial" panose="020B0604020202020204" pitchFamily="34" charset="0"/>
+              </a:rPr>
+              <a:t>High impact on CO</a:t>
+            </a:r>
+            <a:r>
+              <a:rPr lang="en-US" sz="2000" baseline="-25000" dirty="0">
+                <a:latin typeface="Arial" panose="020B0604020202020204" pitchFamily="34" charset="0"/>
+                <a:cs typeface="Arial" panose="020B0604020202020204" pitchFamily="34" charset="0"/>
+              </a:rPr>
+              <a:t>2</a:t>
+            </a:r>
+            <a:r>
+              <a:rPr lang="en-US" sz="2000" dirty="0">
+                <a:latin typeface="Arial" panose="020B0604020202020204" pitchFamily="34" charset="0"/>
+                <a:cs typeface="Arial" panose="020B0604020202020204" pitchFamily="34" charset="0"/>
+              </a:rPr>
+              <a:t> emissions is derived from:</a:t>
+            </a:r>
+          </a:p>
+          <a:p>
+            <a:pPr marL="0" indent="0">
+              <a:buNone/>
+            </a:pPr>
+            <a:r>
+              <a:rPr lang="en-US" sz="2000" dirty="0">
+                <a:latin typeface="Arial" panose="020B0604020202020204" pitchFamily="34" charset="0"/>
+                <a:cs typeface="Arial" panose="020B0604020202020204" pitchFamily="34" charset="0"/>
+              </a:rPr>
+              <a:t>   Meat and dairy products</a:t>
+            </a:r>
+          </a:p>
+          <a:p>
+            <a:pPr marL="0" indent="0">
+              <a:buNone/>
+            </a:pPr>
+            <a:r>
+              <a:rPr lang="en-US" sz="2000" dirty="0">
+                <a:latin typeface="Arial" panose="020B0604020202020204" pitchFamily="34" charset="0"/>
+                <a:cs typeface="Arial" panose="020B0604020202020204" pitchFamily="34" charset="0"/>
+              </a:rPr>
+              <a:t>   Shrimps and oils (palm, soya etc.)</a:t>
+            </a:r>
+          </a:p>
+          <a:p>
+            <a:pPr marL="0" indent="0">
+              <a:buNone/>
+            </a:pPr>
+            <a:r>
+              <a:rPr lang="en-US" sz="2000" dirty="0">
+                <a:latin typeface="Arial" panose="020B0604020202020204" pitchFamily="34" charset="0"/>
+                <a:cs typeface="Arial" panose="020B0604020202020204" pitchFamily="34" charset="0"/>
+              </a:rPr>
+              <a:t>   Animal based or high protein products</a:t>
+            </a:r>
+          </a:p>
+          <a:p>
+            <a:r>
+              <a:rPr lang="en-US" sz="2000" dirty="0">
+                <a:latin typeface="Arial" panose="020B0604020202020204" pitchFamily="34" charset="0"/>
+                <a:cs typeface="Arial" panose="020B0604020202020204" pitchFamily="34" charset="0"/>
+              </a:rPr>
+              <a:t>Farming production stage</a:t>
+            </a:r>
+          </a:p>
+          <a:p>
+            <a:r>
+              <a:rPr lang="en-US" sz="2000" dirty="0">
+                <a:latin typeface="Arial" panose="020B0604020202020204" pitchFamily="34" charset="0"/>
+                <a:cs typeface="Arial" panose="020B0604020202020204" pitchFamily="34" charset="0"/>
+              </a:rPr>
+              <a:t>Sustainability is affected from “Land Use Change”</a:t>
+            </a:r>
+          </a:p>
+          <a:p>
+            <a:endParaRPr lang="en-US" sz="2000" dirty="0">
+              <a:latin typeface="Arial" panose="020B0604020202020204" pitchFamily="34" charset="0"/>
+              <a:cs typeface="Arial" panose="020B0604020202020204" pitchFamily="34" charset="0"/>
+            </a:endParaRPr>
+          </a:p>
+          <a:p>
+            <a:endParaRPr lang="en-US" sz="2000" dirty="0">
+              <a:latin typeface="Arial" panose="020B0604020202020204" pitchFamily="34" charset="0"/>
+              <a:cs typeface="Arial" panose="020B0604020202020204" pitchFamily="34" charset="0"/>
+            </a:endParaRPr>
+          </a:p>
+        </p:txBody>
+      </p:sp>
+      <p:sp>
+        <p:nvSpPr>
+          <p:cNvPr id="8" name="Rectangle 7">
+            <a:extLst>
+              <a:ext uri="{FF2B5EF4-FFF2-40B4-BE49-F238E27FC236}">
+                <a16:creationId xmlns:a16="http://schemas.microsoft.com/office/drawing/2014/main" id="{4C572F5E-7C4C-9E06-CF20-8920B3DDF5B2}"/>
               </a:ext>
             </a:extLst>
           </p:cNvPr>
@@ -4808,8 +5392,8 @@
         </p:nvSpPr>
         <p:spPr>
           <a:xfrm>
-            <a:off x="952499" y="140854"/>
-            <a:ext cx="10287001" cy="831912"/>
+            <a:off x="838200" y="153858"/>
+            <a:ext cx="10515600" cy="1054359"/>
           </a:xfrm>
           <a:prstGeom prst="rect">
             <a:avLst/>
@@ -4845,168 +5429,47 @@
       </p:sp>
       <p:sp>
         <p:nvSpPr>
-          <p:cNvPr id="10" name="Title 1">
-            <a:extLst>
-              <a:ext uri="{FF2B5EF4-FFF2-40B4-BE49-F238E27FC236}">
-                <a16:creationId xmlns:a16="http://schemas.microsoft.com/office/drawing/2014/main" id="{8E194144-456F-0114-7581-205897A2D291}"/>
-              </a:ext>
-            </a:extLst>
-          </p:cNvPr>
-          <p:cNvSpPr txBox="1">
-            <a:spLocks/>
-          </p:cNvSpPr>
+          <p:cNvPr id="9" name="TextBox 8">
+            <a:extLst>
+              <a:ext uri="{FF2B5EF4-FFF2-40B4-BE49-F238E27FC236}">
+                <a16:creationId xmlns:a16="http://schemas.microsoft.com/office/drawing/2014/main" id="{F1F254B8-EB45-AABC-7FB5-9EAD57BF7770}"/>
+              </a:ext>
+            </a:extLst>
+          </p:cNvPr>
+          <p:cNvSpPr txBox="1"/>
           <p:nvPr/>
         </p:nvSpPr>
         <p:spPr>
           <a:xfrm>
-            <a:off x="3000288" y="-84591"/>
-            <a:ext cx="10515600" cy="1325563"/>
+            <a:off x="4198296" y="419427"/>
+            <a:ext cx="5204298" cy="523220"/>
           </a:xfrm>
           <a:prstGeom prst="rect">
             <a:avLst/>
           </a:prstGeom>
-        </p:spPr>
-        <p:txBody>
-          <a:bodyPr vert="horz" lIns="91440" tIns="45720" rIns="91440" bIns="45720" rtlCol="0" anchor="ctr">
-            <a:normAutofit/>
+          <a:noFill/>
+        </p:spPr>
+        <p:txBody>
+          <a:bodyPr wrap="square" rtlCol="0">
+            <a:spAutoFit/>
           </a:bodyPr>
-          <a:lstStyle>
-            <a:lvl1pPr algn="l" defTabSz="914400" rtl="0" eaLnBrk="1" latinLnBrk="0" hangingPunct="1">
-              <a:lnSpc>
-                <a:spcPct val="90000"/>
-              </a:lnSpc>
-              <a:spcBef>
-                <a:spcPct val="0"/>
-              </a:spcBef>
-              <a:buNone/>
-              <a:defRPr sz="4400" kern="1200">
-                <a:solidFill>
-                  <a:schemeClr val="tx1"/>
-                </a:solidFill>
-                <a:latin typeface="+mj-lt"/>
-                <a:ea typeface="+mj-ea"/>
-                <a:cs typeface="+mj-cs"/>
-              </a:defRPr>
-            </a:lvl1pPr>
-          </a:lstStyle>
+          <a:lstStyle/>
           <a:p>
             <a:r>
               <a:rPr lang="en-US" sz="2800" b="1" dirty="0">
                 <a:solidFill>
                   <a:schemeClr val="bg1"/>
                 </a:solidFill>
-                <a:latin typeface="Arial" panose="020B0604020202020204" pitchFamily="34" charset="0"/>
-                <a:cs typeface="Arial" panose="020B0604020202020204" pitchFamily="34" charset="0"/>
               </a:rPr>
-              <a:t>Total Emissions per Food Product</a:t>
-            </a:r>
-          </a:p>
-        </p:txBody>
-      </p:sp>
-      <p:pic>
-        <p:nvPicPr>
-          <p:cNvPr id="3" name="Picture 2">
-            <a:extLst>
-              <a:ext uri="{FF2B5EF4-FFF2-40B4-BE49-F238E27FC236}">
-                <a16:creationId xmlns:a16="http://schemas.microsoft.com/office/drawing/2014/main" id="{AF0F3ACF-75E7-9ADB-67FC-F6521DEB7A1B}"/>
-              </a:ext>
-            </a:extLst>
-          </p:cNvPr>
-          <p:cNvPicPr>
-            <a:picLocks noChangeAspect="1"/>
-          </p:cNvPicPr>
-          <p:nvPr/>
-        </p:nvPicPr>
-        <p:blipFill>
-          <a:blip r:embed="rId2"/>
-          <a:srcRect l="1207"/>
-          <a:stretch>
-            <a:fillRect/>
-          </a:stretch>
-        </p:blipFill>
-        <p:spPr>
-          <a:xfrm>
-            <a:off x="1792071" y="4559060"/>
-            <a:ext cx="8823598" cy="2133785"/>
-          </a:xfrm>
-          <a:prstGeom prst="rect">
-            <a:avLst/>
-          </a:prstGeom>
-        </p:spPr>
-      </p:pic>
-      <p:sp>
-        <p:nvSpPr>
-          <p:cNvPr id="5" name="TextBox 4">
-            <a:extLst>
-              <a:ext uri="{FF2B5EF4-FFF2-40B4-BE49-F238E27FC236}">
-                <a16:creationId xmlns:a16="http://schemas.microsoft.com/office/drawing/2014/main" id="{B96904F5-6BD9-9CD9-D0CF-2B5A87FB8B28}"/>
-              </a:ext>
-            </a:extLst>
-          </p:cNvPr>
-          <p:cNvSpPr txBox="1"/>
-          <p:nvPr/>
-        </p:nvSpPr>
-        <p:spPr>
-          <a:xfrm>
-            <a:off x="3123738" y="4022649"/>
-            <a:ext cx="9443936" cy="369332"/>
-          </a:xfrm>
-          <a:prstGeom prst="rect">
-            <a:avLst/>
-          </a:prstGeom>
-          <a:noFill/>
-        </p:spPr>
-        <p:txBody>
-          <a:bodyPr wrap="square" rtlCol="0">
-            <a:spAutoFit/>
-          </a:bodyPr>
-          <a:lstStyle/>
-          <a:p>
-            <a:r>
-              <a:rPr lang="en-US" dirty="0">
-                <a:latin typeface="Arial" panose="020B0604020202020204" pitchFamily="34" charset="0"/>
-                <a:cs typeface="Arial" panose="020B0604020202020204" pitchFamily="34" charset="0"/>
-              </a:rPr>
-              <a:t>Animal-Based Products vs Plant-Based Products</a:t>
-            </a:r>
-          </a:p>
-        </p:txBody>
-      </p:sp>
-      <p:pic>
-        <p:nvPicPr>
-          <p:cNvPr id="9" name="Picture 8">
-            <a:extLst>
-              <a:ext uri="{FF2B5EF4-FFF2-40B4-BE49-F238E27FC236}">
-                <a16:creationId xmlns:a16="http://schemas.microsoft.com/office/drawing/2014/main" id="{523A191B-8090-7768-351C-FF8326BC3FB6}"/>
-              </a:ext>
-            </a:extLst>
-          </p:cNvPr>
-          <p:cNvPicPr>
-            <a:picLocks noChangeAspect="1"/>
-          </p:cNvPicPr>
-          <p:nvPr/>
-        </p:nvPicPr>
-        <p:blipFill>
-          <a:blip r:embed="rId3"/>
-          <a:srcRect l="345" r="1017" b="4163"/>
-          <a:stretch>
-            <a:fillRect/>
-          </a:stretch>
-        </p:blipFill>
-        <p:spPr>
-          <a:xfrm>
-            <a:off x="1828800" y="1577193"/>
-            <a:ext cx="8750141" cy="2377440"/>
-          </a:xfrm>
-          <a:prstGeom prst="rect">
-            <a:avLst/>
-          </a:prstGeom>
-        </p:spPr>
-      </p:pic>
+              <a:t>Executive Summary</a:t>
+            </a:r>
+          </a:p>
+        </p:txBody>
+      </p:sp>
     </p:spTree>
     <p:extLst>
       <p:ext uri="{BB962C8B-B14F-4D97-AF65-F5344CB8AC3E}">
-        <p14:creationId xmlns:p14="http://schemas.microsoft.com/office/powerpoint/2010/main" val="3943745945"/>
+        <p14:creationId xmlns:p14="http://schemas.microsoft.com/office/powerpoint/2010/main" val="2160857731"/>
       </p:ext>
     </p:extLst>
   </p:cSld>
@@ -5035,7 +5498,7 @@
         <p:cNvPr id="1" name="">
           <a:extLst>
             <a:ext uri="{FF2B5EF4-FFF2-40B4-BE49-F238E27FC236}">
-              <a16:creationId xmlns:a16="http://schemas.microsoft.com/office/drawing/2014/main" id="{1927E9EA-3F9F-7F49-80F4-B667CADC9C28}"/>
+              <a16:creationId xmlns:a16="http://schemas.microsoft.com/office/drawing/2014/main" id="{0F8FBD29-63F0-BCFD-1E32-782CDB1410DD}"/>
             </a:ext>
           </a:extLst>
         </p:cNvPr>
@@ -5052,10 +5515,10 @@
       </p:grpSpPr>
       <p:sp>
         <p:nvSpPr>
-          <p:cNvPr id="3" name="TextBox 2">
-            <a:extLst>
-              <a:ext uri="{FF2B5EF4-FFF2-40B4-BE49-F238E27FC236}">
-                <a16:creationId xmlns:a16="http://schemas.microsoft.com/office/drawing/2014/main" id="{05E9CA35-2279-F504-70FF-7C303C0D4D2C}"/>
+          <p:cNvPr id="4" name="TextBox 3">
+            <a:extLst>
+              <a:ext uri="{FF2B5EF4-FFF2-40B4-BE49-F238E27FC236}">
+                <a16:creationId xmlns:a16="http://schemas.microsoft.com/office/drawing/2014/main" id="{A5DD30A3-38AC-BBF8-A3D8-79E07460607C}"/>
               </a:ext>
             </a:extLst>
           </p:cNvPr>
@@ -5064,8 +5527,8 @@
         </p:nvSpPr>
         <p:spPr>
           <a:xfrm>
-            <a:off x="902240" y="762329"/>
-            <a:ext cx="10387519" cy="1661993"/>
+            <a:off x="2582231" y="1040917"/>
+            <a:ext cx="9443936" cy="369332"/>
           </a:xfrm>
           <a:prstGeom prst="rect">
             <a:avLst/>
@@ -5079,205 +5542,21 @@
           <a:lstStyle/>
           <a:p>
             <a:r>
-              <a:rPr lang="en-US" sz="1600" dirty="0">
+              <a:rPr lang="en-US" dirty="0">
                 <a:latin typeface="Arial" panose="020B0604020202020204" pitchFamily="34" charset="0"/>
                 <a:cs typeface="Arial" panose="020B0604020202020204" pitchFamily="34" charset="0"/>
               </a:rPr>
-              <a:t>What types of food production should be </a:t>
-            </a:r>
-          </a:p>
-          <a:p>
-            <a:r>
-              <a:rPr lang="en-US" sz="1600" dirty="0">
-                <a:latin typeface="Arial" panose="020B0604020202020204" pitchFamily="34" charset="0"/>
-                <a:cs typeface="Arial" panose="020B0604020202020204" pitchFamily="34" charset="0"/>
-              </a:rPr>
-              <a:t>encouraged to consume nutritious diet in </a:t>
-            </a:r>
-          </a:p>
-          <a:p>
-            <a:r>
-              <a:rPr lang="en-US" sz="1600" dirty="0">
-                <a:latin typeface="Arial" panose="020B0604020202020204" pitchFamily="34" charset="0"/>
-                <a:cs typeface="Arial" panose="020B0604020202020204" pitchFamily="34" charset="0"/>
-              </a:rPr>
-              <a:t>a sustainable way?</a:t>
-            </a:r>
-          </a:p>
-          <a:p>
-            <a:endParaRPr lang="en-US" dirty="0"/>
-          </a:p>
-          <a:p>
-            <a:r>
-              <a:rPr lang="en-US" sz="1600" dirty="0">
-                <a:latin typeface="Arial" panose="020B0604020202020204" pitchFamily="34" charset="0"/>
-                <a:cs typeface="Arial" panose="020B0604020202020204" pitchFamily="34" charset="0"/>
-              </a:rPr>
-              <a:t>How food production affects the land use?</a:t>
-            </a:r>
-          </a:p>
-          <a:p>
-            <a:endParaRPr lang="en-US" dirty="0"/>
-          </a:p>
-        </p:txBody>
-      </p:sp>
-      <p:pic>
-        <p:nvPicPr>
-          <p:cNvPr id="5" name="Picture 4">
-            <a:extLst>
-              <a:ext uri="{FF2B5EF4-FFF2-40B4-BE49-F238E27FC236}">
-                <a16:creationId xmlns:a16="http://schemas.microsoft.com/office/drawing/2014/main" id="{07973527-BF04-A647-8506-C71D5BB2731E}"/>
-              </a:ext>
-            </a:extLst>
-          </p:cNvPr>
-          <p:cNvPicPr>
-            <a:picLocks noChangeAspect="1"/>
-          </p:cNvPicPr>
-          <p:nvPr/>
-        </p:nvPicPr>
-        <p:blipFill>
-          <a:blip r:embed="rId2"/>
-          <a:srcRect b="3505"/>
-          <a:stretch>
-            <a:fillRect/>
-          </a:stretch>
-        </p:blipFill>
-        <p:spPr>
-          <a:xfrm>
-            <a:off x="1422141" y="2128273"/>
-            <a:ext cx="3537057" cy="2470598"/>
-          </a:xfrm>
-          <a:prstGeom prst="rect">
-            <a:avLst/>
-          </a:prstGeom>
-        </p:spPr>
-      </p:pic>
-      <p:pic>
-        <p:nvPicPr>
-          <p:cNvPr id="7" name="Picture 6">
-            <a:extLst>
-              <a:ext uri="{FF2B5EF4-FFF2-40B4-BE49-F238E27FC236}">
-                <a16:creationId xmlns:a16="http://schemas.microsoft.com/office/drawing/2014/main" id="{158EAB36-3BE5-1A70-A41F-46B120E23CB3}"/>
-              </a:ext>
-            </a:extLst>
-          </p:cNvPr>
-          <p:cNvPicPr>
-            <a:picLocks noChangeAspect="1"/>
-          </p:cNvPicPr>
-          <p:nvPr/>
-        </p:nvPicPr>
-        <p:blipFill>
-          <a:blip r:embed="rId3"/>
-          <a:stretch>
-            <a:fillRect/>
-          </a:stretch>
-        </p:blipFill>
-        <p:spPr>
-          <a:xfrm>
-            <a:off x="6015054" y="753979"/>
-            <a:ext cx="6077746" cy="1828800"/>
-          </a:xfrm>
-          <a:prstGeom prst="rect">
-            <a:avLst/>
-          </a:prstGeom>
-        </p:spPr>
-      </p:pic>
-      <p:pic>
-        <p:nvPicPr>
-          <p:cNvPr id="9" name="Picture 8">
-            <a:extLst>
-              <a:ext uri="{FF2B5EF4-FFF2-40B4-BE49-F238E27FC236}">
-                <a16:creationId xmlns:a16="http://schemas.microsoft.com/office/drawing/2014/main" id="{C9EDF481-BDD0-9258-04C3-78D744A9A659}"/>
-              </a:ext>
-            </a:extLst>
-          </p:cNvPr>
-          <p:cNvPicPr>
-            <a:picLocks noChangeAspect="1"/>
-          </p:cNvPicPr>
-          <p:nvPr/>
-        </p:nvPicPr>
-        <p:blipFill>
-          <a:blip r:embed="rId4"/>
-          <a:stretch>
-            <a:fillRect/>
-          </a:stretch>
-        </p:blipFill>
-        <p:spPr>
-          <a:xfrm>
-            <a:off x="6015054" y="2582779"/>
-            <a:ext cx="6077746" cy="2103120"/>
-          </a:xfrm>
-          <a:prstGeom prst="rect">
-            <a:avLst/>
-          </a:prstGeom>
-        </p:spPr>
-      </p:pic>
-      <p:pic>
-        <p:nvPicPr>
-          <p:cNvPr id="11" name="Picture 10">
-            <a:extLst>
-              <a:ext uri="{FF2B5EF4-FFF2-40B4-BE49-F238E27FC236}">
-                <a16:creationId xmlns:a16="http://schemas.microsoft.com/office/drawing/2014/main" id="{4B42371C-5AC0-31C1-AB66-DEB02F3DCD2D}"/>
-              </a:ext>
-            </a:extLst>
-          </p:cNvPr>
-          <p:cNvPicPr>
-            <a:picLocks noChangeAspect="1"/>
-          </p:cNvPicPr>
-          <p:nvPr/>
-        </p:nvPicPr>
-        <p:blipFill>
-          <a:blip r:embed="rId5"/>
-          <a:stretch>
-            <a:fillRect/>
-          </a:stretch>
-        </p:blipFill>
-        <p:spPr>
-          <a:xfrm>
-            <a:off x="6015054" y="4685899"/>
-            <a:ext cx="6077745" cy="2124838"/>
-          </a:xfrm>
-          <a:prstGeom prst="rect">
-            <a:avLst/>
-          </a:prstGeom>
-        </p:spPr>
-      </p:pic>
-      <p:pic>
-        <p:nvPicPr>
-          <p:cNvPr id="13" name="Picture 12">
-            <a:extLst>
-              <a:ext uri="{FF2B5EF4-FFF2-40B4-BE49-F238E27FC236}">
-                <a16:creationId xmlns:a16="http://schemas.microsoft.com/office/drawing/2014/main" id="{A87D3E5C-A51A-868F-F152-99064B34671C}"/>
-              </a:ext>
-            </a:extLst>
-          </p:cNvPr>
-          <p:cNvPicPr>
-            <a:picLocks noChangeAspect="1"/>
-          </p:cNvPicPr>
-          <p:nvPr/>
-        </p:nvPicPr>
-        <p:blipFill>
-          <a:blip r:embed="rId6"/>
-          <a:stretch>
-            <a:fillRect/>
-          </a:stretch>
-        </p:blipFill>
-        <p:spPr>
-          <a:xfrm>
-            <a:off x="559338" y="4667172"/>
-            <a:ext cx="5262665" cy="2143565"/>
-          </a:xfrm>
-          <a:prstGeom prst="rect">
-            <a:avLst/>
-          </a:prstGeom>
-        </p:spPr>
-      </p:pic>
-      <p:sp>
-        <p:nvSpPr>
-          <p:cNvPr id="15" name="Rectangle 14">
-            <a:extLst>
-              <a:ext uri="{FF2B5EF4-FFF2-40B4-BE49-F238E27FC236}">
-                <a16:creationId xmlns:a16="http://schemas.microsoft.com/office/drawing/2014/main" id="{C5874D17-AF96-70D2-56B9-961E334B4F74}"/>
+              <a:t>Which types of food have more negative impact on the environment?</a:t>
+            </a:r>
+          </a:p>
+        </p:txBody>
+      </p:sp>
+      <p:sp>
+        <p:nvSpPr>
+          <p:cNvPr id="7" name="Rectangle 6">
+            <a:extLst>
+              <a:ext uri="{FF2B5EF4-FFF2-40B4-BE49-F238E27FC236}">
+                <a16:creationId xmlns:a16="http://schemas.microsoft.com/office/drawing/2014/main" id="{D6B07252-7E25-63AF-B0AC-38E1F437E7D1}"/>
               </a:ext>
             </a:extLst>
           </p:cNvPr>
@@ -5286,8 +5565,8 @@
         </p:nvSpPr>
         <p:spPr>
           <a:xfrm>
-            <a:off x="674915" y="140854"/>
-            <a:ext cx="11321142" cy="547136"/>
+            <a:off x="952499" y="140854"/>
+            <a:ext cx="10287001" cy="831912"/>
           </a:xfrm>
           <a:prstGeom prst="rect">
             <a:avLst/>
@@ -5323,10 +5602,10 @@
       </p:sp>
       <p:sp>
         <p:nvSpPr>
-          <p:cNvPr id="21" name="Title 1">
-            <a:extLst>
-              <a:ext uri="{FF2B5EF4-FFF2-40B4-BE49-F238E27FC236}">
-                <a16:creationId xmlns:a16="http://schemas.microsoft.com/office/drawing/2014/main" id="{A3AF37B0-94AB-AE73-981E-475BEED7C275}"/>
+          <p:cNvPr id="10" name="Title 1">
+            <a:extLst>
+              <a:ext uri="{FF2B5EF4-FFF2-40B4-BE49-F238E27FC236}">
+                <a16:creationId xmlns:a16="http://schemas.microsoft.com/office/drawing/2014/main" id="{8E194144-456F-0114-7581-205897A2D291}"/>
               </a:ext>
             </a:extLst>
           </p:cNvPr>
@@ -5337,7 +5616,7 @@
         </p:nvSpPr>
         <p:spPr>
           <a:xfrm>
-            <a:off x="1973057" y="-204841"/>
+            <a:off x="3000288" y="-84591"/>
             <a:ext cx="10515600" cy="1325563"/>
           </a:xfrm>
           <a:prstGeom prst="rect">
@@ -5369,22 +5648,121 @@
           </a:lstStyle>
           <a:p>
             <a:r>
-              <a:rPr lang="en-US" sz="3600" b="1" dirty="0">
+              <a:rPr lang="en-US" sz="2800" b="1" dirty="0">
                 <a:solidFill>
                   <a:schemeClr val="bg1"/>
                 </a:solidFill>
                 <a:latin typeface="Arial" panose="020B0604020202020204" pitchFamily="34" charset="0"/>
                 <a:cs typeface="Arial" panose="020B0604020202020204" pitchFamily="34" charset="0"/>
               </a:rPr>
-              <a:t>Food Product vs Land Use Change</a:t>
-            </a:r>
-          </a:p>
-        </p:txBody>
-      </p:sp>
+              <a:t>Total Emissions per Food Product</a:t>
+            </a:r>
+          </a:p>
+        </p:txBody>
+      </p:sp>
+      <p:sp>
+        <p:nvSpPr>
+          <p:cNvPr id="5" name="TextBox 4">
+            <a:extLst>
+              <a:ext uri="{FF2B5EF4-FFF2-40B4-BE49-F238E27FC236}">
+                <a16:creationId xmlns:a16="http://schemas.microsoft.com/office/drawing/2014/main" id="{B96904F5-6BD9-9CD9-D0CF-2B5A87FB8B28}"/>
+              </a:ext>
+            </a:extLst>
+          </p:cNvPr>
+          <p:cNvSpPr txBox="1"/>
+          <p:nvPr/>
+        </p:nvSpPr>
+        <p:spPr>
+          <a:xfrm>
+            <a:off x="3123738" y="4022649"/>
+            <a:ext cx="9443936" cy="369332"/>
+          </a:xfrm>
+          <a:prstGeom prst="rect">
+            <a:avLst/>
+          </a:prstGeom>
+          <a:noFill/>
+        </p:spPr>
+        <p:txBody>
+          <a:bodyPr wrap="square" rtlCol="0">
+            <a:spAutoFit/>
+          </a:bodyPr>
+          <a:lstStyle/>
+          <a:p>
+            <a:r>
+              <a:rPr lang="en-US" dirty="0">
+                <a:latin typeface="Arial" panose="020B0604020202020204" pitchFamily="34" charset="0"/>
+                <a:cs typeface="Arial" panose="020B0604020202020204" pitchFamily="34" charset="0"/>
+              </a:rPr>
+              <a:t>Animal-Based Products vs Plant-Based Products</a:t>
+            </a:r>
+          </a:p>
+        </p:txBody>
+      </p:sp>
+      <p:pic>
+        <p:nvPicPr>
+          <p:cNvPr id="6" name="Picture 5">
+            <a:extLst>
+              <a:ext uri="{FF2B5EF4-FFF2-40B4-BE49-F238E27FC236}">
+                <a16:creationId xmlns:a16="http://schemas.microsoft.com/office/drawing/2014/main" id="{9CD77FD7-1CB7-039E-6B91-3514F167CBCD}"/>
+              </a:ext>
+            </a:extLst>
+          </p:cNvPr>
+          <p:cNvPicPr>
+            <a:picLocks noChangeAspect="1"/>
+          </p:cNvPicPr>
+          <p:nvPr/>
+        </p:nvPicPr>
+        <p:blipFill>
+          <a:blip r:embed="rId2"/>
+          <a:stretch>
+            <a:fillRect/>
+          </a:stretch>
+        </p:blipFill>
+        <p:spPr>
+          <a:xfrm>
+            <a:off x="1197797" y="4391981"/>
+            <a:ext cx="9796403" cy="2377440"/>
+          </a:xfrm>
+          <a:prstGeom prst="rect">
+            <a:avLst/>
+          </a:prstGeom>
+        </p:spPr>
+      </p:pic>
+      <p:pic>
+        <p:nvPicPr>
+          <p:cNvPr id="11" name="Picture 10">
+            <a:extLst>
+              <a:ext uri="{FF2B5EF4-FFF2-40B4-BE49-F238E27FC236}">
+                <a16:creationId xmlns:a16="http://schemas.microsoft.com/office/drawing/2014/main" id="{B2DDA1FA-4844-8175-2747-D172683A59BB}"/>
+              </a:ext>
+            </a:extLst>
+          </p:cNvPr>
+          <p:cNvPicPr>
+            <a:picLocks noChangeAspect="1"/>
+          </p:cNvPicPr>
+          <p:nvPr/>
+        </p:nvPicPr>
+        <p:blipFill>
+          <a:blip r:embed="rId3"/>
+          <a:srcRect l="697" t="5296" r="1035" b="-740"/>
+          <a:stretch>
+            <a:fillRect/>
+          </a:stretch>
+        </p:blipFill>
+        <p:spPr>
+          <a:xfrm>
+            <a:off x="1989770" y="1553769"/>
+            <a:ext cx="8212455" cy="2468880"/>
+          </a:xfrm>
+          <a:prstGeom prst="rect">
+            <a:avLst/>
+          </a:prstGeom>
+        </p:spPr>
+      </p:pic>
     </p:spTree>
     <p:extLst>
       <p:ext uri="{BB962C8B-B14F-4D97-AF65-F5344CB8AC3E}">
-        <p14:creationId xmlns:p14="http://schemas.microsoft.com/office/powerpoint/2010/main" val="1224935063"/>
+        <p14:creationId xmlns:p14="http://schemas.microsoft.com/office/powerpoint/2010/main" val="3943745945"/>
       </p:ext>
     </p:extLst>
   </p:cSld>
@@ -5395,6 +5773,397 @@
 </file>
 
 <file path=ppt/slides/slide5.xml><?xml version="1.0" encoding="utf-8"?>
+<p:sld xmlns:a="http://schemas.openxmlformats.org/drawingml/2006/main" xmlns:r="http://schemas.openxmlformats.org/officeDocument/2006/relationships" xmlns:p="http://schemas.openxmlformats.org/presentationml/2006/main">
+  <p:cSld>
+    <p:bg>
+      <p:bgPr>
+        <a:solidFill>
+          <a:schemeClr val="tx2">
+            <a:lumMod val="10000"/>
+            <a:lumOff val="90000"/>
+          </a:schemeClr>
+        </a:solidFill>
+        <a:effectLst/>
+      </p:bgPr>
+    </p:bg>
+    <p:spTree>
+      <p:nvGrpSpPr>
+        <p:cNvPr id="1" name="">
+          <a:extLst>
+            <a:ext uri="{FF2B5EF4-FFF2-40B4-BE49-F238E27FC236}">
+              <a16:creationId xmlns:a16="http://schemas.microsoft.com/office/drawing/2014/main" id="{5F23FE6E-0030-9FE2-A3CD-A72BBFC11361}"/>
+            </a:ext>
+          </a:extLst>
+        </p:cNvPr>
+        <p:cNvGrpSpPr/>
+        <p:nvPr/>
+      </p:nvGrpSpPr>
+      <p:grpSpPr>
+        <a:xfrm>
+          <a:off x="0" y="0"/>
+          <a:ext cx="0" cy="0"/>
+          <a:chOff x="0" y="0"/>
+          <a:chExt cx="0" cy="0"/>
+        </a:xfrm>
+      </p:grpSpPr>
+      <p:sp>
+        <p:nvSpPr>
+          <p:cNvPr id="8" name="Rectangle 7">
+            <a:extLst>
+              <a:ext uri="{FF2B5EF4-FFF2-40B4-BE49-F238E27FC236}">
+                <a16:creationId xmlns:a16="http://schemas.microsoft.com/office/drawing/2014/main" id="{FA1E5721-6CBB-E173-8EF9-8F5BCBF0E741}"/>
+              </a:ext>
+            </a:extLst>
+          </p:cNvPr>
+          <p:cNvSpPr/>
+          <p:nvPr/>
+        </p:nvSpPr>
+        <p:spPr>
+          <a:xfrm>
+            <a:off x="419100" y="82184"/>
+            <a:ext cx="11353800" cy="734939"/>
+          </a:xfrm>
+          <a:prstGeom prst="rect">
+            <a:avLst/>
+          </a:prstGeom>
+          <a:solidFill>
+            <a:srgbClr val="0070C0"/>
+          </a:solidFill>
+        </p:spPr>
+        <p:style>
+          <a:lnRef idx="2">
+            <a:schemeClr val="accent1">
+              <a:shade val="15000"/>
+            </a:schemeClr>
+          </a:lnRef>
+          <a:fillRef idx="1">
+            <a:schemeClr val="accent1"/>
+          </a:fillRef>
+          <a:effectRef idx="0">
+            <a:schemeClr val="accent1"/>
+          </a:effectRef>
+          <a:fontRef idx="minor">
+            <a:schemeClr val="lt1"/>
+          </a:fontRef>
+        </p:style>
+        <p:txBody>
+          <a:bodyPr rtlCol="0" anchor="ctr"/>
+          <a:lstStyle/>
+          <a:p>
+            <a:pPr algn="ctr"/>
+            <a:endParaRPr lang="en-US"/>
+          </a:p>
+        </p:txBody>
+      </p:sp>
+      <p:sp>
+        <p:nvSpPr>
+          <p:cNvPr id="9" name="Title 1">
+            <a:extLst>
+              <a:ext uri="{FF2B5EF4-FFF2-40B4-BE49-F238E27FC236}">
+                <a16:creationId xmlns:a16="http://schemas.microsoft.com/office/drawing/2014/main" id="{43308F0C-D758-9CF2-2345-ECE56D5E482F}"/>
+              </a:ext>
+            </a:extLst>
+          </p:cNvPr>
+          <p:cNvSpPr txBox="1">
+            <a:spLocks/>
+          </p:cNvSpPr>
+          <p:nvPr/>
+        </p:nvSpPr>
+        <p:spPr>
+          <a:xfrm>
+            <a:off x="1059435" y="-295299"/>
+            <a:ext cx="10903085" cy="1325563"/>
+          </a:xfrm>
+          <a:prstGeom prst="rect">
+            <a:avLst/>
+          </a:prstGeom>
+        </p:spPr>
+        <p:txBody>
+          <a:bodyPr vert="horz" lIns="91440" tIns="45720" rIns="91440" bIns="45720" rtlCol="0" anchor="ctr">
+            <a:normAutofit/>
+          </a:bodyPr>
+          <a:lstStyle>
+            <a:lvl1pPr algn="l" defTabSz="914400" rtl="0" eaLnBrk="1" latinLnBrk="0" hangingPunct="1">
+              <a:lnSpc>
+                <a:spcPct val="90000"/>
+              </a:lnSpc>
+              <a:spcBef>
+                <a:spcPct val="0"/>
+              </a:spcBef>
+              <a:buNone/>
+              <a:defRPr sz="4400" kern="1200">
+                <a:solidFill>
+                  <a:schemeClr val="tx1"/>
+                </a:solidFill>
+                <a:latin typeface="+mj-lt"/>
+                <a:ea typeface="+mj-ea"/>
+                <a:cs typeface="+mj-cs"/>
+              </a:defRPr>
+            </a:lvl1pPr>
+          </a:lstStyle>
+          <a:p>
+            <a:pPr fontAlgn="base"/>
+            <a:r>
+              <a:rPr lang="en-US" sz="2400" b="1" dirty="0">
+                <a:solidFill>
+                  <a:schemeClr val="bg1"/>
+                </a:solidFill>
+                <a:latin typeface="Arial" panose="020B0604020202020204" pitchFamily="34" charset="0"/>
+                <a:cs typeface="Arial" panose="020B0604020202020204" pitchFamily="34" charset="0"/>
+              </a:rPr>
+              <a:t>Carbon Footprint Comparison of High Protein vs Low Protein Foods?</a:t>
+            </a:r>
+          </a:p>
+        </p:txBody>
+      </p:sp>
+      <p:sp>
+        <p:nvSpPr>
+          <p:cNvPr id="7" name="TextBox 6">
+            <a:extLst>
+              <a:ext uri="{FF2B5EF4-FFF2-40B4-BE49-F238E27FC236}">
+                <a16:creationId xmlns:a16="http://schemas.microsoft.com/office/drawing/2014/main" id="{D4AD9628-BBDD-27CE-49EA-A15972CED90B}"/>
+              </a:ext>
+            </a:extLst>
+          </p:cNvPr>
+          <p:cNvSpPr txBox="1"/>
+          <p:nvPr/>
+        </p:nvSpPr>
+        <p:spPr>
+          <a:xfrm>
+            <a:off x="7782887" y="931850"/>
+            <a:ext cx="2704290" cy="307777"/>
+          </a:xfrm>
+          <a:prstGeom prst="rect">
+            <a:avLst/>
+          </a:prstGeom>
+          <a:noFill/>
+        </p:spPr>
+        <p:txBody>
+          <a:bodyPr wrap="square" rtlCol="0">
+            <a:spAutoFit/>
+          </a:bodyPr>
+          <a:lstStyle/>
+          <a:p>
+            <a:r>
+              <a:rPr lang="en-US" sz="1400" b="1" dirty="0">
+                <a:latin typeface="Arial" panose="020B0604020202020204" pitchFamily="34" charset="0"/>
+                <a:cs typeface="Arial" panose="020B0604020202020204" pitchFamily="34" charset="0"/>
+              </a:rPr>
+              <a:t>High Protein Products</a:t>
+            </a:r>
+          </a:p>
+        </p:txBody>
+      </p:sp>
+      <p:sp>
+        <p:nvSpPr>
+          <p:cNvPr id="12" name="TextBox 11">
+            <a:extLst>
+              <a:ext uri="{FF2B5EF4-FFF2-40B4-BE49-F238E27FC236}">
+                <a16:creationId xmlns:a16="http://schemas.microsoft.com/office/drawing/2014/main" id="{C1E8F734-A652-8A9E-A4BA-EDCA097E66DD}"/>
+              </a:ext>
+            </a:extLst>
+          </p:cNvPr>
+          <p:cNvSpPr txBox="1"/>
+          <p:nvPr/>
+        </p:nvSpPr>
+        <p:spPr>
+          <a:xfrm>
+            <a:off x="7889891" y="4107036"/>
+            <a:ext cx="2704290" cy="307777"/>
+          </a:xfrm>
+          <a:prstGeom prst="rect">
+            <a:avLst/>
+          </a:prstGeom>
+          <a:noFill/>
+        </p:spPr>
+        <p:txBody>
+          <a:bodyPr wrap="square" rtlCol="0">
+            <a:spAutoFit/>
+          </a:bodyPr>
+          <a:lstStyle/>
+          <a:p>
+            <a:r>
+              <a:rPr lang="en-US" sz="1400" b="1" dirty="0">
+                <a:latin typeface="Arial" panose="020B0604020202020204" pitchFamily="34" charset="0"/>
+                <a:cs typeface="Arial" panose="020B0604020202020204" pitchFamily="34" charset="0"/>
+              </a:rPr>
+              <a:t>Low Protein Products</a:t>
+            </a:r>
+          </a:p>
+        </p:txBody>
+      </p:sp>
+      <p:sp>
+        <p:nvSpPr>
+          <p:cNvPr id="13" name="TextBox 12">
+            <a:extLst>
+              <a:ext uri="{FF2B5EF4-FFF2-40B4-BE49-F238E27FC236}">
+                <a16:creationId xmlns:a16="http://schemas.microsoft.com/office/drawing/2014/main" id="{033D2CAD-5551-EEE4-F5BD-23A1BD467C60}"/>
+              </a:ext>
+            </a:extLst>
+          </p:cNvPr>
+          <p:cNvSpPr txBox="1"/>
+          <p:nvPr/>
+        </p:nvSpPr>
+        <p:spPr>
+          <a:xfrm>
+            <a:off x="1059435" y="4107036"/>
+            <a:ext cx="2704290" cy="307777"/>
+          </a:xfrm>
+          <a:prstGeom prst="rect">
+            <a:avLst/>
+          </a:prstGeom>
+          <a:noFill/>
+        </p:spPr>
+        <p:txBody>
+          <a:bodyPr wrap="square" rtlCol="0">
+            <a:spAutoFit/>
+          </a:bodyPr>
+          <a:lstStyle/>
+          <a:p>
+            <a:r>
+              <a:rPr lang="en-US" sz="1400" b="1" dirty="0">
+                <a:latin typeface="Arial" panose="020B0604020202020204" pitchFamily="34" charset="0"/>
+                <a:cs typeface="Arial" panose="020B0604020202020204" pitchFamily="34" charset="0"/>
+              </a:rPr>
+              <a:t>Medium Protein Products</a:t>
+            </a:r>
+          </a:p>
+        </p:txBody>
+      </p:sp>
+      <p:pic>
+        <p:nvPicPr>
+          <p:cNvPr id="10" name="Picture 9">
+            <a:extLst>
+              <a:ext uri="{FF2B5EF4-FFF2-40B4-BE49-F238E27FC236}">
+                <a16:creationId xmlns:a16="http://schemas.microsoft.com/office/drawing/2014/main" id="{FED070EC-AA5A-14D1-1D5B-B6C6EF74ED7D}"/>
+              </a:ext>
+            </a:extLst>
+          </p:cNvPr>
+          <p:cNvPicPr>
+            <a:picLocks noChangeAspect="1"/>
+          </p:cNvPicPr>
+          <p:nvPr/>
+        </p:nvPicPr>
+        <p:blipFill>
+          <a:blip r:embed="rId2"/>
+          <a:stretch>
+            <a:fillRect/>
+          </a:stretch>
+        </p:blipFill>
+        <p:spPr>
+          <a:xfrm>
+            <a:off x="5394032" y="1287708"/>
+            <a:ext cx="6622221" cy="2103120"/>
+          </a:xfrm>
+          <a:prstGeom prst="rect">
+            <a:avLst/>
+          </a:prstGeom>
+        </p:spPr>
+      </p:pic>
+      <p:pic>
+        <p:nvPicPr>
+          <p:cNvPr id="20" name="Picture 19">
+            <a:extLst>
+              <a:ext uri="{FF2B5EF4-FFF2-40B4-BE49-F238E27FC236}">
+                <a16:creationId xmlns:a16="http://schemas.microsoft.com/office/drawing/2014/main" id="{06FA5C1C-0CCE-A969-19EF-3F1775A70B2B}"/>
+              </a:ext>
+            </a:extLst>
+          </p:cNvPr>
+          <p:cNvPicPr>
+            <a:picLocks noChangeAspect="1"/>
+          </p:cNvPicPr>
+          <p:nvPr/>
+        </p:nvPicPr>
+        <p:blipFill>
+          <a:blip r:embed="rId3"/>
+          <a:stretch>
+            <a:fillRect/>
+          </a:stretch>
+        </p:blipFill>
+        <p:spPr>
+          <a:xfrm>
+            <a:off x="5394032" y="4518732"/>
+            <a:ext cx="6746023" cy="2103120"/>
+          </a:xfrm>
+          <a:prstGeom prst="rect">
+            <a:avLst/>
+          </a:prstGeom>
+        </p:spPr>
+      </p:pic>
+      <p:pic>
+        <p:nvPicPr>
+          <p:cNvPr id="22" name="Picture 21">
+            <a:extLst>
+              <a:ext uri="{FF2B5EF4-FFF2-40B4-BE49-F238E27FC236}">
+                <a16:creationId xmlns:a16="http://schemas.microsoft.com/office/drawing/2014/main" id="{27817013-636B-E7E6-0501-DB9FAE837926}"/>
+              </a:ext>
+            </a:extLst>
+          </p:cNvPr>
+          <p:cNvPicPr>
+            <a:picLocks noChangeAspect="1"/>
+          </p:cNvPicPr>
+          <p:nvPr/>
+        </p:nvPicPr>
+        <p:blipFill>
+          <a:blip r:embed="rId4"/>
+          <a:stretch>
+            <a:fillRect/>
+          </a:stretch>
+        </p:blipFill>
+        <p:spPr>
+          <a:xfrm>
+            <a:off x="154169" y="4568702"/>
+            <a:ext cx="5029200" cy="2053150"/>
+          </a:xfrm>
+          <a:prstGeom prst="rect">
+            <a:avLst/>
+          </a:prstGeom>
+        </p:spPr>
+      </p:pic>
+      <p:pic>
+        <p:nvPicPr>
+          <p:cNvPr id="24" name="Picture 23">
+            <a:extLst>
+              <a:ext uri="{FF2B5EF4-FFF2-40B4-BE49-F238E27FC236}">
+                <a16:creationId xmlns:a16="http://schemas.microsoft.com/office/drawing/2014/main" id="{C22E5075-C966-FBDA-1A8F-BB5920D1B075}"/>
+              </a:ext>
+            </a:extLst>
+          </p:cNvPr>
+          <p:cNvPicPr>
+            <a:picLocks noChangeAspect="1"/>
+          </p:cNvPicPr>
+          <p:nvPr/>
+        </p:nvPicPr>
+        <p:blipFill>
+          <a:blip r:embed="rId5"/>
+          <a:stretch>
+            <a:fillRect/>
+          </a:stretch>
+        </p:blipFill>
+        <p:spPr>
+          <a:xfrm>
+            <a:off x="107283" y="971012"/>
+            <a:ext cx="5076086" cy="3017520"/>
+          </a:xfrm>
+          <a:prstGeom prst="rect">
+            <a:avLst/>
+          </a:prstGeom>
+        </p:spPr>
+      </p:pic>
+    </p:spTree>
+    <p:extLst>
+      <p:ext uri="{BB962C8B-B14F-4D97-AF65-F5344CB8AC3E}">
+        <p14:creationId xmlns:p14="http://schemas.microsoft.com/office/powerpoint/2010/main" val="1728812209"/>
+      </p:ext>
+    </p:extLst>
+  </p:cSld>
+  <p:clrMapOvr>
+    <a:masterClrMapping/>
+  </p:clrMapOvr>
+</p:sld>
+</file>
+
+<file path=ppt/slides/slide6.xml><?xml version="1.0" encoding="utf-8"?>
 <p:sld xmlns:a="http://schemas.openxmlformats.org/drawingml/2006/main" xmlns:r="http://schemas.openxmlformats.org/officeDocument/2006/relationships" xmlns:p="http://schemas.openxmlformats.org/presentationml/2006/main">
   <p:cSld>
     <p:bg>
@@ -5616,7 +6385,7 @@
 </p:sld>
 </file>
 
-<file path=ppt/slides/slide6.xml><?xml version="1.0" encoding="utf-8"?>
+<file path=ppt/slides/slide7.xml><?xml version="1.0" encoding="utf-8"?>
 <p:sld xmlns:a="http://schemas.openxmlformats.org/drawingml/2006/main" xmlns:r="http://schemas.openxmlformats.org/officeDocument/2006/relationships" xmlns:p="http://schemas.openxmlformats.org/presentationml/2006/main">
   <p:cSld>
     <p:bg>
@@ -5832,7 +6601,7 @@
 </p:sld>
 </file>
 
-<file path=ppt/slides/slide7.xml><?xml version="1.0" encoding="utf-8"?>
+<file path=ppt/slides/slide8.xml><?xml version="1.0" encoding="utf-8"?>
 <p:sld xmlns:a="http://schemas.openxmlformats.org/drawingml/2006/main" xmlns:r="http://schemas.openxmlformats.org/officeDocument/2006/relationships" xmlns:p="http://schemas.openxmlformats.org/presentationml/2006/main">
   <p:cSld>
     <p:bg>
@@ -6048,7 +6817,7 @@
 </p:sld>
 </file>
 
-<file path=ppt/slides/slide8.xml><?xml version="1.0" encoding="utf-8"?>
+<file path=ppt/slides/slide9.xml><?xml version="1.0" encoding="utf-8"?>
 <p:sld xmlns:a="http://schemas.openxmlformats.org/drawingml/2006/main" xmlns:r="http://schemas.openxmlformats.org/officeDocument/2006/relationships" xmlns:p="http://schemas.openxmlformats.org/presentationml/2006/main">
   <p:cSld>
     <p:bg>
@@ -6255,397 +7024,6 @@
     <p:extLst>
       <p:ext uri="{BB962C8B-B14F-4D97-AF65-F5344CB8AC3E}">
         <p14:creationId xmlns:p14="http://schemas.microsoft.com/office/powerpoint/2010/main" val="570824870"/>
-      </p:ext>
-    </p:extLst>
-  </p:cSld>
-  <p:clrMapOvr>
-    <a:masterClrMapping/>
-  </p:clrMapOvr>
-</p:sld>
-</file>
-
-<file path=ppt/slides/slide9.xml><?xml version="1.0" encoding="utf-8"?>
-<p:sld xmlns:a="http://schemas.openxmlformats.org/drawingml/2006/main" xmlns:r="http://schemas.openxmlformats.org/officeDocument/2006/relationships" xmlns:p="http://schemas.openxmlformats.org/presentationml/2006/main">
-  <p:cSld>
-    <p:bg>
-      <p:bgPr>
-        <a:solidFill>
-          <a:schemeClr val="tx2">
-            <a:lumMod val="10000"/>
-            <a:lumOff val="90000"/>
-          </a:schemeClr>
-        </a:solidFill>
-        <a:effectLst/>
-      </p:bgPr>
-    </p:bg>
-    <p:spTree>
-      <p:nvGrpSpPr>
-        <p:cNvPr id="1" name="">
-          <a:extLst>
-            <a:ext uri="{FF2B5EF4-FFF2-40B4-BE49-F238E27FC236}">
-              <a16:creationId xmlns:a16="http://schemas.microsoft.com/office/drawing/2014/main" id="{5F23FE6E-0030-9FE2-A3CD-A72BBFC11361}"/>
-            </a:ext>
-          </a:extLst>
-        </p:cNvPr>
-        <p:cNvGrpSpPr/>
-        <p:nvPr/>
-      </p:nvGrpSpPr>
-      <p:grpSpPr>
-        <a:xfrm>
-          <a:off x="0" y="0"/>
-          <a:ext cx="0" cy="0"/>
-          <a:chOff x="0" y="0"/>
-          <a:chExt cx="0" cy="0"/>
-        </a:xfrm>
-      </p:grpSpPr>
-      <p:sp>
-        <p:nvSpPr>
-          <p:cNvPr id="8" name="Rectangle 7">
-            <a:extLst>
-              <a:ext uri="{FF2B5EF4-FFF2-40B4-BE49-F238E27FC236}">
-                <a16:creationId xmlns:a16="http://schemas.microsoft.com/office/drawing/2014/main" id="{FA1E5721-6CBB-E173-8EF9-8F5BCBF0E741}"/>
-              </a:ext>
-            </a:extLst>
-          </p:cNvPr>
-          <p:cNvSpPr/>
-          <p:nvPr/>
-        </p:nvSpPr>
-        <p:spPr>
-          <a:xfrm>
-            <a:off x="419100" y="82184"/>
-            <a:ext cx="11353800" cy="734939"/>
-          </a:xfrm>
-          <a:prstGeom prst="rect">
-            <a:avLst/>
-          </a:prstGeom>
-          <a:solidFill>
-            <a:srgbClr val="0070C0"/>
-          </a:solidFill>
-        </p:spPr>
-        <p:style>
-          <a:lnRef idx="2">
-            <a:schemeClr val="accent1">
-              <a:shade val="15000"/>
-            </a:schemeClr>
-          </a:lnRef>
-          <a:fillRef idx="1">
-            <a:schemeClr val="accent1"/>
-          </a:fillRef>
-          <a:effectRef idx="0">
-            <a:schemeClr val="accent1"/>
-          </a:effectRef>
-          <a:fontRef idx="minor">
-            <a:schemeClr val="lt1"/>
-          </a:fontRef>
-        </p:style>
-        <p:txBody>
-          <a:bodyPr rtlCol="0" anchor="ctr"/>
-          <a:lstStyle/>
-          <a:p>
-            <a:pPr algn="ctr"/>
-            <a:endParaRPr lang="en-US"/>
-          </a:p>
-        </p:txBody>
-      </p:sp>
-      <p:sp>
-        <p:nvSpPr>
-          <p:cNvPr id="9" name="Title 1">
-            <a:extLst>
-              <a:ext uri="{FF2B5EF4-FFF2-40B4-BE49-F238E27FC236}">
-                <a16:creationId xmlns:a16="http://schemas.microsoft.com/office/drawing/2014/main" id="{43308F0C-D758-9CF2-2345-ECE56D5E482F}"/>
-              </a:ext>
-            </a:extLst>
-          </p:cNvPr>
-          <p:cNvSpPr txBox="1">
-            <a:spLocks/>
-          </p:cNvSpPr>
-          <p:nvPr/>
-        </p:nvSpPr>
-        <p:spPr>
-          <a:xfrm>
-            <a:off x="1059435" y="-295299"/>
-            <a:ext cx="10903085" cy="1325563"/>
-          </a:xfrm>
-          <a:prstGeom prst="rect">
-            <a:avLst/>
-          </a:prstGeom>
-        </p:spPr>
-        <p:txBody>
-          <a:bodyPr vert="horz" lIns="91440" tIns="45720" rIns="91440" bIns="45720" rtlCol="0" anchor="ctr">
-            <a:normAutofit/>
-          </a:bodyPr>
-          <a:lstStyle>
-            <a:lvl1pPr algn="l" defTabSz="914400" rtl="0" eaLnBrk="1" latinLnBrk="0" hangingPunct="1">
-              <a:lnSpc>
-                <a:spcPct val="90000"/>
-              </a:lnSpc>
-              <a:spcBef>
-                <a:spcPct val="0"/>
-              </a:spcBef>
-              <a:buNone/>
-              <a:defRPr sz="4400" kern="1200">
-                <a:solidFill>
-                  <a:schemeClr val="tx1"/>
-                </a:solidFill>
-                <a:latin typeface="+mj-lt"/>
-                <a:ea typeface="+mj-ea"/>
-                <a:cs typeface="+mj-cs"/>
-              </a:defRPr>
-            </a:lvl1pPr>
-          </a:lstStyle>
-          <a:p>
-            <a:pPr fontAlgn="base"/>
-            <a:r>
-              <a:rPr lang="en-US" sz="2400" b="1" dirty="0">
-                <a:solidFill>
-                  <a:schemeClr val="bg1"/>
-                </a:solidFill>
-                <a:latin typeface="Arial" panose="020B0604020202020204" pitchFamily="34" charset="0"/>
-                <a:cs typeface="Arial" panose="020B0604020202020204" pitchFamily="34" charset="0"/>
-              </a:rPr>
-              <a:t>Carbon Footprint Comparison of High Protein vs Low Protein Foods?</a:t>
-            </a:r>
-          </a:p>
-        </p:txBody>
-      </p:sp>
-      <p:pic>
-        <p:nvPicPr>
-          <p:cNvPr id="3" name="Picture 2">
-            <a:extLst>
-              <a:ext uri="{FF2B5EF4-FFF2-40B4-BE49-F238E27FC236}">
-                <a16:creationId xmlns:a16="http://schemas.microsoft.com/office/drawing/2014/main" id="{DF4852EA-C147-DFC8-07EF-9E0A937CB2A5}"/>
-              </a:ext>
-            </a:extLst>
-          </p:cNvPr>
-          <p:cNvPicPr>
-            <a:picLocks noChangeAspect="1"/>
-          </p:cNvPicPr>
-          <p:nvPr/>
-        </p:nvPicPr>
-        <p:blipFill>
-          <a:blip r:embed="rId2"/>
-          <a:stretch>
-            <a:fillRect/>
-          </a:stretch>
-        </p:blipFill>
-        <p:spPr>
-          <a:xfrm>
-            <a:off x="128077" y="1030264"/>
-            <a:ext cx="5105593" cy="3017520"/>
-          </a:xfrm>
-          <a:prstGeom prst="rect">
-            <a:avLst/>
-          </a:prstGeom>
-        </p:spPr>
-      </p:pic>
-      <p:pic>
-        <p:nvPicPr>
-          <p:cNvPr id="6" name="Picture 5">
-            <a:extLst>
-              <a:ext uri="{FF2B5EF4-FFF2-40B4-BE49-F238E27FC236}">
-                <a16:creationId xmlns:a16="http://schemas.microsoft.com/office/drawing/2014/main" id="{BB5986CF-3AE8-7292-6B02-D985D631D9FB}"/>
-              </a:ext>
-            </a:extLst>
-          </p:cNvPr>
-          <p:cNvPicPr>
-            <a:picLocks noChangeAspect="1"/>
-          </p:cNvPicPr>
-          <p:nvPr/>
-        </p:nvPicPr>
-        <p:blipFill>
-          <a:blip r:embed="rId3"/>
-          <a:stretch>
-            <a:fillRect/>
-          </a:stretch>
-        </p:blipFill>
-        <p:spPr>
-          <a:xfrm>
-            <a:off x="5364113" y="1239627"/>
-            <a:ext cx="6699810" cy="2103120"/>
-          </a:xfrm>
-          <a:prstGeom prst="rect">
-            <a:avLst/>
-          </a:prstGeom>
-        </p:spPr>
-      </p:pic>
-      <p:sp>
-        <p:nvSpPr>
-          <p:cNvPr id="7" name="TextBox 6">
-            <a:extLst>
-              <a:ext uri="{FF2B5EF4-FFF2-40B4-BE49-F238E27FC236}">
-                <a16:creationId xmlns:a16="http://schemas.microsoft.com/office/drawing/2014/main" id="{D4AD9628-BBDD-27CE-49EA-A15972CED90B}"/>
-              </a:ext>
-            </a:extLst>
-          </p:cNvPr>
-          <p:cNvSpPr txBox="1"/>
-          <p:nvPr/>
-        </p:nvSpPr>
-        <p:spPr>
-          <a:xfrm>
-            <a:off x="7782887" y="931850"/>
-            <a:ext cx="2704290" cy="307777"/>
-          </a:xfrm>
-          <a:prstGeom prst="rect">
-            <a:avLst/>
-          </a:prstGeom>
-          <a:noFill/>
-        </p:spPr>
-        <p:txBody>
-          <a:bodyPr wrap="square" rtlCol="0">
-            <a:spAutoFit/>
-          </a:bodyPr>
-          <a:lstStyle/>
-          <a:p>
-            <a:r>
-              <a:rPr lang="en-US" sz="1400" b="1" dirty="0">
-                <a:latin typeface="Arial" panose="020B0604020202020204" pitchFamily="34" charset="0"/>
-                <a:cs typeface="Arial" panose="020B0604020202020204" pitchFamily="34" charset="0"/>
-              </a:rPr>
-              <a:t>High Protein Products</a:t>
-            </a:r>
-          </a:p>
-        </p:txBody>
-      </p:sp>
-      <p:sp>
-        <p:nvSpPr>
-          <p:cNvPr id="12" name="TextBox 11">
-            <a:extLst>
-              <a:ext uri="{FF2B5EF4-FFF2-40B4-BE49-F238E27FC236}">
-                <a16:creationId xmlns:a16="http://schemas.microsoft.com/office/drawing/2014/main" id="{C1E8F734-A652-8A9E-A4BA-EDCA097E66DD}"/>
-              </a:ext>
-            </a:extLst>
-          </p:cNvPr>
-          <p:cNvSpPr txBox="1"/>
-          <p:nvPr/>
-        </p:nvSpPr>
-        <p:spPr>
-          <a:xfrm>
-            <a:off x="7782887" y="3648273"/>
-            <a:ext cx="2704290" cy="307777"/>
-          </a:xfrm>
-          <a:prstGeom prst="rect">
-            <a:avLst/>
-          </a:prstGeom>
-          <a:noFill/>
-        </p:spPr>
-        <p:txBody>
-          <a:bodyPr wrap="square" rtlCol="0">
-            <a:spAutoFit/>
-          </a:bodyPr>
-          <a:lstStyle/>
-          <a:p>
-            <a:r>
-              <a:rPr lang="en-US" sz="1400" b="1" dirty="0">
-                <a:latin typeface="Arial" panose="020B0604020202020204" pitchFamily="34" charset="0"/>
-                <a:cs typeface="Arial" panose="020B0604020202020204" pitchFamily="34" charset="0"/>
-              </a:rPr>
-              <a:t>Low Protein Products</a:t>
-            </a:r>
-          </a:p>
-        </p:txBody>
-      </p:sp>
-      <p:sp>
-        <p:nvSpPr>
-          <p:cNvPr id="13" name="TextBox 12">
-            <a:extLst>
-              <a:ext uri="{FF2B5EF4-FFF2-40B4-BE49-F238E27FC236}">
-                <a16:creationId xmlns:a16="http://schemas.microsoft.com/office/drawing/2014/main" id="{033D2CAD-5551-EEE4-F5BD-23A1BD467C60}"/>
-              </a:ext>
-            </a:extLst>
-          </p:cNvPr>
-          <p:cNvSpPr txBox="1"/>
-          <p:nvPr/>
-        </p:nvSpPr>
-        <p:spPr>
-          <a:xfrm>
-            <a:off x="1059435" y="4260925"/>
-            <a:ext cx="2704290" cy="307777"/>
-          </a:xfrm>
-          <a:prstGeom prst="rect">
-            <a:avLst/>
-          </a:prstGeom>
-          <a:noFill/>
-        </p:spPr>
-        <p:txBody>
-          <a:bodyPr wrap="square" rtlCol="0">
-            <a:spAutoFit/>
-          </a:bodyPr>
-          <a:lstStyle/>
-          <a:p>
-            <a:r>
-              <a:rPr lang="en-US" sz="1400" b="1" dirty="0">
-                <a:latin typeface="Arial" panose="020B0604020202020204" pitchFamily="34" charset="0"/>
-                <a:cs typeface="Arial" panose="020B0604020202020204" pitchFamily="34" charset="0"/>
-              </a:rPr>
-              <a:t>Medium Protein Products</a:t>
-            </a:r>
-          </a:p>
-        </p:txBody>
-      </p:sp>
-      <p:pic>
-        <p:nvPicPr>
-          <p:cNvPr id="15" name="Picture 14">
-            <a:extLst>
-              <a:ext uri="{FF2B5EF4-FFF2-40B4-BE49-F238E27FC236}">
-                <a16:creationId xmlns:a16="http://schemas.microsoft.com/office/drawing/2014/main" id="{FA8BD5EE-D96E-D85D-B057-C36780144D0C}"/>
-              </a:ext>
-            </a:extLst>
-          </p:cNvPr>
-          <p:cNvPicPr>
-            <a:picLocks noChangeAspect="1"/>
-          </p:cNvPicPr>
-          <p:nvPr/>
-        </p:nvPicPr>
-        <p:blipFill>
-          <a:blip r:embed="rId4"/>
-          <a:stretch>
-            <a:fillRect/>
-          </a:stretch>
-        </p:blipFill>
-        <p:spPr>
-          <a:xfrm>
-            <a:off x="85090" y="4781843"/>
-            <a:ext cx="5120640" cy="1591732"/>
-          </a:xfrm>
-          <a:prstGeom prst="rect">
-            <a:avLst/>
-          </a:prstGeom>
-        </p:spPr>
-      </p:pic>
-      <p:pic>
-        <p:nvPicPr>
-          <p:cNvPr id="17" name="Picture 16">
-            <a:extLst>
-              <a:ext uri="{FF2B5EF4-FFF2-40B4-BE49-F238E27FC236}">
-                <a16:creationId xmlns:a16="http://schemas.microsoft.com/office/drawing/2014/main" id="{B7738741-3E61-72D5-63D6-4A796C37AA4E}"/>
-              </a:ext>
-            </a:extLst>
-          </p:cNvPr>
-          <p:cNvPicPr>
-            <a:picLocks noChangeAspect="1"/>
-          </p:cNvPicPr>
-          <p:nvPr/>
-        </p:nvPicPr>
-        <p:blipFill>
-          <a:blip r:embed="rId5"/>
-          <a:stretch>
-            <a:fillRect/>
-          </a:stretch>
-        </p:blipFill>
-        <p:spPr>
-          <a:xfrm>
-            <a:off x="5346364" y="4015303"/>
-            <a:ext cx="6717559" cy="2103120"/>
-          </a:xfrm>
-          <a:prstGeom prst="rect">
-            <a:avLst/>
-          </a:prstGeom>
-        </p:spPr>
-      </p:pic>
-    </p:spTree>
-    <p:extLst>
-      <p:ext uri="{BB962C8B-B14F-4D97-AF65-F5344CB8AC3E}">
-        <p14:creationId xmlns:p14="http://schemas.microsoft.com/office/powerpoint/2010/main" val="1728812209"/>
       </p:ext>
     </p:extLst>
   </p:cSld>

</xml_diff>